<commit_message>
update slides - Entropy
</commit_message>
<xml_diff>
--- a/rankingwithLLM.pptx
+++ b/rankingwithLLM.pptx
@@ -5,7 +5,7 @@
     <p:sldMasterId id="2147483648" r:id="rId1"/>
   </p:sldMasterIdLst>
   <p:notesMasterIdLst>
-    <p:notesMasterId r:id="rId24"/>
+    <p:notesMasterId r:id="rId28"/>
   </p:notesMasterIdLst>
   <p:sldIdLst>
     <p:sldId id="256" r:id="rId2"/>
@@ -30,6 +30,10 @@
     <p:sldId id="277" r:id="rId21"/>
     <p:sldId id="276" r:id="rId22"/>
     <p:sldId id="278" r:id="rId23"/>
+    <p:sldId id="279" r:id="rId24"/>
+    <p:sldId id="280" r:id="rId25"/>
+    <p:sldId id="281" r:id="rId26"/>
+    <p:sldId id="283" r:id="rId27"/>
   </p:sldIdLst>
   <p:sldSz cx="12192000" cy="6858000"/>
   <p:notesSz cx="6858000" cy="9144000"/>
@@ -218,7 +222,7 @@
           <a:p>
             <a:fld id="{DE9DA986-C197-2042-B476-BC36203B606C}" type="datetimeFigureOut">
               <a:rPr lang="en-US" smtClean="0"/>
-              <a:t>9/10/24</a:t>
+              <a:t>9/13/24</a:t>
             </a:fld>
             <a:endParaRPr lang="en-US"/>
           </a:p>
@@ -716,7 +720,7 @@
           <a:p>
             <a:fld id="{70F6711B-007C-4E47-B805-CF8F9D486DA3}" type="datetimeFigureOut">
               <a:rPr lang="en-US" smtClean="0"/>
-              <a:t>9/10/24</a:t>
+              <a:t>9/13/24</a:t>
             </a:fld>
             <a:endParaRPr lang="en-US"/>
           </a:p>
@@ -914,7 +918,7 @@
           <a:p>
             <a:fld id="{70F6711B-007C-4E47-B805-CF8F9D486DA3}" type="datetimeFigureOut">
               <a:rPr lang="en-US" smtClean="0"/>
-              <a:t>9/10/24</a:t>
+              <a:t>9/13/24</a:t>
             </a:fld>
             <a:endParaRPr lang="en-US"/>
           </a:p>
@@ -1122,7 +1126,7 @@
           <a:p>
             <a:fld id="{70F6711B-007C-4E47-B805-CF8F9D486DA3}" type="datetimeFigureOut">
               <a:rPr lang="en-US" smtClean="0"/>
-              <a:t>9/10/24</a:t>
+              <a:t>9/13/24</a:t>
             </a:fld>
             <a:endParaRPr lang="en-US"/>
           </a:p>
@@ -1320,7 +1324,7 @@
           <a:p>
             <a:fld id="{70F6711B-007C-4E47-B805-CF8F9D486DA3}" type="datetimeFigureOut">
               <a:rPr lang="en-US" smtClean="0"/>
-              <a:t>9/10/24</a:t>
+              <a:t>9/13/24</a:t>
             </a:fld>
             <a:endParaRPr lang="en-US"/>
           </a:p>
@@ -1595,7 +1599,7 @@
           <a:p>
             <a:fld id="{70F6711B-007C-4E47-B805-CF8F9D486DA3}" type="datetimeFigureOut">
               <a:rPr lang="en-US" smtClean="0"/>
-              <a:t>9/10/24</a:t>
+              <a:t>9/13/24</a:t>
             </a:fld>
             <a:endParaRPr lang="en-US"/>
           </a:p>
@@ -1860,7 +1864,7 @@
           <a:p>
             <a:fld id="{70F6711B-007C-4E47-B805-CF8F9D486DA3}" type="datetimeFigureOut">
               <a:rPr lang="en-US" smtClean="0"/>
-              <a:t>9/10/24</a:t>
+              <a:t>9/13/24</a:t>
             </a:fld>
             <a:endParaRPr lang="en-US"/>
           </a:p>
@@ -2272,7 +2276,7 @@
           <a:p>
             <a:fld id="{70F6711B-007C-4E47-B805-CF8F9D486DA3}" type="datetimeFigureOut">
               <a:rPr lang="en-US" smtClean="0"/>
-              <a:t>9/10/24</a:t>
+              <a:t>9/13/24</a:t>
             </a:fld>
             <a:endParaRPr lang="en-US"/>
           </a:p>
@@ -2413,7 +2417,7 @@
           <a:p>
             <a:fld id="{70F6711B-007C-4E47-B805-CF8F9D486DA3}" type="datetimeFigureOut">
               <a:rPr lang="en-US" smtClean="0"/>
-              <a:t>9/10/24</a:t>
+              <a:t>9/13/24</a:t>
             </a:fld>
             <a:endParaRPr lang="en-US"/>
           </a:p>
@@ -2526,7 +2530,7 @@
           <a:p>
             <a:fld id="{70F6711B-007C-4E47-B805-CF8F9D486DA3}" type="datetimeFigureOut">
               <a:rPr lang="en-US" smtClean="0"/>
-              <a:t>9/10/24</a:t>
+              <a:t>9/13/24</a:t>
             </a:fld>
             <a:endParaRPr lang="en-US"/>
           </a:p>
@@ -2837,7 +2841,7 @@
           <a:p>
             <a:fld id="{70F6711B-007C-4E47-B805-CF8F9D486DA3}" type="datetimeFigureOut">
               <a:rPr lang="en-US" smtClean="0"/>
-              <a:t>9/10/24</a:t>
+              <a:t>9/13/24</a:t>
             </a:fld>
             <a:endParaRPr lang="en-US"/>
           </a:p>
@@ -3125,7 +3129,7 @@
           <a:p>
             <a:fld id="{70F6711B-007C-4E47-B805-CF8F9D486DA3}" type="datetimeFigureOut">
               <a:rPr lang="en-US" smtClean="0"/>
-              <a:t>9/10/24</a:t>
+              <a:t>9/13/24</a:t>
             </a:fld>
             <a:endParaRPr lang="en-US"/>
           </a:p>
@@ -3366,7 +3370,7 @@
           <a:p>
             <a:fld id="{70F6711B-007C-4E47-B805-CF8F9D486DA3}" type="datetimeFigureOut">
               <a:rPr lang="en-US" smtClean="0"/>
-              <a:t>9/10/24</a:t>
+              <a:t>9/13/24</a:t>
             </a:fld>
             <a:endParaRPr lang="en-US"/>
           </a:p>
@@ -9542,94 +9546,17 @@
         </p:nvSpPr>
         <p:spPr>
           <a:xfrm>
-            <a:off x="367221" y="1526080"/>
+            <a:off x="375911" y="1103675"/>
             <a:ext cx="10515600" cy="4351338"/>
           </a:xfrm>
         </p:spPr>
         <p:txBody>
           <a:bodyPr>
-            <a:normAutofit fontScale="92500" lnSpcReduction="10000"/>
+            <a:normAutofit fontScale="70000" lnSpcReduction="20000"/>
           </a:bodyPr>
           <a:lstStyle/>
           <a:p>
-            <a:r>
-              <a:rPr lang="en-US" dirty="0"/>
-              <a:t>An example of how to compute P(c1 &gt; c2)</a:t>
-            </a:r>
-          </a:p>
-          <a:p>
-            <a:pPr lvl="1"/>
-            <a:r>
-              <a:rPr lang="en-US" dirty="0"/>
-              <a:t>c1: (</a:t>
-            </a:r>
-            <a:r>
-              <a:rPr lang="en-US" dirty="0" err="1"/>
-              <a:t>lb</a:t>
-            </a:r>
-            <a:r>
-              <a:rPr lang="en-US" dirty="0"/>
-              <a:t>, </a:t>
-            </a:r>
-            <a:r>
-              <a:rPr lang="en-US" dirty="0" err="1"/>
-              <a:t>ub</a:t>
-            </a:r>
-            <a:r>
-              <a:rPr lang="en-US" dirty="0"/>
-              <a:t>) = (1, 2) </a:t>
-            </a:r>
-          </a:p>
-          <a:p>
-            <a:pPr lvl="1"/>
-            <a:r>
-              <a:rPr lang="en-US" dirty="0"/>
-              <a:t>c2 : (</a:t>
-            </a:r>
-            <a:r>
-              <a:rPr lang="en-US" dirty="0" err="1"/>
-              <a:t>lb</a:t>
-            </a:r>
-            <a:r>
-              <a:rPr lang="en-US" dirty="0"/>
-              <a:t>, </a:t>
-            </a:r>
-            <a:r>
-              <a:rPr lang="en-US" dirty="0" err="1"/>
-              <a:t>ub</a:t>
-            </a:r>
-            <a:r>
-              <a:rPr lang="en-US" dirty="0"/>
-              <a:t>) = (0.5, 1.5)</a:t>
-            </a:r>
-          </a:p>
-          <a:p>
-            <a:pPr lvl="1"/>
-            <a:r>
-              <a:rPr lang="en-US" dirty="0"/>
-              <a:t>P(c1 &gt; c2) = </a:t>
-            </a:r>
-          </a:p>
-          <a:p>
-            <a:pPr lvl="2"/>
-            <a:r>
-              <a:rPr lang="en-US" dirty="0"/>
-              <a:t>p(1.5 &lt; c1 &lt; 2) + </a:t>
-            </a:r>
-          </a:p>
-          <a:p>
-            <a:pPr lvl="2"/>
-            <a:r>
-              <a:rPr lang="en-US" dirty="0"/>
-              <a:t>p(1 &lt; c1 &lt; 1.5) * p(1 &lt; c2 &lt; 1.5) * ½ + </a:t>
-            </a:r>
-          </a:p>
-          <a:p>
-            <a:pPr lvl="2"/>
-            <a:r>
-              <a:rPr lang="en-US" dirty="0"/>
-              <a:t>p(1 &lt; c1 &lt; 1.5) * p(0.5 &lt; c2 &lt; 1) </a:t>
-            </a:r>
+            <a:endParaRPr lang="en-US" dirty="0"/>
           </a:p>
           <a:p>
             <a:pPr marL="457200" lvl="1" indent="0">
@@ -9637,25 +9564,93 @@
             </a:pPr>
             <a:r>
               <a:rPr lang="en-US" dirty="0"/>
-              <a:t>	= ½ + </a:t>
+              <a:t>		Continuous</a:t>
             </a:r>
           </a:p>
           <a:p>
             <a:pPr marL="457200" lvl="1" indent="0">
               <a:buNone/>
             </a:pPr>
-            <a:r>
-              <a:rPr lang="en-US" dirty="0"/>
-              <a:t>	½ * ½ * ½ +</a:t>
-            </a:r>
+            <a:endParaRPr lang="en-US" dirty="0"/>
           </a:p>
           <a:p>
             <a:pPr marL="457200" lvl="1" indent="0">
               <a:buNone/>
             </a:pPr>
+            <a:endParaRPr lang="en-US" dirty="0"/>
+          </a:p>
+          <a:p>
+            <a:pPr lvl="1"/>
             <a:r>
               <a:rPr lang="en-US" dirty="0"/>
-              <a:t>	 ½ * ½ = </a:t>
+              <a:t>c1: (</a:t>
+            </a:r>
+            <a:r>
+              <a:rPr lang="en-US" dirty="0" err="1"/>
+              <a:t>lb</a:t>
+            </a:r>
+            <a:r>
+              <a:rPr lang="en-US" dirty="0"/>
+              <a:t>, </a:t>
+            </a:r>
+            <a:r>
+              <a:rPr lang="en-US" dirty="0" err="1"/>
+              <a:t>ub</a:t>
+            </a:r>
+            <a:r>
+              <a:rPr lang="en-US" dirty="0"/>
+              <a:t>) = (1, 2) </a:t>
+            </a:r>
+          </a:p>
+          <a:p>
+            <a:pPr lvl="1"/>
+            <a:r>
+              <a:rPr lang="en-US" dirty="0"/>
+              <a:t>c2 : (</a:t>
+            </a:r>
+            <a:r>
+              <a:rPr lang="en-US" dirty="0" err="1"/>
+              <a:t>lb</a:t>
+            </a:r>
+            <a:r>
+              <a:rPr lang="en-US" dirty="0"/>
+              <a:t>, </a:t>
+            </a:r>
+            <a:r>
+              <a:rPr lang="en-US" dirty="0" err="1"/>
+              <a:t>ub</a:t>
+            </a:r>
+            <a:r>
+              <a:rPr lang="en-US" dirty="0"/>
+              <a:t>) = (0.5, 1.5)</a:t>
+            </a:r>
+          </a:p>
+          <a:p>
+            <a:pPr lvl="1"/>
+            <a:r>
+              <a:rPr lang="en-US" dirty="0"/>
+              <a:t>P(c1 &gt;= c2) = </a:t>
+            </a:r>
+          </a:p>
+          <a:p>
+            <a:pPr lvl="2"/>
+            <a:r>
+              <a:rPr lang="en-US" dirty="0"/>
+              <a:t>p(1.5 &lt; c1 &lt; 2) + </a:t>
+            </a:r>
+          </a:p>
+          <a:p>
+            <a:pPr lvl="2"/>
+            <a:r>
+              <a:rPr lang="en-US" dirty="0"/>
+              <a:t>p(1 &lt; c1 &lt; 1.5) * p(1 &lt; c2 &lt; 1.5) * ½ + </a:t>
+            </a:r>
+          </a:p>
+          <a:p>
+            <a:pPr lvl="2"/>
+            <a:r>
+              <a:rPr lang="en-US" dirty="0"/>
+              <a:t>p(1 &lt; c1 &lt; 1.5) * p(0.5 &lt; c2 &lt; 1) </a:t>
             </a:r>
           </a:p>
           <a:p>
@@ -9664,17 +9659,48 @@
             </a:pPr>
             <a:r>
               <a:rPr lang="en-US" dirty="0"/>
-              <a:t>	 </a:t>
-            </a:r>
-            <a:r>
-              <a:rPr lang="en-US" sz="2200" dirty="0"/>
-              <a:t>0.875</a:t>
+              <a:t>	= ½ + </a:t>
             </a:r>
           </a:p>
           <a:p>
             <a:pPr marL="457200" lvl="1" indent="0">
               <a:buNone/>
             </a:pPr>
+            <a:r>
+              <a:rPr lang="en-US" dirty="0"/>
+              <a:t>	½ * ½ * ½ +</a:t>
+            </a:r>
+          </a:p>
+          <a:p>
+            <a:pPr marL="457200" lvl="1" indent="0">
+              <a:buNone/>
+            </a:pPr>
+            <a:r>
+              <a:rPr lang="en-US" dirty="0"/>
+              <a:t>	 ½ * ½ = </a:t>
+            </a:r>
+          </a:p>
+          <a:p>
+            <a:pPr marL="457200" lvl="1" indent="0">
+              <a:buNone/>
+            </a:pPr>
+            <a:r>
+              <a:rPr lang="en-US" dirty="0"/>
+              <a:t>	 </a:t>
+            </a:r>
+            <a:r>
+              <a:rPr lang="en-US" sz="2200" dirty="0"/>
+              <a:t>0.875</a:t>
+            </a:r>
+          </a:p>
+          <a:p>
+            <a:pPr marL="457200" lvl="1" indent="0">
+              <a:buNone/>
+            </a:pPr>
+            <a:endParaRPr lang="en-US" dirty="0"/>
+          </a:p>
+          <a:p>
+            <a:pPr lvl="1"/>
             <a:endParaRPr lang="en-US" dirty="0"/>
           </a:p>
           <a:p>
@@ -9701,13 +9727,13 @@
           <p:nvPr>
             <p:extLst>
               <p:ext uri="{D42A27DB-BD31-4B8C-83A1-F6EECF244321}">
-                <p14:modId xmlns:p14="http://schemas.microsoft.com/office/powerpoint/2010/main" val="2215308518"/>
+                <p14:modId xmlns:p14="http://schemas.microsoft.com/office/powerpoint/2010/main" val="1944492823"/>
               </p:ext>
             </p:extLst>
           </p:nvPr>
         </p:nvGraphicFramePr>
         <p:xfrm>
-          <a:off x="6229350" y="2774649"/>
+          <a:off x="6382404" y="2120442"/>
           <a:ext cx="5433685" cy="1854200"/>
         </p:xfrm>
         <a:graphic>
@@ -9848,7 +9874,10 @@
                     <a:lstStyle/>
                     <a:p>
                       <a:pPr algn="ctr"/>
-                      <a:endParaRPr lang="en-US" dirty="0"/>
+                      <a:r>
+                        <a:rPr lang="en-US" dirty="0"/>
+                        <a:t>*</a:t>
+                      </a:r>
                     </a:p>
                   </a:txBody>
                   <a:tcPr/>
@@ -9919,7 +9948,14 @@
                       </a:r>
                     </a:p>
                   </a:txBody>
-                  <a:tcPr/>
+                  <a:tcPr>
+                    <a:solidFill>
+                      <a:schemeClr val="accent6">
+                        <a:lumMod val="40000"/>
+                        <a:lumOff val="60000"/>
+                      </a:schemeClr>
+                    </a:solidFill>
+                  </a:tcPr>
                 </a:tc>
                 <a:tc>
                   <a:txBody>
@@ -9927,10 +9963,20 @@
                     <a:lstStyle/>
                     <a:p>
                       <a:pPr algn="ctr"/>
-                      <a:endParaRPr lang="en-US"/>
-                    </a:p>
-                  </a:txBody>
-                  <a:tcPr/>
+                      <a:r>
+                        <a:rPr lang="en-US" dirty="0"/>
+                        <a:t>*</a:t>
+                      </a:r>
+                    </a:p>
+                  </a:txBody>
+                  <a:tcPr>
+                    <a:solidFill>
+                      <a:schemeClr val="accent6">
+                        <a:lumMod val="40000"/>
+                        <a:lumOff val="60000"/>
+                      </a:schemeClr>
+                    </a:solidFill>
+                  </a:tcPr>
                 </a:tc>
                 <a:tc>
                   <a:txBody>
@@ -9941,7 +9987,14 @@
                       <a:endParaRPr lang="en-US" dirty="0"/>
                     </a:p>
                   </a:txBody>
-                  <a:tcPr/>
+                  <a:tcPr>
+                    <a:solidFill>
+                      <a:schemeClr val="accent6">
+                        <a:lumMod val="40000"/>
+                        <a:lumOff val="60000"/>
+                      </a:schemeClr>
+                    </a:solidFill>
+                  </a:tcPr>
                 </a:tc>
                 <a:tc>
                   <a:txBody>
@@ -9987,7 +10040,14 @@
                       </a:r>
                     </a:p>
                   </a:txBody>
-                  <a:tcPr/>
+                  <a:tcPr>
+                    <a:solidFill>
+                      <a:schemeClr val="accent6">
+                        <a:lumMod val="40000"/>
+                        <a:lumOff val="60000"/>
+                      </a:schemeClr>
+                    </a:solidFill>
+                  </a:tcPr>
                 </a:tc>
                 <a:tc>
                   <a:txBody>
@@ -10001,7 +10061,14 @@
                       </a:r>
                     </a:p>
                   </a:txBody>
-                  <a:tcPr/>
+                  <a:tcPr>
+                    <a:solidFill>
+                      <a:schemeClr val="accent6">
+                        <a:lumMod val="40000"/>
+                        <a:lumOff val="60000"/>
+                      </a:schemeClr>
+                    </a:solidFill>
+                  </a:tcPr>
                 </a:tc>
                 <a:tc>
                   <a:txBody>
@@ -10009,10 +10076,20 @@
                     <a:lstStyle/>
                     <a:p>
                       <a:pPr algn="ctr"/>
-                      <a:endParaRPr lang="en-US" dirty="0"/>
-                    </a:p>
-                  </a:txBody>
-                  <a:tcPr/>
+                      <a:r>
+                        <a:rPr lang="en-US" dirty="0"/>
+                        <a:t>*</a:t>
+                      </a:r>
+                    </a:p>
+                  </a:txBody>
+                  <a:tcPr>
+                    <a:solidFill>
+                      <a:schemeClr val="accent6">
+                        <a:lumMod val="40000"/>
+                        <a:lumOff val="60000"/>
+                      </a:schemeClr>
+                    </a:solidFill>
+                  </a:tcPr>
                 </a:tc>
                 <a:tc>
                   <a:txBody>
@@ -10058,7 +10135,14 @@
                       </a:r>
                     </a:p>
                   </a:txBody>
-                  <a:tcPr/>
+                  <a:tcPr>
+                    <a:solidFill>
+                      <a:schemeClr val="accent6">
+                        <a:lumMod val="40000"/>
+                        <a:lumOff val="60000"/>
+                      </a:schemeClr>
+                    </a:solidFill>
+                  </a:tcPr>
                 </a:tc>
                 <a:tc>
                   <a:txBody>
@@ -10072,7 +10156,14 @@
                       </a:r>
                     </a:p>
                   </a:txBody>
-                  <a:tcPr/>
+                  <a:tcPr>
+                    <a:solidFill>
+                      <a:schemeClr val="accent6">
+                        <a:lumMod val="40000"/>
+                        <a:lumOff val="60000"/>
+                      </a:schemeClr>
+                    </a:solidFill>
+                  </a:tcPr>
                 </a:tc>
                 <a:tc>
                   <a:txBody>
@@ -10086,7 +10177,14 @@
                       </a:r>
                     </a:p>
                   </a:txBody>
-                  <a:tcPr/>
+                  <a:tcPr>
+                    <a:solidFill>
+                      <a:schemeClr val="accent6">
+                        <a:lumMod val="40000"/>
+                        <a:lumOff val="60000"/>
+                      </a:schemeClr>
+                    </a:solidFill>
+                  </a:tcPr>
                 </a:tc>
                 <a:tc>
                   <a:txBody>
@@ -10094,7 +10192,10 @@
                     <a:lstStyle/>
                     <a:p>
                       <a:pPr algn="ctr"/>
-                      <a:endParaRPr lang="en-US" dirty="0"/>
+                      <a:r>
+                        <a:rPr lang="en-US" dirty="0"/>
+                        <a:t>*</a:t>
+                      </a:r>
                     </a:p>
                   </a:txBody>
                   <a:tcPr/>
@@ -10123,7 +10224,7 @@
         </p:nvSpPr>
         <p:spPr>
           <a:xfrm>
-            <a:off x="7321840" y="2405317"/>
+            <a:off x="6660179" y="1762231"/>
             <a:ext cx="468398" cy="369332"/>
           </a:xfrm>
           <a:prstGeom prst="rect">
@@ -10158,7 +10259,7 @@
         </p:nvSpPr>
         <p:spPr>
           <a:xfrm>
-            <a:off x="5756698" y="3059668"/>
+            <a:off x="5861801" y="2131563"/>
             <a:ext cx="468398" cy="369332"/>
           </a:xfrm>
           <a:prstGeom prst="rect">
@@ -10179,6 +10280,197 @@
           </a:p>
         </p:txBody>
       </p:sp>
+      <p:sp>
+        <p:nvSpPr>
+          <p:cNvPr id="9" name="TextBox 8">
+            <a:extLst>
+              <a:ext uri="{FF2B5EF4-FFF2-40B4-BE49-F238E27FC236}">
+                <a16:creationId xmlns:a16="http://schemas.microsoft.com/office/drawing/2014/main" id="{3521714D-CE7F-20A7-BFC1-2234CC50C27A}"/>
+              </a:ext>
+            </a:extLst>
+          </p:cNvPr>
+          <p:cNvSpPr txBox="1"/>
+          <p:nvPr/>
+        </p:nvSpPr>
+        <p:spPr>
+          <a:xfrm>
+            <a:off x="8796664" y="1325563"/>
+            <a:ext cx="1023550" cy="369332"/>
+          </a:xfrm>
+          <a:prstGeom prst="rect">
+            <a:avLst/>
+          </a:prstGeom>
+          <a:noFill/>
+        </p:spPr>
+        <p:txBody>
+          <a:bodyPr wrap="none" rtlCol="0">
+            <a:spAutoFit/>
+          </a:bodyPr>
+          <a:lstStyle/>
+          <a:p>
+            <a:r>
+              <a:rPr lang="en-US" dirty="0"/>
+              <a:t>Discrete</a:t>
+            </a:r>
+          </a:p>
+        </p:txBody>
+      </p:sp>
+      <mc:AlternateContent xmlns:mc="http://schemas.openxmlformats.org/markup-compatibility/2006">
+        <mc:Choice xmlns:a14="http://schemas.microsoft.com/office/drawing/2010/main" Requires="a14">
+          <p:sp>
+            <p:nvSpPr>
+              <p:cNvPr id="10" name="TextBox 9">
+                <a:extLst>
+                  <a:ext uri="{FF2B5EF4-FFF2-40B4-BE49-F238E27FC236}">
+                    <a16:creationId xmlns:a16="http://schemas.microsoft.com/office/drawing/2014/main" id="{9E901366-1E2B-03D9-D1E2-CD06E1229AD7}"/>
+                  </a:ext>
+                </a:extLst>
+              </p:cNvPr>
+              <p:cNvSpPr txBox="1"/>
+              <p:nvPr/>
+            </p:nvSpPr>
+            <p:spPr>
+              <a:xfrm>
+                <a:off x="5633711" y="4317761"/>
+                <a:ext cx="6673302" cy="1877437"/>
+              </a:xfrm>
+              <a:prstGeom prst="rect">
+                <a:avLst/>
+              </a:prstGeom>
+              <a:noFill/>
+            </p:spPr>
+            <p:txBody>
+              <a:bodyPr wrap="none" rtlCol="0">
+                <a:spAutoFit/>
+              </a:bodyPr>
+              <a:lstStyle/>
+              <a:p>
+                <a:r>
+                  <a:rPr lang="en-US" dirty="0"/>
+                  <a:t>Green region = (LB, UB)</a:t>
+                </a:r>
+                <a:r>
+                  <a:rPr lang="en-US" baseline="-25000" dirty="0"/>
+                  <a:t>c1</a:t>
+                </a:r>
+                <a:r>
+                  <a:rPr lang="en-US" dirty="0"/>
+                  <a:t> </a:t>
+                </a:r>
+                <a14:m>
+                  <m:oMath xmlns:m="http://schemas.openxmlformats.org/officeDocument/2006/math">
+                    <m:r>
+                      <a:rPr lang="en-US" i="1" smtClean="0">
+                        <a:latin typeface="Cambria Math" panose="02040503050406030204" pitchFamily="18" charset="0"/>
+                        <a:ea typeface="Cambria Math" panose="02040503050406030204" pitchFamily="18" charset="0"/>
+                      </a:rPr>
+                      <m:t>∩</m:t>
+                    </m:r>
+                    <m:r>
+                      <a:rPr lang="en-US" b="0" i="1" smtClean="0">
+                        <a:latin typeface="Cambria Math" panose="02040503050406030204" pitchFamily="18" charset="0"/>
+                        <a:ea typeface="Cambria Math" panose="02040503050406030204" pitchFamily="18" charset="0"/>
+                      </a:rPr>
+                      <m:t> </m:t>
+                    </m:r>
+                  </m:oMath>
+                </a14:m>
+                <a:r>
+                  <a:rPr lang="en-US" dirty="0"/>
+                  <a:t>(LB, UB)</a:t>
+                </a:r>
+                <a:r>
+                  <a:rPr lang="en-US" baseline="-25000" dirty="0"/>
+                  <a:t>c2</a:t>
+                </a:r>
+              </a:p>
+              <a:p>
+                <a:r>
+                  <a:rPr lang="en-US" dirty="0"/>
+                  <a:t>Star region = c1 &gt;= c2 </a:t>
+                </a:r>
+              </a:p>
+              <a:p>
+                <a:r>
+                  <a:rPr lang="en-US" dirty="0"/>
+                  <a:t>Result = (Star region </a:t>
+                </a:r>
+                <a14:m>
+                  <m:oMath xmlns:m="http://schemas.openxmlformats.org/officeDocument/2006/math">
+                    <m:r>
+                      <a:rPr lang="en-US" i="1" smtClean="0">
+                        <a:latin typeface="Cambria Math" panose="02040503050406030204" pitchFamily="18" charset="0"/>
+                        <a:ea typeface="Cambria Math" panose="02040503050406030204" pitchFamily="18" charset="0"/>
+                      </a:rPr>
+                      <m:t>∩</m:t>
+                    </m:r>
+                  </m:oMath>
+                </a14:m>
+                <a:r>
+                  <a:rPr lang="en-US" dirty="0"/>
+                  <a:t> Green region) / Green region</a:t>
+                </a:r>
+              </a:p>
+              <a:p>
+                <a:endParaRPr lang="en-US" dirty="0"/>
+              </a:p>
+              <a:p>
+                <a:r>
+                  <a:rPr lang="en-US" dirty="0"/>
+                  <a:t>** Green region basically means table after applying assumptions</a:t>
+                </a:r>
+              </a:p>
+              <a:p>
+                <a:endParaRPr lang="en-US" sz="2600" dirty="0"/>
+              </a:p>
+            </p:txBody>
+          </p:sp>
+        </mc:Choice>
+        <mc:Fallback>
+          <p:sp>
+            <p:nvSpPr>
+              <p:cNvPr id="10" name="TextBox 9">
+                <a:extLst>
+                  <a:ext uri="{FF2B5EF4-FFF2-40B4-BE49-F238E27FC236}">
+                    <a16:creationId xmlns:a16="http://schemas.microsoft.com/office/drawing/2014/main" id="{9E901366-1E2B-03D9-D1E2-CD06E1229AD7}"/>
+                  </a:ext>
+                </a:extLst>
+              </p:cNvPr>
+              <p:cNvSpPr txBox="1">
+                <a:spLocks noRot="1" noChangeAspect="1" noMove="1" noResize="1" noEditPoints="1" noAdjustHandles="1" noChangeArrowheads="1" noChangeShapeType="1" noTextEdit="1"/>
+              </p:cNvSpPr>
+              <p:nvPr/>
+            </p:nvSpPr>
+            <p:spPr>
+              <a:xfrm>
+                <a:off x="5633711" y="4317761"/>
+                <a:ext cx="6673302" cy="1877437"/>
+              </a:xfrm>
+              <a:prstGeom prst="rect">
+                <a:avLst/>
+              </a:prstGeom>
+              <a:blipFill>
+                <a:blip r:embed="rId2"/>
+                <a:stretch>
+                  <a:fillRect l="-759" t="-1342"/>
+                </a:stretch>
+              </a:blipFill>
+            </p:spPr>
+            <p:txBody>
+              <a:bodyPr/>
+              <a:lstStyle/>
+              <a:p>
+                <a:r>
+                  <a:rPr lang="en-US">
+                    <a:noFill/>
+                  </a:rPr>
+                  <a:t> </a:t>
+                </a:r>
+              </a:p>
+            </p:txBody>
+          </p:sp>
+        </mc:Fallback>
+      </mc:AlternateContent>
     </p:spTree>
     <p:extLst>
       <p:ext uri="{BB962C8B-B14F-4D97-AF65-F5344CB8AC3E}">
@@ -11684,7 +11976,7 @@
 </file>
 
 <file path=ppt/slides/slide22.xml><?xml version="1.0" encoding="utf-8"?>
-<p:sld xmlns:a="http://schemas.openxmlformats.org/drawingml/2006/main" xmlns:r="http://schemas.openxmlformats.org/officeDocument/2006/relationships" xmlns:p="http://schemas.openxmlformats.org/presentationml/2006/main">
+<p:sld xmlns:a="http://schemas.openxmlformats.org/drawingml/2006/main" xmlns:r="http://schemas.openxmlformats.org/officeDocument/2006/relationships" xmlns:p="http://schemas.openxmlformats.org/presentationml/2006/main" show="0">
   <p:cSld>
     <p:spTree>
       <p:nvGrpSpPr>
@@ -11781,6 +12073,3557 @@
     <p:extLst>
       <p:ext uri="{BB962C8B-B14F-4D97-AF65-F5344CB8AC3E}">
         <p14:creationId xmlns:p14="http://schemas.microsoft.com/office/powerpoint/2010/main" val="1564271487"/>
+      </p:ext>
+    </p:extLst>
+  </p:cSld>
+  <p:clrMapOvr>
+    <a:masterClrMapping/>
+  </p:clrMapOvr>
+</p:sld>
+</file>
+
+<file path=ppt/slides/slide23.xml><?xml version="1.0" encoding="utf-8"?>
+<p:sld xmlns:a="http://schemas.openxmlformats.org/drawingml/2006/main" xmlns:r="http://schemas.openxmlformats.org/officeDocument/2006/relationships" xmlns:p="http://schemas.openxmlformats.org/presentationml/2006/main">
+  <p:cSld>
+    <p:spTree>
+      <p:nvGrpSpPr>
+        <p:cNvPr id="1" name=""/>
+        <p:cNvGrpSpPr/>
+        <p:nvPr/>
+      </p:nvGrpSpPr>
+      <p:grpSpPr>
+        <a:xfrm>
+          <a:off x="0" y="0"/>
+          <a:ext cx="0" cy="0"/>
+          <a:chOff x="0" y="0"/>
+          <a:chExt cx="0" cy="0"/>
+        </a:xfrm>
+      </p:grpSpPr>
+      <p:sp>
+        <p:nvSpPr>
+          <p:cNvPr id="2" name="Title 1">
+            <a:extLst>
+              <a:ext uri="{FF2B5EF4-FFF2-40B4-BE49-F238E27FC236}">
+                <a16:creationId xmlns:a16="http://schemas.microsoft.com/office/drawing/2014/main" id="{1CF1F4F0-1400-A7CC-80C6-72BE1DE9BE97}"/>
+              </a:ext>
+            </a:extLst>
+          </p:cNvPr>
+          <p:cNvSpPr>
+            <a:spLocks noGrp="1"/>
+          </p:cNvSpPr>
+          <p:nvPr>
+            <p:ph type="title"/>
+          </p:nvPr>
+        </p:nvSpPr>
+        <p:spPr>
+          <a:xfrm>
+            <a:off x="838200" y="2766218"/>
+            <a:ext cx="10515600" cy="1325563"/>
+          </a:xfrm>
+        </p:spPr>
+        <p:txBody>
+          <a:bodyPr/>
+          <a:lstStyle/>
+          <a:p>
+            <a:pPr algn="ctr"/>
+            <a:r>
+              <a:rPr lang="en-US" dirty="0"/>
+              <a:t>Entropy – No independence assumption</a:t>
+            </a:r>
+          </a:p>
+        </p:txBody>
+      </p:sp>
+    </p:spTree>
+    <p:extLst>
+      <p:ext uri="{BB962C8B-B14F-4D97-AF65-F5344CB8AC3E}">
+        <p14:creationId xmlns:p14="http://schemas.microsoft.com/office/powerpoint/2010/main" val="856757599"/>
+      </p:ext>
+    </p:extLst>
+  </p:cSld>
+  <p:clrMapOvr>
+    <a:masterClrMapping/>
+  </p:clrMapOvr>
+</p:sld>
+</file>
+
+<file path=ppt/slides/slide24.xml><?xml version="1.0" encoding="utf-8"?>
+<p:sld xmlns:a="http://schemas.openxmlformats.org/drawingml/2006/main" xmlns:r="http://schemas.openxmlformats.org/officeDocument/2006/relationships" xmlns:p="http://schemas.openxmlformats.org/presentationml/2006/main">
+  <p:cSld>
+    <p:spTree>
+      <p:nvGrpSpPr>
+        <p:cNvPr id="1" name=""/>
+        <p:cNvGrpSpPr/>
+        <p:nvPr/>
+      </p:nvGrpSpPr>
+      <p:grpSpPr>
+        <a:xfrm>
+          <a:off x="0" y="0"/>
+          <a:ext cx="0" cy="0"/>
+          <a:chOff x="0" y="0"/>
+          <a:chExt cx="0" cy="0"/>
+        </a:xfrm>
+      </p:grpSpPr>
+      <p:sp>
+        <p:nvSpPr>
+          <p:cNvPr id="2" name="Title 1">
+            <a:extLst>
+              <a:ext uri="{FF2B5EF4-FFF2-40B4-BE49-F238E27FC236}">
+                <a16:creationId xmlns:a16="http://schemas.microsoft.com/office/drawing/2014/main" id="{88ABCA84-F0B3-F083-35FC-6C2D94DF3B07}"/>
+              </a:ext>
+            </a:extLst>
+          </p:cNvPr>
+          <p:cNvSpPr>
+            <a:spLocks noGrp="1"/>
+          </p:cNvSpPr>
+          <p:nvPr>
+            <p:ph type="title"/>
+          </p:nvPr>
+        </p:nvSpPr>
+        <p:spPr>
+          <a:xfrm>
+            <a:off x="733097" y="0"/>
+            <a:ext cx="10515600" cy="1325563"/>
+          </a:xfrm>
+        </p:spPr>
+        <p:txBody>
+          <a:bodyPr/>
+          <a:lstStyle/>
+          <a:p>
+            <a:pPr algn="ctr"/>
+            <a:r>
+              <a:rPr lang="en-US" dirty="0"/>
+              <a:t>Entropy</a:t>
+            </a:r>
+          </a:p>
+        </p:txBody>
+      </p:sp>
+      <mc:AlternateContent xmlns:mc="http://schemas.openxmlformats.org/markup-compatibility/2006">
+        <mc:Choice xmlns:a14="http://schemas.microsoft.com/office/drawing/2010/main" Requires="a14">
+          <p:sp>
+            <p:nvSpPr>
+              <p:cNvPr id="3" name="Content Placeholder 2">
+                <a:extLst>
+                  <a:ext uri="{FF2B5EF4-FFF2-40B4-BE49-F238E27FC236}">
+                    <a16:creationId xmlns:a16="http://schemas.microsoft.com/office/drawing/2014/main" id="{5DF251DC-4F64-5D48-6C5F-F604B6F609CD}"/>
+                  </a:ext>
+                </a:extLst>
+              </p:cNvPr>
+              <p:cNvSpPr>
+                <a:spLocks noGrp="1"/>
+              </p:cNvSpPr>
+              <p:nvPr>
+                <p:ph idx="1"/>
+              </p:nvPr>
+            </p:nvSpPr>
+            <p:spPr>
+              <a:xfrm>
+                <a:off x="371475" y="1325562"/>
+                <a:ext cx="11315700" cy="5318125"/>
+              </a:xfrm>
+            </p:spPr>
+            <p:txBody>
+              <a:bodyPr>
+                <a:normAutofit/>
+              </a:bodyPr>
+              <a:lstStyle/>
+              <a:p>
+                <a:pPr lvl="2"/>
+                <a:endParaRPr lang="en-US" dirty="0"/>
+              </a:p>
+              <a:p>
+                <a:pPr lvl="2"/>
+                <a:endParaRPr lang="en-US" dirty="0"/>
+              </a:p>
+              <a:p>
+                <a:pPr marL="0" indent="0">
+                  <a:buNone/>
+                </a:pPr>
+                <a14:m>
+                  <m:oMath xmlns:m="http://schemas.openxmlformats.org/officeDocument/2006/math">
+                    <m:r>
+                      <a:rPr lang="en-US" i="1" dirty="0" smtClean="0">
+                        <a:latin typeface="Cambria Math" panose="02040503050406030204" pitchFamily="18" charset="0"/>
+                      </a:rPr>
+                      <m:t>𝑃</m:t>
+                    </m:r>
+                    <m:r>
+                      <a:rPr lang="en-US" i="1" baseline="-25000" dirty="0" smtClean="0">
+                        <a:latin typeface="Cambria Math" panose="02040503050406030204" pitchFamily="18" charset="0"/>
+                      </a:rPr>
+                      <m:t>𝑖</m:t>
+                    </m:r>
+                    <m:r>
+                      <a:rPr lang="en-US" i="1" dirty="0" smtClean="0">
+                        <a:latin typeface="Cambria Math" panose="02040503050406030204" pitchFamily="18" charset="0"/>
+                      </a:rPr>
+                      <m:t> = </m:t>
+                    </m:r>
+                    <m:r>
+                      <a:rPr lang="en-US" i="1" dirty="0" smtClean="0">
+                        <a:latin typeface="Cambria Math" panose="02040503050406030204" pitchFamily="18" charset="0"/>
+                      </a:rPr>
+                      <m:t>𝑝</m:t>
+                    </m:r>
+                    <m:d>
+                      <m:dPr>
+                        <m:ctrlPr>
+                          <a:rPr lang="en-US" i="1" dirty="0" smtClean="0">
+                            <a:latin typeface="Cambria Math" panose="02040503050406030204" pitchFamily="18" charset="0"/>
+                          </a:rPr>
+                        </m:ctrlPr>
+                      </m:dPr>
+                      <m:e>
+                        <m:r>
+                          <a:rPr lang="en-US" i="1" dirty="0" err="1" smtClean="0">
+                            <a:latin typeface="Cambria Math" panose="02040503050406030204" pitchFamily="18" charset="0"/>
+                          </a:rPr>
+                          <m:t>𝑐</m:t>
+                        </m:r>
+                        <m:r>
+                          <a:rPr lang="en-US" b="0" i="1" baseline="-25000" dirty="0" smtClean="0">
+                            <a:latin typeface="Cambria Math" panose="02040503050406030204" pitchFamily="18" charset="0"/>
+                          </a:rPr>
+                          <m:t>𝑖</m:t>
+                        </m:r>
+                        <m:r>
+                          <a:rPr lang="en-US" i="1" dirty="0" smtClean="0">
+                            <a:latin typeface="Cambria Math" panose="02040503050406030204" pitchFamily="18" charset="0"/>
+                          </a:rPr>
+                          <m:t>=</m:t>
+                        </m:r>
+                        <m:r>
+                          <a:rPr lang="en-US" i="1" dirty="0" smtClean="0">
+                            <a:latin typeface="Cambria Math" panose="02040503050406030204" pitchFamily="18" charset="0"/>
+                          </a:rPr>
+                          <m:t>𝑤𝑖𝑛𝑛𝑒𝑟</m:t>
+                        </m:r>
+                      </m:e>
+                    </m:d>
+                    <m:r>
+                      <a:rPr lang="en-US" i="1" dirty="0" smtClean="0">
+                        <a:latin typeface="Cambria Math" panose="02040503050406030204" pitchFamily="18" charset="0"/>
+                      </a:rPr>
+                      <m:t>= </m:t>
+                    </m:r>
+                    <m:r>
+                      <a:rPr lang="en-US" i="1" dirty="0" smtClean="0">
+                        <a:latin typeface="Cambria Math" panose="02040503050406030204" pitchFamily="18" charset="0"/>
+                      </a:rPr>
+                      <m:t>𝑃</m:t>
+                    </m:r>
+                    <m:d>
+                      <m:dPr>
+                        <m:ctrlPr>
+                          <a:rPr lang="en-US" i="1" dirty="0" smtClean="0">
+                            <a:latin typeface="Cambria Math" panose="02040503050406030204" pitchFamily="18" charset="0"/>
+                          </a:rPr>
+                        </m:ctrlPr>
+                      </m:dPr>
+                      <m:e>
+                        <m:r>
+                          <a:rPr lang="en-US" i="1" dirty="0" smtClean="0">
+                            <a:latin typeface="Cambria Math" panose="02040503050406030204" pitchFamily="18" charset="0"/>
+                          </a:rPr>
+                          <m:t>𝑐</m:t>
+                        </m:r>
+                        <m:r>
+                          <a:rPr lang="en-US" i="1" baseline="-25000" dirty="0" smtClean="0">
+                            <a:latin typeface="Cambria Math" panose="02040503050406030204" pitchFamily="18" charset="0"/>
+                          </a:rPr>
+                          <m:t>𝑖</m:t>
+                        </m:r>
+                        <m:r>
+                          <a:rPr lang="en-US" b="0" i="1" dirty="0" smtClean="0">
+                            <a:latin typeface="Cambria Math" panose="02040503050406030204" pitchFamily="18" charset="0"/>
+                          </a:rPr>
+                          <m:t>≥</m:t>
+                        </m:r>
+                        <m:r>
+                          <a:rPr lang="en-US" i="1" dirty="0" smtClean="0">
+                            <a:latin typeface="Cambria Math" panose="02040503050406030204" pitchFamily="18" charset="0"/>
+                          </a:rPr>
+                          <m:t> </m:t>
+                        </m:r>
+                        <m:r>
+                          <a:rPr lang="en-US" i="1" dirty="0" smtClean="0">
+                            <a:latin typeface="Cambria Math" panose="02040503050406030204" pitchFamily="18" charset="0"/>
+                          </a:rPr>
+                          <m:t>𝑐</m:t>
+                        </m:r>
+                        <m:r>
+                          <a:rPr lang="en-US" i="1" baseline="-25000" dirty="0" smtClean="0">
+                            <a:latin typeface="Cambria Math" panose="02040503050406030204" pitchFamily="18" charset="0"/>
+                          </a:rPr>
+                          <m:t>1</m:t>
+                        </m:r>
+                        <m:r>
+                          <a:rPr lang="en-US" i="1" dirty="0" smtClean="0">
+                            <a:latin typeface="Cambria Math" panose="02040503050406030204" pitchFamily="18" charset="0"/>
+                          </a:rPr>
+                          <m:t>, </m:t>
+                        </m:r>
+                        <m:r>
+                          <a:rPr lang="en-US" i="1" dirty="0" smtClean="0">
+                            <a:latin typeface="Cambria Math" panose="02040503050406030204" pitchFamily="18" charset="0"/>
+                          </a:rPr>
+                          <m:t>𝑐</m:t>
+                        </m:r>
+                        <m:r>
+                          <a:rPr lang="en-US" i="1" baseline="-25000" dirty="0" smtClean="0">
+                            <a:latin typeface="Cambria Math" panose="02040503050406030204" pitchFamily="18" charset="0"/>
+                          </a:rPr>
+                          <m:t>𝑖</m:t>
+                        </m:r>
+                        <m:r>
+                          <a:rPr lang="en-US" b="0" i="1" dirty="0" smtClean="0">
+                            <a:latin typeface="Cambria Math" panose="02040503050406030204" pitchFamily="18" charset="0"/>
+                          </a:rPr>
+                          <m:t>≥</m:t>
+                        </m:r>
+                        <m:r>
+                          <a:rPr lang="en-US" i="1" dirty="0" smtClean="0">
+                            <a:latin typeface="Cambria Math" panose="02040503050406030204" pitchFamily="18" charset="0"/>
+                          </a:rPr>
+                          <m:t> </m:t>
+                        </m:r>
+                        <m:r>
+                          <a:rPr lang="en-US" i="1" dirty="0" smtClean="0">
+                            <a:latin typeface="Cambria Math" panose="02040503050406030204" pitchFamily="18" charset="0"/>
+                          </a:rPr>
+                          <m:t>𝑐</m:t>
+                        </m:r>
+                        <m:r>
+                          <a:rPr lang="en-US" b="0" i="1" baseline="-25000" dirty="0" smtClean="0">
+                            <a:latin typeface="Cambria Math" panose="02040503050406030204" pitchFamily="18" charset="0"/>
+                          </a:rPr>
+                          <m:t>2</m:t>
+                        </m:r>
+                        <m:r>
+                          <a:rPr lang="en-US" i="1" dirty="0" smtClean="0">
+                            <a:latin typeface="Cambria Math" panose="02040503050406030204" pitchFamily="18" charset="0"/>
+                          </a:rPr>
+                          <m:t>, </m:t>
+                        </m:r>
+                        <m:r>
+                          <a:rPr lang="en-US" i="1" dirty="0" smtClean="0">
+                            <a:latin typeface="Cambria Math" panose="02040503050406030204" pitchFamily="18" charset="0"/>
+                          </a:rPr>
+                          <m:t>𝑐𝑖</m:t>
+                        </m:r>
+                        <m:r>
+                          <a:rPr lang="en-US" b="0" i="1" dirty="0" smtClean="0">
+                            <a:latin typeface="Cambria Math" panose="02040503050406030204" pitchFamily="18" charset="0"/>
+                          </a:rPr>
+                          <m:t>≥</m:t>
+                        </m:r>
+                        <m:r>
+                          <a:rPr lang="en-US" i="1" dirty="0" smtClean="0">
+                            <a:latin typeface="Cambria Math" panose="02040503050406030204" pitchFamily="18" charset="0"/>
+                          </a:rPr>
+                          <m:t> </m:t>
+                        </m:r>
+                        <m:r>
+                          <a:rPr lang="en-US" i="1" dirty="0" smtClean="0">
+                            <a:latin typeface="Cambria Math" panose="02040503050406030204" pitchFamily="18" charset="0"/>
+                          </a:rPr>
+                          <m:t>𝑐</m:t>
+                        </m:r>
+                        <m:r>
+                          <a:rPr lang="en-US" b="0" i="1" baseline="-25000" dirty="0" smtClean="0">
+                            <a:latin typeface="Cambria Math" panose="02040503050406030204" pitchFamily="18" charset="0"/>
+                          </a:rPr>
+                          <m:t>3</m:t>
+                        </m:r>
+                        <m:r>
+                          <a:rPr lang="en-US" i="1" dirty="0" smtClean="0">
+                            <a:latin typeface="Cambria Math" panose="02040503050406030204" pitchFamily="18" charset="0"/>
+                          </a:rPr>
+                          <m:t>, … </m:t>
+                        </m:r>
+                        <m:r>
+                          <a:rPr lang="en-US" i="1" dirty="0" smtClean="0">
+                            <a:latin typeface="Cambria Math" panose="02040503050406030204" pitchFamily="18" charset="0"/>
+                          </a:rPr>
+                          <m:t>𝑐𝑖</m:t>
+                        </m:r>
+                        <m:r>
+                          <a:rPr lang="en-US" b="0" i="1" dirty="0" smtClean="0">
+                            <a:latin typeface="Cambria Math" panose="02040503050406030204" pitchFamily="18" charset="0"/>
+                          </a:rPr>
+                          <m:t>≥</m:t>
+                        </m:r>
+                        <m:r>
+                          <a:rPr lang="en-US" i="1" dirty="0" smtClean="0">
+                            <a:latin typeface="Cambria Math" panose="02040503050406030204" pitchFamily="18" charset="0"/>
+                          </a:rPr>
+                          <m:t> </m:t>
+                        </m:r>
+                        <m:r>
+                          <a:rPr lang="en-US" i="1" dirty="0" err="1" smtClean="0">
+                            <a:latin typeface="Cambria Math" panose="02040503050406030204" pitchFamily="18" charset="0"/>
+                          </a:rPr>
+                          <m:t>𝑐</m:t>
+                        </m:r>
+                        <m:r>
+                          <a:rPr lang="en-US" i="1" baseline="-25000" dirty="0" err="1">
+                            <a:latin typeface="Cambria Math" panose="02040503050406030204" pitchFamily="18" charset="0"/>
+                          </a:rPr>
+                          <m:t>𝑛</m:t>
+                        </m:r>
+                      </m:e>
+                    </m:d>
+                    <m:r>
+                      <a:rPr lang="en-US" i="1" dirty="0" smtClean="0">
+                        <a:latin typeface="Cambria Math" panose="02040503050406030204" pitchFamily="18" charset="0"/>
+                      </a:rPr>
+                      <m:t>=</m:t>
+                    </m:r>
+                    <m:r>
+                      <a:rPr lang="en-US" b="0" i="1" dirty="0" smtClean="0">
+                        <a:latin typeface="Cambria Math" panose="02040503050406030204" pitchFamily="18" charset="0"/>
+                      </a:rPr>
+                      <m:t>𝑃</m:t>
+                    </m:r>
+                    <m:d>
+                      <m:dPr>
+                        <m:ctrlPr>
+                          <a:rPr lang="en-US" b="0" i="1" dirty="0" smtClean="0">
+                            <a:latin typeface="Cambria Math" panose="02040503050406030204" pitchFamily="18" charset="0"/>
+                          </a:rPr>
+                        </m:ctrlPr>
+                      </m:dPr>
+                      <m:e>
+                        <m:r>
+                          <a:rPr lang="en-US" b="0" i="1" dirty="0" smtClean="0">
+                            <a:latin typeface="Cambria Math" panose="02040503050406030204" pitchFamily="18" charset="0"/>
+                          </a:rPr>
+                          <m:t>𝑐</m:t>
+                        </m:r>
+                        <m:r>
+                          <a:rPr lang="en-US" b="0" i="1" baseline="-25000" dirty="0" smtClean="0">
+                            <a:latin typeface="Cambria Math" panose="02040503050406030204" pitchFamily="18" charset="0"/>
+                          </a:rPr>
+                          <m:t>𝑖</m:t>
+                        </m:r>
+                        <m:r>
+                          <a:rPr lang="en-US" b="0" i="1" dirty="0" smtClean="0">
+                            <a:latin typeface="Cambria Math" panose="02040503050406030204" pitchFamily="18" charset="0"/>
+                          </a:rPr>
+                          <m:t>&gt;</m:t>
+                        </m:r>
+                        <m:r>
+                          <a:rPr lang="en-US" b="0" i="1" dirty="0" smtClean="0">
+                            <a:latin typeface="Cambria Math" panose="02040503050406030204" pitchFamily="18" charset="0"/>
+                          </a:rPr>
+                          <m:t>𝑐</m:t>
+                        </m:r>
+                        <m:r>
+                          <a:rPr lang="en-US" b="0" i="1" baseline="-25000" dirty="0" smtClean="0">
+                            <a:latin typeface="Cambria Math" panose="02040503050406030204" pitchFamily="18" charset="0"/>
+                          </a:rPr>
+                          <m:t>1</m:t>
+                        </m:r>
+                        <m:r>
+                          <a:rPr lang="en-US" b="0" i="1" dirty="0" smtClean="0">
+                            <a:latin typeface="Cambria Math" panose="02040503050406030204" pitchFamily="18" charset="0"/>
+                          </a:rPr>
+                          <m:t> |</m:t>
+                        </m:r>
+                        <m:r>
+                          <a:rPr lang="en-US" i="1" dirty="0">
+                            <a:latin typeface="Cambria Math" panose="02040503050406030204" pitchFamily="18" charset="0"/>
+                          </a:rPr>
+                          <m:t>𝑐</m:t>
+                        </m:r>
+                        <m:r>
+                          <a:rPr lang="en-US" i="1" baseline="-25000" dirty="0">
+                            <a:latin typeface="Cambria Math" panose="02040503050406030204" pitchFamily="18" charset="0"/>
+                          </a:rPr>
+                          <m:t>𝑖</m:t>
+                        </m:r>
+                        <m:r>
+                          <a:rPr lang="en-US" i="1" dirty="0">
+                            <a:latin typeface="Cambria Math" panose="02040503050406030204" pitchFamily="18" charset="0"/>
+                          </a:rPr>
+                          <m:t>≥ </m:t>
+                        </m:r>
+                        <m:r>
+                          <a:rPr lang="en-US" i="1" dirty="0">
+                            <a:latin typeface="Cambria Math" panose="02040503050406030204" pitchFamily="18" charset="0"/>
+                          </a:rPr>
+                          <m:t>𝑐</m:t>
+                        </m:r>
+                        <m:r>
+                          <a:rPr lang="en-US" i="1" baseline="-25000" dirty="0">
+                            <a:latin typeface="Cambria Math" panose="02040503050406030204" pitchFamily="18" charset="0"/>
+                          </a:rPr>
+                          <m:t>2</m:t>
+                        </m:r>
+                        <m:r>
+                          <a:rPr lang="en-US" i="1" dirty="0">
+                            <a:latin typeface="Cambria Math" panose="02040503050406030204" pitchFamily="18" charset="0"/>
+                          </a:rPr>
+                          <m:t>, </m:t>
+                        </m:r>
+                        <m:r>
+                          <a:rPr lang="en-US" i="1" dirty="0">
+                            <a:latin typeface="Cambria Math" panose="02040503050406030204" pitchFamily="18" charset="0"/>
+                          </a:rPr>
+                          <m:t>𝑐𝑖</m:t>
+                        </m:r>
+                        <m:r>
+                          <a:rPr lang="en-US" i="1" dirty="0">
+                            <a:latin typeface="Cambria Math" panose="02040503050406030204" pitchFamily="18" charset="0"/>
+                          </a:rPr>
+                          <m:t>≥ </m:t>
+                        </m:r>
+                        <m:r>
+                          <a:rPr lang="en-US" i="1" dirty="0">
+                            <a:latin typeface="Cambria Math" panose="02040503050406030204" pitchFamily="18" charset="0"/>
+                          </a:rPr>
+                          <m:t>𝑐</m:t>
+                        </m:r>
+                        <m:r>
+                          <a:rPr lang="en-US" i="1" baseline="-25000" dirty="0">
+                            <a:latin typeface="Cambria Math" panose="02040503050406030204" pitchFamily="18" charset="0"/>
+                          </a:rPr>
+                          <m:t>3</m:t>
+                        </m:r>
+                        <m:r>
+                          <a:rPr lang="en-US" i="1" dirty="0">
+                            <a:latin typeface="Cambria Math" panose="02040503050406030204" pitchFamily="18" charset="0"/>
+                          </a:rPr>
+                          <m:t>, … </m:t>
+                        </m:r>
+                        <m:r>
+                          <a:rPr lang="en-US" i="1" dirty="0">
+                            <a:latin typeface="Cambria Math" panose="02040503050406030204" pitchFamily="18" charset="0"/>
+                          </a:rPr>
+                          <m:t>𝑐𝑖</m:t>
+                        </m:r>
+                        <m:r>
+                          <a:rPr lang="en-US" i="1" dirty="0">
+                            <a:latin typeface="Cambria Math" panose="02040503050406030204" pitchFamily="18" charset="0"/>
+                          </a:rPr>
+                          <m:t>≥ </m:t>
+                        </m:r>
+                        <m:r>
+                          <a:rPr lang="en-US" i="1" dirty="0" err="1">
+                            <a:latin typeface="Cambria Math" panose="02040503050406030204" pitchFamily="18" charset="0"/>
+                          </a:rPr>
+                          <m:t>𝑐</m:t>
+                        </m:r>
+                        <m:r>
+                          <a:rPr lang="en-US" i="1" baseline="-25000" dirty="0" err="1">
+                            <a:latin typeface="Cambria Math" panose="02040503050406030204" pitchFamily="18" charset="0"/>
+                          </a:rPr>
+                          <m:t>𝑛</m:t>
+                        </m:r>
+                      </m:e>
+                    </m:d>
+                    <m:r>
+                      <a:rPr lang="en-US" i="1" dirty="0">
+                        <a:latin typeface="Cambria Math" panose="02040503050406030204" pitchFamily="18" charset="0"/>
+                      </a:rPr>
+                      <m:t> ∗</m:t>
+                    </m:r>
+                    <m:r>
+                      <a:rPr lang="en-US" i="1" dirty="0">
+                        <a:latin typeface="Cambria Math" panose="02040503050406030204" pitchFamily="18" charset="0"/>
+                      </a:rPr>
+                      <m:t>𝑃</m:t>
+                    </m:r>
+                    <m:d>
+                      <m:dPr>
+                        <m:ctrlPr>
+                          <a:rPr lang="en-US" i="1" dirty="0">
+                            <a:latin typeface="Cambria Math" panose="02040503050406030204" pitchFamily="18" charset="0"/>
+                          </a:rPr>
+                        </m:ctrlPr>
+                      </m:dPr>
+                      <m:e>
+                        <m:r>
+                          <a:rPr lang="en-US" i="1" dirty="0">
+                            <a:latin typeface="Cambria Math" panose="02040503050406030204" pitchFamily="18" charset="0"/>
+                          </a:rPr>
+                          <m:t>𝑐</m:t>
+                        </m:r>
+                        <m:r>
+                          <a:rPr lang="en-US" i="1" baseline="-25000" dirty="0">
+                            <a:latin typeface="Cambria Math" panose="02040503050406030204" pitchFamily="18" charset="0"/>
+                          </a:rPr>
+                          <m:t>𝑖</m:t>
+                        </m:r>
+                        <m:r>
+                          <a:rPr lang="en-US" i="1" dirty="0">
+                            <a:latin typeface="Cambria Math" panose="02040503050406030204" pitchFamily="18" charset="0"/>
+                          </a:rPr>
+                          <m:t>&gt;</m:t>
+                        </m:r>
+                        <m:r>
+                          <a:rPr lang="en-US" i="1" dirty="0">
+                            <a:latin typeface="Cambria Math" panose="02040503050406030204" pitchFamily="18" charset="0"/>
+                          </a:rPr>
+                          <m:t>𝑐</m:t>
+                        </m:r>
+                        <m:r>
+                          <a:rPr lang="en-US" b="0" i="1" baseline="-25000" dirty="0" smtClean="0">
+                            <a:latin typeface="Cambria Math" panose="02040503050406030204" pitchFamily="18" charset="0"/>
+                          </a:rPr>
+                          <m:t>2</m:t>
+                        </m:r>
+                        <m:r>
+                          <a:rPr lang="en-US" i="1" dirty="0">
+                            <a:latin typeface="Cambria Math" panose="02040503050406030204" pitchFamily="18" charset="0"/>
+                          </a:rPr>
+                          <m:t> |</m:t>
+                        </m:r>
+                        <m:r>
+                          <a:rPr lang="en-US" i="1" dirty="0">
+                            <a:latin typeface="Cambria Math" panose="02040503050406030204" pitchFamily="18" charset="0"/>
+                          </a:rPr>
+                          <m:t>𝑐</m:t>
+                        </m:r>
+                        <m:r>
+                          <a:rPr lang="en-US" i="1" baseline="-25000" dirty="0">
+                            <a:latin typeface="Cambria Math" panose="02040503050406030204" pitchFamily="18" charset="0"/>
+                          </a:rPr>
+                          <m:t>𝑖</m:t>
+                        </m:r>
+                        <m:r>
+                          <a:rPr lang="en-US" i="1" dirty="0">
+                            <a:latin typeface="Cambria Math" panose="02040503050406030204" pitchFamily="18" charset="0"/>
+                          </a:rPr>
+                          <m:t>≥ </m:t>
+                        </m:r>
+                        <m:r>
+                          <a:rPr lang="en-US" i="1" dirty="0">
+                            <a:latin typeface="Cambria Math" panose="02040503050406030204" pitchFamily="18" charset="0"/>
+                          </a:rPr>
+                          <m:t>𝑐</m:t>
+                        </m:r>
+                        <m:r>
+                          <a:rPr lang="en-US" b="0" i="1" baseline="-25000" dirty="0" smtClean="0">
+                            <a:latin typeface="Cambria Math" panose="02040503050406030204" pitchFamily="18" charset="0"/>
+                          </a:rPr>
+                          <m:t>3</m:t>
+                        </m:r>
+                        <m:r>
+                          <a:rPr lang="en-US" i="1" dirty="0">
+                            <a:latin typeface="Cambria Math" panose="02040503050406030204" pitchFamily="18" charset="0"/>
+                          </a:rPr>
+                          <m:t>, </m:t>
+                        </m:r>
+                        <m:r>
+                          <a:rPr lang="en-US" i="1" dirty="0">
+                            <a:latin typeface="Cambria Math" panose="02040503050406030204" pitchFamily="18" charset="0"/>
+                          </a:rPr>
+                          <m:t>𝑐𝑖</m:t>
+                        </m:r>
+                        <m:r>
+                          <a:rPr lang="en-US" i="1" dirty="0">
+                            <a:latin typeface="Cambria Math" panose="02040503050406030204" pitchFamily="18" charset="0"/>
+                          </a:rPr>
+                          <m:t>≥ </m:t>
+                        </m:r>
+                        <m:r>
+                          <a:rPr lang="en-US" i="1" dirty="0">
+                            <a:latin typeface="Cambria Math" panose="02040503050406030204" pitchFamily="18" charset="0"/>
+                          </a:rPr>
+                          <m:t>𝑐</m:t>
+                        </m:r>
+                        <m:r>
+                          <a:rPr lang="en-US" b="0" i="1" baseline="-25000" dirty="0" smtClean="0">
+                            <a:latin typeface="Cambria Math" panose="02040503050406030204" pitchFamily="18" charset="0"/>
+                          </a:rPr>
+                          <m:t>4</m:t>
+                        </m:r>
+                        <m:r>
+                          <a:rPr lang="en-US" i="1" dirty="0">
+                            <a:latin typeface="Cambria Math" panose="02040503050406030204" pitchFamily="18" charset="0"/>
+                          </a:rPr>
+                          <m:t>, … </m:t>
+                        </m:r>
+                        <m:r>
+                          <a:rPr lang="en-US" i="1" dirty="0">
+                            <a:latin typeface="Cambria Math" panose="02040503050406030204" pitchFamily="18" charset="0"/>
+                          </a:rPr>
+                          <m:t>𝑐𝑖</m:t>
+                        </m:r>
+                        <m:r>
+                          <a:rPr lang="en-US" i="1" dirty="0">
+                            <a:latin typeface="Cambria Math" panose="02040503050406030204" pitchFamily="18" charset="0"/>
+                          </a:rPr>
+                          <m:t>≥ </m:t>
+                        </m:r>
+                        <m:r>
+                          <a:rPr lang="en-US" i="1" dirty="0" err="1">
+                            <a:latin typeface="Cambria Math" panose="02040503050406030204" pitchFamily="18" charset="0"/>
+                          </a:rPr>
+                          <m:t>𝑐</m:t>
+                        </m:r>
+                        <m:r>
+                          <a:rPr lang="en-US" i="1" baseline="-25000" dirty="0" err="1">
+                            <a:latin typeface="Cambria Math" panose="02040503050406030204" pitchFamily="18" charset="0"/>
+                          </a:rPr>
+                          <m:t>𝑛</m:t>
+                        </m:r>
+                      </m:e>
+                    </m:d>
+                  </m:oMath>
+                </a14:m>
+                <a:r>
+                  <a:rPr lang="en-US" i="1" dirty="0">
+                    <a:latin typeface="Cambria Math" panose="02040503050406030204" pitchFamily="18" charset="0"/>
+                  </a:rPr>
+                  <a:t> * … * P(c</a:t>
+                </a:r>
+                <a:r>
+                  <a:rPr lang="en-US" i="1" baseline="-25000" dirty="0">
+                    <a:latin typeface="Cambria Math" panose="02040503050406030204" pitchFamily="18" charset="0"/>
+                  </a:rPr>
+                  <a:t>i</a:t>
+                </a:r>
+                <a:r>
+                  <a:rPr lang="en-US" i="1" dirty="0">
+                    <a:latin typeface="Cambria Math" panose="02040503050406030204" pitchFamily="18" charset="0"/>
+                  </a:rPr>
+                  <a:t> &gt; </a:t>
+                </a:r>
+                <a:r>
+                  <a:rPr lang="en-US" i="1" dirty="0" err="1">
+                    <a:latin typeface="Cambria Math" panose="02040503050406030204" pitchFamily="18" charset="0"/>
+                  </a:rPr>
+                  <a:t>c</a:t>
+                </a:r>
+                <a:r>
+                  <a:rPr lang="en-US" i="1" baseline="-25000" dirty="0" err="1">
+                    <a:latin typeface="Cambria Math" panose="02040503050406030204" pitchFamily="18" charset="0"/>
+                  </a:rPr>
+                  <a:t>n</a:t>
+                </a:r>
+                <a:r>
+                  <a:rPr lang="en-US" i="1" dirty="0">
+                    <a:latin typeface="Cambria Math" panose="02040503050406030204" pitchFamily="18" charset="0"/>
+                  </a:rPr>
+                  <a:t>)</a:t>
+                </a:r>
+              </a:p>
+              <a:p>
+                <a:pPr marL="0" indent="0">
+                  <a:buNone/>
+                </a:pPr>
+                <a:endParaRPr lang="en-US" i="1" dirty="0">
+                  <a:latin typeface="Cambria Math" panose="02040503050406030204" pitchFamily="18" charset="0"/>
+                </a:endParaRPr>
+              </a:p>
+              <a:p>
+                <a:pPr marL="0" indent="0">
+                  <a:buNone/>
+                </a:pPr>
+                <a:r>
+                  <a:rPr lang="en-US" dirty="0">
+                    <a:latin typeface="Cambria Math" panose="02040503050406030204" pitchFamily="18" charset="0"/>
+                  </a:rPr>
+                  <a:t>1) How to compute P(c</a:t>
+                </a:r>
+                <a:r>
+                  <a:rPr lang="en-US" baseline="-25000" dirty="0">
+                    <a:latin typeface="Cambria Math" panose="02040503050406030204" pitchFamily="18" charset="0"/>
+                  </a:rPr>
+                  <a:t>i</a:t>
+                </a:r>
+                <a:r>
+                  <a:rPr lang="en-US" dirty="0">
+                    <a:latin typeface="Cambria Math" panose="02040503050406030204" pitchFamily="18" charset="0"/>
+                  </a:rPr>
+                  <a:t> </a:t>
+                </a:r>
+                <a14:m>
+                  <m:oMath xmlns:m="http://schemas.openxmlformats.org/officeDocument/2006/math">
+                    <m:r>
+                      <a:rPr lang="en-US" i="1" dirty="0" smtClean="0">
+                        <a:latin typeface="Cambria Math" panose="02040503050406030204" pitchFamily="18" charset="0"/>
+                        <a:ea typeface="Cambria Math" panose="02040503050406030204" pitchFamily="18" charset="0"/>
+                      </a:rPr>
+                      <m:t>≥</m:t>
+                    </m:r>
+                  </m:oMath>
+                </a14:m>
+                <a:r>
+                  <a:rPr lang="en-US" dirty="0">
+                    <a:latin typeface="Cambria Math" panose="02040503050406030204" pitchFamily="18" charset="0"/>
+                  </a:rPr>
+                  <a:t> </a:t>
+                </a:r>
+                <a:r>
+                  <a:rPr lang="en-US" dirty="0" err="1">
+                    <a:latin typeface="Cambria Math" panose="02040503050406030204" pitchFamily="18" charset="0"/>
+                  </a:rPr>
+                  <a:t>c</a:t>
+                </a:r>
+                <a:r>
+                  <a:rPr lang="en-US" baseline="-25000" dirty="0" err="1">
+                    <a:latin typeface="Cambria Math" panose="02040503050406030204" pitchFamily="18" charset="0"/>
+                  </a:rPr>
+                  <a:t>j</a:t>
+                </a:r>
+                <a:r>
+                  <a:rPr lang="en-US" baseline="-25000" dirty="0">
+                    <a:latin typeface="Cambria Math" panose="02040503050406030204" pitchFamily="18" charset="0"/>
+                  </a:rPr>
+                  <a:t> </a:t>
+                </a:r>
+                <a:r>
+                  <a:rPr lang="en-US" dirty="0">
+                    <a:latin typeface="Cambria Math" panose="02040503050406030204" pitchFamily="18" charset="0"/>
+                  </a:rPr>
+                  <a:t>| c</a:t>
+                </a:r>
+                <a:r>
+                  <a:rPr lang="en-US" baseline="-25000" dirty="0">
+                    <a:latin typeface="Cambria Math" panose="02040503050406030204" pitchFamily="18" charset="0"/>
+                  </a:rPr>
+                  <a:t>i</a:t>
+                </a:r>
+                <a:r>
+                  <a:rPr lang="en-US" dirty="0">
+                    <a:latin typeface="Cambria Math" panose="02040503050406030204" pitchFamily="18" charset="0"/>
+                  </a:rPr>
+                  <a:t> </a:t>
+                </a:r>
+                <a14:m>
+                  <m:oMath xmlns:m="http://schemas.openxmlformats.org/officeDocument/2006/math">
+                    <m:r>
+                      <a:rPr lang="en-US" i="1" dirty="0">
+                        <a:latin typeface="Cambria Math" panose="02040503050406030204" pitchFamily="18" charset="0"/>
+                        <a:ea typeface="Cambria Math" panose="02040503050406030204" pitchFamily="18" charset="0"/>
+                      </a:rPr>
+                      <m:t>≥</m:t>
+                    </m:r>
+                  </m:oMath>
+                </a14:m>
+                <a:r>
+                  <a:rPr lang="en-US" dirty="0">
+                    <a:latin typeface="Cambria Math" panose="02040503050406030204" pitchFamily="18" charset="0"/>
+                  </a:rPr>
+                  <a:t> c</a:t>
+                </a:r>
+                <a:r>
+                  <a:rPr lang="en-US" baseline="-25000" dirty="0">
+                    <a:latin typeface="Cambria Math" panose="02040503050406030204" pitchFamily="18" charset="0"/>
+                  </a:rPr>
+                  <a:t>j+1</a:t>
+                </a:r>
+                <a:r>
+                  <a:rPr lang="en-US" dirty="0">
+                    <a:latin typeface="Cambria Math" panose="02040503050406030204" pitchFamily="18" charset="0"/>
+                  </a:rPr>
+                  <a:t>, c</a:t>
+                </a:r>
+                <a:r>
+                  <a:rPr lang="en-US" baseline="-25000" dirty="0">
+                    <a:latin typeface="Cambria Math" panose="02040503050406030204" pitchFamily="18" charset="0"/>
+                  </a:rPr>
+                  <a:t>i</a:t>
+                </a:r>
+                <a:r>
+                  <a:rPr lang="en-US" dirty="0">
+                    <a:latin typeface="Cambria Math" panose="02040503050406030204" pitchFamily="18" charset="0"/>
+                  </a:rPr>
+                  <a:t> </a:t>
+                </a:r>
+                <a14:m>
+                  <m:oMath xmlns:m="http://schemas.openxmlformats.org/officeDocument/2006/math">
+                    <m:r>
+                      <a:rPr lang="en-US" i="1" dirty="0">
+                        <a:latin typeface="Cambria Math" panose="02040503050406030204" pitchFamily="18" charset="0"/>
+                        <a:ea typeface="Cambria Math" panose="02040503050406030204" pitchFamily="18" charset="0"/>
+                      </a:rPr>
+                      <m:t>≥</m:t>
+                    </m:r>
+                  </m:oMath>
+                </a14:m>
+                <a:r>
+                  <a:rPr lang="en-US" dirty="0">
+                    <a:latin typeface="Cambria Math" panose="02040503050406030204" pitchFamily="18" charset="0"/>
+                  </a:rPr>
+                  <a:t> </a:t>
+                </a:r>
+                <a:r>
+                  <a:rPr lang="en-US" dirty="0" err="1">
+                    <a:latin typeface="Cambria Math" panose="02040503050406030204" pitchFamily="18" charset="0"/>
+                  </a:rPr>
+                  <a:t>c</a:t>
+                </a:r>
+                <a:r>
+                  <a:rPr lang="en-US" baseline="-25000" dirty="0" err="1">
+                    <a:latin typeface="Cambria Math" panose="02040503050406030204" pitchFamily="18" charset="0"/>
+                  </a:rPr>
+                  <a:t>j</a:t>
+                </a:r>
+                <a:r>
+                  <a:rPr lang="en-US" baseline="-25000" dirty="0">
+                    <a:latin typeface="Cambria Math" panose="02040503050406030204" pitchFamily="18" charset="0"/>
+                  </a:rPr>
+                  <a:t> + 2</a:t>
+                </a:r>
+                <a:r>
+                  <a:rPr lang="en-US" dirty="0">
+                    <a:latin typeface="Cambria Math" panose="02040503050406030204" pitchFamily="18" charset="0"/>
+                  </a:rPr>
+                  <a:t>, … c</a:t>
+                </a:r>
+                <a:r>
+                  <a:rPr lang="en-US" baseline="-25000" dirty="0">
+                    <a:latin typeface="Cambria Math" panose="02040503050406030204" pitchFamily="18" charset="0"/>
+                  </a:rPr>
+                  <a:t>i</a:t>
+                </a:r>
+                <a:r>
+                  <a:rPr lang="en-US" dirty="0">
+                    <a:latin typeface="Cambria Math" panose="02040503050406030204" pitchFamily="18" charset="0"/>
+                  </a:rPr>
+                  <a:t> </a:t>
+                </a:r>
+                <a14:m>
+                  <m:oMath xmlns:m="http://schemas.openxmlformats.org/officeDocument/2006/math">
+                    <m:r>
+                      <a:rPr lang="en-US" i="1" dirty="0">
+                        <a:latin typeface="Cambria Math" panose="02040503050406030204" pitchFamily="18" charset="0"/>
+                        <a:ea typeface="Cambria Math" panose="02040503050406030204" pitchFamily="18" charset="0"/>
+                      </a:rPr>
+                      <m:t>≥</m:t>
+                    </m:r>
+                  </m:oMath>
+                </a14:m>
+                <a:r>
+                  <a:rPr lang="en-US" dirty="0">
+                    <a:latin typeface="Cambria Math" panose="02040503050406030204" pitchFamily="18" charset="0"/>
+                  </a:rPr>
+                  <a:t> </a:t>
+                </a:r>
+                <a:r>
+                  <a:rPr lang="en-US" dirty="0" err="1">
+                    <a:latin typeface="Cambria Math" panose="02040503050406030204" pitchFamily="18" charset="0"/>
+                  </a:rPr>
+                  <a:t>c</a:t>
+                </a:r>
+                <a:r>
+                  <a:rPr lang="en-US" baseline="-25000" dirty="0" err="1">
+                    <a:latin typeface="Cambria Math" panose="02040503050406030204" pitchFamily="18" charset="0"/>
+                  </a:rPr>
+                  <a:t>n</a:t>
+                </a:r>
+                <a:r>
+                  <a:rPr lang="en-US" dirty="0">
+                    <a:latin typeface="Cambria Math" panose="02040503050406030204" pitchFamily="18" charset="0"/>
+                  </a:rPr>
+                  <a:t>)?</a:t>
+                </a:r>
+              </a:p>
+              <a:p>
+                <a:pPr marL="0" indent="0">
+                  <a:buNone/>
+                </a:pPr>
+                <a:r>
+                  <a:rPr lang="en-US" dirty="0">
+                    <a:latin typeface="Cambria Math" panose="02040503050406030204" pitchFamily="18" charset="0"/>
+                  </a:rPr>
+                  <a:t>2) How to compute P(c</a:t>
+                </a:r>
+                <a:r>
+                  <a:rPr lang="en-US" baseline="-25000" dirty="0">
+                    <a:latin typeface="Cambria Math" panose="02040503050406030204" pitchFamily="18" charset="0"/>
+                  </a:rPr>
+                  <a:t>i</a:t>
+                </a:r>
+                <a:r>
+                  <a:rPr lang="en-US" dirty="0">
+                    <a:latin typeface="Cambria Math" panose="02040503050406030204" pitchFamily="18" charset="0"/>
+                  </a:rPr>
+                  <a:t> </a:t>
+                </a:r>
+                <a14:m>
+                  <m:oMath xmlns:m="http://schemas.openxmlformats.org/officeDocument/2006/math">
+                    <m:r>
+                      <a:rPr lang="en-US" i="1" dirty="0" smtClean="0">
+                        <a:latin typeface="Cambria Math" panose="02040503050406030204" pitchFamily="18" charset="0"/>
+                        <a:ea typeface="Cambria Math" panose="02040503050406030204" pitchFamily="18" charset="0"/>
+                      </a:rPr>
+                      <m:t>≥</m:t>
+                    </m:r>
+                  </m:oMath>
+                </a14:m>
+                <a:r>
+                  <a:rPr lang="en-US" dirty="0">
+                    <a:latin typeface="Cambria Math" panose="02040503050406030204" pitchFamily="18" charset="0"/>
+                  </a:rPr>
+                  <a:t> </a:t>
+                </a:r>
+                <a:r>
+                  <a:rPr lang="en-US" dirty="0" err="1">
+                    <a:latin typeface="Cambria Math" panose="02040503050406030204" pitchFamily="18" charset="0"/>
+                  </a:rPr>
+                  <a:t>c</a:t>
+                </a:r>
+                <a:r>
+                  <a:rPr lang="en-US" baseline="-25000" dirty="0" err="1">
+                    <a:latin typeface="Cambria Math" panose="02040503050406030204" pitchFamily="18" charset="0"/>
+                  </a:rPr>
+                  <a:t>j</a:t>
+                </a:r>
+                <a:r>
+                  <a:rPr lang="en-US" baseline="-25000" dirty="0">
+                    <a:latin typeface="Cambria Math" panose="02040503050406030204" pitchFamily="18" charset="0"/>
+                  </a:rPr>
+                  <a:t> </a:t>
+                </a:r>
+                <a:r>
+                  <a:rPr lang="en-US" dirty="0">
+                    <a:latin typeface="Cambria Math" panose="02040503050406030204" pitchFamily="18" charset="0"/>
+                  </a:rPr>
+                  <a:t>)?</a:t>
+                </a:r>
+              </a:p>
+              <a:p>
+                <a:pPr marL="0" indent="0">
+                  <a:buNone/>
+                </a:pPr>
+                <a14:m>
+                  <m:oMathPara xmlns:m="http://schemas.openxmlformats.org/officeDocument/2006/math">
+                    <m:oMathParaPr>
+                      <m:jc m:val="centerGroup"/>
+                    </m:oMathParaPr>
+                    <m:oMath xmlns:m="http://schemas.openxmlformats.org/officeDocument/2006/math">
+                      <m:r>
+                        <a:rPr lang="en-US" i="1" dirty="0" smtClean="0">
+                          <a:latin typeface="Cambria Math" panose="02040503050406030204" pitchFamily="18" charset="0"/>
+                        </a:rPr>
+                        <m:t> </m:t>
+                      </m:r>
+                      <m:r>
+                        <a:rPr lang="en-US" i="1" dirty="0" smtClean="0">
+                          <a:latin typeface="Cambria Math" panose="02040503050406030204" pitchFamily="18" charset="0"/>
+                        </a:rPr>
+                        <m:t> </m:t>
+                      </m:r>
+                    </m:oMath>
+                  </m:oMathPara>
+                </a14:m>
+                <a:endParaRPr lang="en-US" dirty="0"/>
+              </a:p>
+            </p:txBody>
+          </p:sp>
+        </mc:Choice>
+        <mc:Fallback>
+          <p:sp>
+            <p:nvSpPr>
+              <p:cNvPr id="3" name="Content Placeholder 2">
+                <a:extLst>
+                  <a:ext uri="{FF2B5EF4-FFF2-40B4-BE49-F238E27FC236}">
+                    <a16:creationId xmlns:a16="http://schemas.microsoft.com/office/drawing/2014/main" id="{5DF251DC-4F64-5D48-6C5F-F604B6F609CD}"/>
+                  </a:ext>
+                </a:extLst>
+              </p:cNvPr>
+              <p:cNvSpPr>
+                <a:spLocks noGrp="1" noRot="1" noChangeAspect="1" noMove="1" noResize="1" noEditPoints="1" noAdjustHandles="1" noChangeArrowheads="1" noChangeShapeType="1" noTextEdit="1"/>
+              </p:cNvSpPr>
+              <p:nvPr>
+                <p:ph idx="1"/>
+              </p:nvPr>
+            </p:nvSpPr>
+            <p:spPr>
+              <a:xfrm>
+                <a:off x="371475" y="1325562"/>
+                <a:ext cx="11315700" cy="5318125"/>
+              </a:xfrm>
+              <a:blipFill>
+                <a:blip r:embed="rId2"/>
+                <a:stretch>
+                  <a:fillRect l="-1682" r="-112"/>
+                </a:stretch>
+              </a:blipFill>
+            </p:spPr>
+            <p:txBody>
+              <a:bodyPr/>
+              <a:lstStyle/>
+              <a:p>
+                <a:r>
+                  <a:rPr lang="en-US">
+                    <a:noFill/>
+                  </a:rPr>
+                  <a:t> </a:t>
+                </a:r>
+              </a:p>
+            </p:txBody>
+          </p:sp>
+        </mc:Fallback>
+      </mc:AlternateContent>
+      <p:pic>
+        <p:nvPicPr>
+          <p:cNvPr id="5" name="Picture 4" descr="A math equation with symbols&#10;&#10;Description automatically generated with medium confidence">
+            <a:extLst>
+              <a:ext uri="{FF2B5EF4-FFF2-40B4-BE49-F238E27FC236}">
+                <a16:creationId xmlns:a16="http://schemas.microsoft.com/office/drawing/2014/main" id="{CF0C983C-4493-BEC5-0954-5598B6140F87}"/>
+              </a:ext>
+            </a:extLst>
+          </p:cNvPr>
+          <p:cNvPicPr>
+            <a:picLocks noChangeAspect="1"/>
+          </p:cNvPicPr>
+          <p:nvPr/>
+        </p:nvPicPr>
+        <p:blipFill>
+          <a:blip r:embed="rId3"/>
+          <a:stretch>
+            <a:fillRect/>
+          </a:stretch>
+        </p:blipFill>
+        <p:spPr>
+          <a:xfrm>
+            <a:off x="371475" y="927101"/>
+            <a:ext cx="4737100" cy="1219200"/>
+          </a:xfrm>
+          <a:prstGeom prst="rect">
+            <a:avLst/>
+          </a:prstGeom>
+        </p:spPr>
+      </p:pic>
+    </p:spTree>
+    <p:extLst>
+      <p:ext uri="{BB962C8B-B14F-4D97-AF65-F5344CB8AC3E}">
+        <p14:creationId xmlns:p14="http://schemas.microsoft.com/office/powerpoint/2010/main" val="3313022365"/>
+      </p:ext>
+    </p:extLst>
+  </p:cSld>
+  <p:clrMapOvr>
+    <a:masterClrMapping/>
+  </p:clrMapOvr>
+</p:sld>
+</file>
+
+<file path=ppt/slides/slide25.xml><?xml version="1.0" encoding="utf-8"?>
+<p:sld xmlns:a="http://schemas.openxmlformats.org/drawingml/2006/main" xmlns:r="http://schemas.openxmlformats.org/officeDocument/2006/relationships" xmlns:p="http://schemas.openxmlformats.org/presentationml/2006/main">
+  <p:cSld>
+    <p:spTree>
+      <p:nvGrpSpPr>
+        <p:cNvPr id="1" name=""/>
+        <p:cNvGrpSpPr/>
+        <p:nvPr/>
+      </p:nvGrpSpPr>
+      <p:grpSpPr>
+        <a:xfrm>
+          <a:off x="0" y="0"/>
+          <a:ext cx="0" cy="0"/>
+          <a:chOff x="0" y="0"/>
+          <a:chExt cx="0" cy="0"/>
+        </a:xfrm>
+      </p:grpSpPr>
+      <p:sp>
+        <p:nvSpPr>
+          <p:cNvPr id="2" name="Title 1">
+            <a:extLst>
+              <a:ext uri="{FF2B5EF4-FFF2-40B4-BE49-F238E27FC236}">
+                <a16:creationId xmlns:a16="http://schemas.microsoft.com/office/drawing/2014/main" id="{88ABCA84-F0B3-F083-35FC-6C2D94DF3B07}"/>
+              </a:ext>
+            </a:extLst>
+          </p:cNvPr>
+          <p:cNvSpPr>
+            <a:spLocks noGrp="1"/>
+          </p:cNvSpPr>
+          <p:nvPr>
+            <p:ph type="title"/>
+          </p:nvPr>
+        </p:nvSpPr>
+        <p:spPr>
+          <a:xfrm>
+            <a:off x="838199" y="-205582"/>
+            <a:ext cx="10515600" cy="1325563"/>
+          </a:xfrm>
+        </p:spPr>
+        <p:txBody>
+          <a:bodyPr/>
+          <a:lstStyle/>
+          <a:p>
+            <a:pPr algn="ctr"/>
+            <a:r>
+              <a:rPr lang="en-US" dirty="0"/>
+              <a:t>Entropy</a:t>
+            </a:r>
+          </a:p>
+        </p:txBody>
+      </p:sp>
+      <mc:AlternateContent xmlns:mc="http://schemas.openxmlformats.org/markup-compatibility/2006">
+        <mc:Choice xmlns:a14="http://schemas.microsoft.com/office/drawing/2010/main" Requires="a14">
+          <p:sp>
+            <p:nvSpPr>
+              <p:cNvPr id="3" name="Content Placeholder 2">
+                <a:extLst>
+                  <a:ext uri="{FF2B5EF4-FFF2-40B4-BE49-F238E27FC236}">
+                    <a16:creationId xmlns:a16="http://schemas.microsoft.com/office/drawing/2014/main" id="{5DF251DC-4F64-5D48-6C5F-F604B6F609CD}"/>
+                  </a:ext>
+                </a:extLst>
+              </p:cNvPr>
+              <p:cNvSpPr>
+                <a:spLocks noGrp="1"/>
+              </p:cNvSpPr>
+              <p:nvPr>
+                <p:ph idx="1"/>
+              </p:nvPr>
+            </p:nvSpPr>
+            <p:spPr>
+              <a:xfrm>
+                <a:off x="185738" y="882650"/>
+                <a:ext cx="12006262" cy="5318125"/>
+              </a:xfrm>
+            </p:spPr>
+            <p:txBody>
+              <a:bodyPr>
+                <a:normAutofit/>
+              </a:bodyPr>
+              <a:lstStyle/>
+              <a:p>
+                <a:pPr marL="0" indent="0">
+                  <a:buNone/>
+                </a:pPr>
+                <a:endParaRPr lang="en-US" i="1" dirty="0">
+                  <a:latin typeface="Cambria Math" panose="02040503050406030204" pitchFamily="18" charset="0"/>
+                </a:endParaRPr>
+              </a:p>
+              <a:p>
+                <a:pPr marL="514350" indent="-514350">
+                  <a:buAutoNum type="arabicParenR"/>
+                </a:pPr>
+                <a:r>
+                  <a:rPr lang="en-US" dirty="0">
+                    <a:latin typeface="Cambria Math" panose="02040503050406030204" pitchFamily="18" charset="0"/>
+                  </a:rPr>
+                  <a:t>How to compute P(c</a:t>
+                </a:r>
+                <a:r>
+                  <a:rPr lang="en-US" baseline="-25000" dirty="0">
+                    <a:latin typeface="Cambria Math" panose="02040503050406030204" pitchFamily="18" charset="0"/>
+                  </a:rPr>
+                  <a:t>i</a:t>
+                </a:r>
+                <a:r>
+                  <a:rPr lang="en-US" dirty="0">
+                    <a:latin typeface="Cambria Math" panose="02040503050406030204" pitchFamily="18" charset="0"/>
+                  </a:rPr>
+                  <a:t> </a:t>
+                </a:r>
+                <a14:m>
+                  <m:oMath xmlns:m="http://schemas.openxmlformats.org/officeDocument/2006/math">
+                    <m:r>
+                      <a:rPr lang="en-US" i="1" dirty="0" smtClean="0">
+                        <a:latin typeface="Cambria Math" panose="02040503050406030204" pitchFamily="18" charset="0"/>
+                        <a:ea typeface="Cambria Math" panose="02040503050406030204" pitchFamily="18" charset="0"/>
+                      </a:rPr>
+                      <m:t>≥</m:t>
+                    </m:r>
+                  </m:oMath>
+                </a14:m>
+                <a:r>
+                  <a:rPr lang="en-US" dirty="0">
+                    <a:latin typeface="Cambria Math" panose="02040503050406030204" pitchFamily="18" charset="0"/>
+                  </a:rPr>
+                  <a:t> </a:t>
+                </a:r>
+                <a:r>
+                  <a:rPr lang="en-US" dirty="0" err="1">
+                    <a:latin typeface="Cambria Math" panose="02040503050406030204" pitchFamily="18" charset="0"/>
+                  </a:rPr>
+                  <a:t>c</a:t>
+                </a:r>
+                <a:r>
+                  <a:rPr lang="en-US" baseline="-25000" dirty="0" err="1">
+                    <a:latin typeface="Cambria Math" panose="02040503050406030204" pitchFamily="18" charset="0"/>
+                  </a:rPr>
+                  <a:t>j</a:t>
+                </a:r>
+                <a:r>
+                  <a:rPr lang="en-US" baseline="-25000" dirty="0">
+                    <a:latin typeface="Cambria Math" panose="02040503050406030204" pitchFamily="18" charset="0"/>
+                  </a:rPr>
+                  <a:t> </a:t>
+                </a:r>
+                <a:r>
+                  <a:rPr lang="en-US" dirty="0">
+                    <a:latin typeface="Cambria Math" panose="02040503050406030204" pitchFamily="18" charset="0"/>
+                  </a:rPr>
+                  <a:t>| c</a:t>
+                </a:r>
+                <a:r>
+                  <a:rPr lang="en-US" baseline="-25000" dirty="0">
+                    <a:latin typeface="Cambria Math" panose="02040503050406030204" pitchFamily="18" charset="0"/>
+                  </a:rPr>
+                  <a:t>i</a:t>
+                </a:r>
+                <a:r>
+                  <a:rPr lang="en-US" dirty="0">
+                    <a:latin typeface="Cambria Math" panose="02040503050406030204" pitchFamily="18" charset="0"/>
+                  </a:rPr>
+                  <a:t> </a:t>
+                </a:r>
+                <a14:m>
+                  <m:oMath xmlns:m="http://schemas.openxmlformats.org/officeDocument/2006/math">
+                    <m:r>
+                      <a:rPr lang="en-US" i="1" dirty="0">
+                        <a:latin typeface="Cambria Math" panose="02040503050406030204" pitchFamily="18" charset="0"/>
+                        <a:ea typeface="Cambria Math" panose="02040503050406030204" pitchFamily="18" charset="0"/>
+                      </a:rPr>
+                      <m:t>≥</m:t>
+                    </m:r>
+                  </m:oMath>
+                </a14:m>
+                <a:r>
+                  <a:rPr lang="en-US" dirty="0">
+                    <a:latin typeface="Cambria Math" panose="02040503050406030204" pitchFamily="18" charset="0"/>
+                  </a:rPr>
+                  <a:t> c</a:t>
+                </a:r>
+                <a:r>
+                  <a:rPr lang="en-US" baseline="-25000" dirty="0">
+                    <a:latin typeface="Cambria Math" panose="02040503050406030204" pitchFamily="18" charset="0"/>
+                  </a:rPr>
+                  <a:t>j+1</a:t>
+                </a:r>
+                <a:r>
+                  <a:rPr lang="en-US" dirty="0">
+                    <a:latin typeface="Cambria Math" panose="02040503050406030204" pitchFamily="18" charset="0"/>
+                  </a:rPr>
+                  <a:t>, c</a:t>
+                </a:r>
+                <a:r>
+                  <a:rPr lang="en-US" baseline="-25000" dirty="0">
+                    <a:latin typeface="Cambria Math" panose="02040503050406030204" pitchFamily="18" charset="0"/>
+                  </a:rPr>
+                  <a:t>i</a:t>
+                </a:r>
+                <a:r>
+                  <a:rPr lang="en-US" dirty="0">
+                    <a:latin typeface="Cambria Math" panose="02040503050406030204" pitchFamily="18" charset="0"/>
+                  </a:rPr>
+                  <a:t> </a:t>
+                </a:r>
+                <a14:m>
+                  <m:oMath xmlns:m="http://schemas.openxmlformats.org/officeDocument/2006/math">
+                    <m:r>
+                      <a:rPr lang="en-US" i="1" dirty="0">
+                        <a:latin typeface="Cambria Math" panose="02040503050406030204" pitchFamily="18" charset="0"/>
+                        <a:ea typeface="Cambria Math" panose="02040503050406030204" pitchFamily="18" charset="0"/>
+                      </a:rPr>
+                      <m:t>≥</m:t>
+                    </m:r>
+                  </m:oMath>
+                </a14:m>
+                <a:r>
+                  <a:rPr lang="en-US" dirty="0">
+                    <a:latin typeface="Cambria Math" panose="02040503050406030204" pitchFamily="18" charset="0"/>
+                  </a:rPr>
+                  <a:t> </a:t>
+                </a:r>
+                <a:r>
+                  <a:rPr lang="en-US" dirty="0" err="1">
+                    <a:latin typeface="Cambria Math" panose="02040503050406030204" pitchFamily="18" charset="0"/>
+                  </a:rPr>
+                  <a:t>c</a:t>
+                </a:r>
+                <a:r>
+                  <a:rPr lang="en-US" baseline="-25000" dirty="0" err="1">
+                    <a:latin typeface="Cambria Math" panose="02040503050406030204" pitchFamily="18" charset="0"/>
+                  </a:rPr>
+                  <a:t>j</a:t>
+                </a:r>
+                <a:r>
+                  <a:rPr lang="en-US" baseline="-25000" dirty="0">
+                    <a:latin typeface="Cambria Math" panose="02040503050406030204" pitchFamily="18" charset="0"/>
+                  </a:rPr>
+                  <a:t> + 2</a:t>
+                </a:r>
+                <a:r>
+                  <a:rPr lang="en-US" dirty="0">
+                    <a:latin typeface="Cambria Math" panose="02040503050406030204" pitchFamily="18" charset="0"/>
+                  </a:rPr>
+                  <a:t>, … c</a:t>
+                </a:r>
+                <a:r>
+                  <a:rPr lang="en-US" baseline="-25000" dirty="0">
+                    <a:latin typeface="Cambria Math" panose="02040503050406030204" pitchFamily="18" charset="0"/>
+                  </a:rPr>
+                  <a:t>i</a:t>
+                </a:r>
+                <a:r>
+                  <a:rPr lang="en-US" dirty="0">
+                    <a:latin typeface="Cambria Math" panose="02040503050406030204" pitchFamily="18" charset="0"/>
+                  </a:rPr>
+                  <a:t> </a:t>
+                </a:r>
+                <a14:m>
+                  <m:oMath xmlns:m="http://schemas.openxmlformats.org/officeDocument/2006/math">
+                    <m:r>
+                      <a:rPr lang="en-US" i="1" dirty="0">
+                        <a:latin typeface="Cambria Math" panose="02040503050406030204" pitchFamily="18" charset="0"/>
+                        <a:ea typeface="Cambria Math" panose="02040503050406030204" pitchFamily="18" charset="0"/>
+                      </a:rPr>
+                      <m:t>≥</m:t>
+                    </m:r>
+                  </m:oMath>
+                </a14:m>
+                <a:r>
+                  <a:rPr lang="en-US" dirty="0">
+                    <a:latin typeface="Cambria Math" panose="02040503050406030204" pitchFamily="18" charset="0"/>
+                  </a:rPr>
+                  <a:t> </a:t>
+                </a:r>
+                <a:r>
+                  <a:rPr lang="en-US" dirty="0" err="1">
+                    <a:latin typeface="Cambria Math" panose="02040503050406030204" pitchFamily="18" charset="0"/>
+                  </a:rPr>
+                  <a:t>c</a:t>
+                </a:r>
+                <a:r>
+                  <a:rPr lang="en-US" baseline="-25000" dirty="0" err="1">
+                    <a:latin typeface="Cambria Math" panose="02040503050406030204" pitchFamily="18" charset="0"/>
+                  </a:rPr>
+                  <a:t>n</a:t>
+                </a:r>
+                <a:r>
+                  <a:rPr lang="en-US" dirty="0">
+                    <a:latin typeface="Cambria Math" panose="02040503050406030204" pitchFamily="18" charset="0"/>
+                  </a:rPr>
+                  <a:t>)?</a:t>
+                </a:r>
+              </a:p>
+              <a:p>
+                <a:pPr marL="457200" lvl="1" indent="0">
+                  <a:buNone/>
+                </a:pPr>
+                <a:r>
+                  <a:rPr lang="en-US" dirty="0">
+                    <a:latin typeface="Cambria Math" panose="02040503050406030204" pitchFamily="18" charset="0"/>
+                  </a:rPr>
+                  <a:t>N*m*m table (N dimensional)</a:t>
+                </a:r>
+              </a:p>
+              <a:p>
+                <a:pPr marL="457200" lvl="1" indent="0">
+                  <a:buNone/>
+                </a:pPr>
+                <a:r>
+                  <a:rPr lang="en-US" dirty="0">
+                    <a:latin typeface="Cambria Math" panose="02040503050406030204" pitchFamily="18" charset="0"/>
+                  </a:rPr>
+                  <a:t>Green region = (LB, UB)</a:t>
+                </a:r>
+                <a:r>
+                  <a:rPr lang="en-US" baseline="-25000" dirty="0">
+                    <a:latin typeface="Cambria Math" panose="02040503050406030204" pitchFamily="18" charset="0"/>
+                  </a:rPr>
+                  <a:t>c1</a:t>
+                </a:r>
+                <a:r>
+                  <a:rPr lang="en-US" dirty="0">
+                    <a:latin typeface="Cambria Math" panose="02040503050406030204" pitchFamily="18" charset="0"/>
+                  </a:rPr>
+                  <a:t> </a:t>
+                </a:r>
+                <a14:m>
+                  <m:oMath xmlns:m="http://schemas.openxmlformats.org/officeDocument/2006/math">
+                    <m:r>
+                      <a:rPr lang="en-US" i="1" smtClean="0">
+                        <a:latin typeface="Cambria Math" panose="02040503050406030204" pitchFamily="18" charset="0"/>
+                        <a:ea typeface="Cambria Math" panose="02040503050406030204" pitchFamily="18" charset="0"/>
+                      </a:rPr>
+                      <m:t>∩</m:t>
+                    </m:r>
+                    <m:r>
+                      <a:rPr lang="en-US" b="0" i="1" smtClean="0">
+                        <a:latin typeface="Cambria Math" panose="02040503050406030204" pitchFamily="18" charset="0"/>
+                        <a:ea typeface="Cambria Math" panose="02040503050406030204" pitchFamily="18" charset="0"/>
+                      </a:rPr>
+                      <m:t> </m:t>
+                    </m:r>
+                  </m:oMath>
+                </a14:m>
+                <a:r>
+                  <a:rPr lang="en-US" dirty="0">
+                    <a:latin typeface="Cambria Math" panose="02040503050406030204" pitchFamily="18" charset="0"/>
+                  </a:rPr>
+                  <a:t>(LB, UB)</a:t>
+                </a:r>
+                <a:r>
+                  <a:rPr lang="en-US" baseline="-25000" dirty="0">
+                    <a:latin typeface="Cambria Math" panose="02040503050406030204" pitchFamily="18" charset="0"/>
+                  </a:rPr>
+                  <a:t>c2</a:t>
+                </a:r>
+                <a:r>
+                  <a:rPr lang="en-US" dirty="0">
+                    <a:latin typeface="Cambria Math" panose="02040503050406030204" pitchFamily="18" charset="0"/>
+                  </a:rPr>
+                  <a:t> </a:t>
+                </a:r>
+                <a14:m>
+                  <m:oMath xmlns:m="http://schemas.openxmlformats.org/officeDocument/2006/math">
+                    <m:r>
+                      <a:rPr lang="en-US" i="1">
+                        <a:latin typeface="Cambria Math" panose="02040503050406030204" pitchFamily="18" charset="0"/>
+                        <a:ea typeface="Cambria Math" panose="02040503050406030204" pitchFamily="18" charset="0"/>
+                      </a:rPr>
+                      <m:t>∩</m:t>
+                    </m:r>
+                    <m:r>
+                      <a:rPr lang="en-US" b="0" i="1" smtClean="0">
+                        <a:latin typeface="Cambria Math" panose="02040503050406030204" pitchFamily="18" charset="0"/>
+                        <a:ea typeface="Cambria Math" panose="02040503050406030204" pitchFamily="18" charset="0"/>
+                      </a:rPr>
+                      <m:t>…</m:t>
+                    </m:r>
+                    <m:r>
+                      <a:rPr lang="en-US" i="1">
+                        <a:latin typeface="Cambria Math" panose="02040503050406030204" pitchFamily="18" charset="0"/>
+                        <a:ea typeface="Cambria Math" panose="02040503050406030204" pitchFamily="18" charset="0"/>
+                      </a:rPr>
+                      <m:t>∩</m:t>
+                    </m:r>
+                    <m:r>
+                      <m:rPr>
+                        <m:nor/>
+                      </m:rPr>
+                      <a:rPr lang="en-US" dirty="0">
+                        <a:latin typeface="Cambria Math" panose="02040503050406030204" pitchFamily="18" charset="0"/>
+                      </a:rPr>
+                      <m:t>(</m:t>
+                    </m:r>
+                    <m:r>
+                      <m:rPr>
+                        <m:nor/>
+                      </m:rPr>
+                      <a:rPr lang="en-US" dirty="0">
+                        <a:latin typeface="Cambria Math" panose="02040503050406030204" pitchFamily="18" charset="0"/>
+                      </a:rPr>
+                      <m:t>LB</m:t>
+                    </m:r>
+                    <m:r>
+                      <m:rPr>
+                        <m:nor/>
+                      </m:rPr>
+                      <a:rPr lang="en-US" dirty="0">
+                        <a:latin typeface="Cambria Math" panose="02040503050406030204" pitchFamily="18" charset="0"/>
+                      </a:rPr>
+                      <m:t>, </m:t>
+                    </m:r>
+                    <m:r>
+                      <m:rPr>
+                        <m:nor/>
+                      </m:rPr>
+                      <a:rPr lang="en-US" dirty="0">
+                        <a:latin typeface="Cambria Math" panose="02040503050406030204" pitchFamily="18" charset="0"/>
+                      </a:rPr>
+                      <m:t>UB</m:t>
+                    </m:r>
+                    <m:r>
+                      <m:rPr>
+                        <m:nor/>
+                      </m:rPr>
+                      <a:rPr lang="en-US" dirty="0">
+                        <a:latin typeface="Cambria Math" panose="02040503050406030204" pitchFamily="18" charset="0"/>
+                      </a:rPr>
+                      <m:t>)</m:t>
+                    </m:r>
+                    <m:r>
+                      <m:rPr>
+                        <m:nor/>
+                      </m:rPr>
+                      <a:rPr lang="en-US" baseline="-25000" dirty="0">
+                        <a:latin typeface="Cambria Math" panose="02040503050406030204" pitchFamily="18" charset="0"/>
+                      </a:rPr>
+                      <m:t>c</m:t>
+                    </m:r>
+                    <m:r>
+                      <m:rPr>
+                        <m:nor/>
+                      </m:rPr>
+                      <a:rPr lang="en-US" b="0" i="0" baseline="-25000" dirty="0" smtClean="0">
+                        <a:latin typeface="Cambria Math" panose="02040503050406030204" pitchFamily="18" charset="0"/>
+                      </a:rPr>
+                      <m:t>n</m:t>
+                    </m:r>
+                  </m:oMath>
+                </a14:m>
+                <a:r>
+                  <a:rPr lang="en-US" dirty="0">
+                    <a:latin typeface="Cambria Math" panose="02040503050406030204" pitchFamily="18" charset="0"/>
+                  </a:rPr>
+                  <a:t> </a:t>
+                </a:r>
+                <a14:m>
+                  <m:oMath xmlns:m="http://schemas.openxmlformats.org/officeDocument/2006/math">
+                    <m:r>
+                      <a:rPr lang="en-US" i="1">
+                        <a:latin typeface="Cambria Math" panose="02040503050406030204" pitchFamily="18" charset="0"/>
+                        <a:ea typeface="Cambria Math" panose="02040503050406030204" pitchFamily="18" charset="0"/>
+                      </a:rPr>
+                      <m:t>∩ </m:t>
+                    </m:r>
+                  </m:oMath>
+                </a14:m>
+                <a:r>
+                  <a:rPr lang="en-US" dirty="0">
+                    <a:latin typeface="Cambria Math" panose="02040503050406030204" pitchFamily="18" charset="0"/>
+                  </a:rPr>
+                  <a:t> </a:t>
+                </a:r>
+                <a:r>
+                  <a:rPr lang="en-US" dirty="0">
+                    <a:solidFill>
+                      <a:schemeClr val="accent6">
+                        <a:lumMod val="75000"/>
+                      </a:schemeClr>
+                    </a:solidFill>
+                    <a:latin typeface="Cambria Math" panose="02040503050406030204" pitchFamily="18" charset="0"/>
+                  </a:rPr>
+                  <a:t>c</a:t>
+                </a:r>
+                <a:r>
+                  <a:rPr lang="en-US" baseline="-25000" dirty="0">
+                    <a:solidFill>
+                      <a:schemeClr val="accent6">
+                        <a:lumMod val="75000"/>
+                      </a:schemeClr>
+                    </a:solidFill>
+                    <a:latin typeface="Cambria Math" panose="02040503050406030204" pitchFamily="18" charset="0"/>
+                  </a:rPr>
+                  <a:t>i</a:t>
+                </a:r>
+                <a:r>
+                  <a:rPr lang="en-US" dirty="0">
+                    <a:solidFill>
+                      <a:schemeClr val="accent6">
+                        <a:lumMod val="75000"/>
+                      </a:schemeClr>
+                    </a:solidFill>
+                    <a:latin typeface="Cambria Math" panose="02040503050406030204" pitchFamily="18" charset="0"/>
+                  </a:rPr>
+                  <a:t> </a:t>
+                </a:r>
+                <a14:m>
+                  <m:oMath xmlns:m="http://schemas.openxmlformats.org/officeDocument/2006/math">
+                    <m:r>
+                      <a:rPr lang="en-US" i="1" dirty="0">
+                        <a:solidFill>
+                          <a:schemeClr val="accent6">
+                            <a:lumMod val="75000"/>
+                          </a:schemeClr>
+                        </a:solidFill>
+                        <a:latin typeface="Cambria Math" panose="02040503050406030204" pitchFamily="18" charset="0"/>
+                        <a:ea typeface="Cambria Math" panose="02040503050406030204" pitchFamily="18" charset="0"/>
+                      </a:rPr>
+                      <m:t>≥</m:t>
+                    </m:r>
+                  </m:oMath>
+                </a14:m>
+                <a:r>
+                  <a:rPr lang="en-US" dirty="0">
+                    <a:solidFill>
+                      <a:schemeClr val="accent6">
+                        <a:lumMod val="75000"/>
+                      </a:schemeClr>
+                    </a:solidFill>
+                    <a:latin typeface="Cambria Math" panose="02040503050406030204" pitchFamily="18" charset="0"/>
+                  </a:rPr>
+                  <a:t> c</a:t>
+                </a:r>
+                <a:r>
+                  <a:rPr lang="en-US" baseline="-25000" dirty="0">
+                    <a:solidFill>
+                      <a:schemeClr val="accent6">
+                        <a:lumMod val="75000"/>
+                      </a:schemeClr>
+                    </a:solidFill>
+                    <a:latin typeface="Cambria Math" panose="02040503050406030204" pitchFamily="18" charset="0"/>
+                  </a:rPr>
+                  <a:t>j+1</a:t>
+                </a:r>
+                <a:r>
+                  <a:rPr lang="en-US" dirty="0">
+                    <a:solidFill>
+                      <a:schemeClr val="accent6">
+                        <a:lumMod val="75000"/>
+                      </a:schemeClr>
+                    </a:solidFill>
+                    <a:latin typeface="Cambria Math" panose="02040503050406030204" pitchFamily="18" charset="0"/>
+                  </a:rPr>
+                  <a:t>, c</a:t>
+                </a:r>
+                <a:r>
+                  <a:rPr lang="en-US" baseline="-25000" dirty="0">
+                    <a:solidFill>
+                      <a:schemeClr val="accent6">
+                        <a:lumMod val="75000"/>
+                      </a:schemeClr>
+                    </a:solidFill>
+                    <a:latin typeface="Cambria Math" panose="02040503050406030204" pitchFamily="18" charset="0"/>
+                  </a:rPr>
+                  <a:t>i</a:t>
+                </a:r>
+                <a:r>
+                  <a:rPr lang="en-US" dirty="0">
+                    <a:solidFill>
+                      <a:schemeClr val="accent6">
+                        <a:lumMod val="75000"/>
+                      </a:schemeClr>
+                    </a:solidFill>
+                    <a:latin typeface="Cambria Math" panose="02040503050406030204" pitchFamily="18" charset="0"/>
+                  </a:rPr>
+                  <a:t> </a:t>
+                </a:r>
+                <a14:m>
+                  <m:oMath xmlns:m="http://schemas.openxmlformats.org/officeDocument/2006/math">
+                    <m:r>
+                      <a:rPr lang="en-US" i="1" dirty="0">
+                        <a:solidFill>
+                          <a:schemeClr val="accent6">
+                            <a:lumMod val="75000"/>
+                          </a:schemeClr>
+                        </a:solidFill>
+                        <a:latin typeface="Cambria Math" panose="02040503050406030204" pitchFamily="18" charset="0"/>
+                        <a:ea typeface="Cambria Math" panose="02040503050406030204" pitchFamily="18" charset="0"/>
+                      </a:rPr>
+                      <m:t>≥</m:t>
+                    </m:r>
+                  </m:oMath>
+                </a14:m>
+                <a:r>
+                  <a:rPr lang="en-US" dirty="0">
+                    <a:solidFill>
+                      <a:schemeClr val="accent6">
+                        <a:lumMod val="75000"/>
+                      </a:schemeClr>
+                    </a:solidFill>
+                    <a:latin typeface="Cambria Math" panose="02040503050406030204" pitchFamily="18" charset="0"/>
+                  </a:rPr>
+                  <a:t> </a:t>
+                </a:r>
+                <a:r>
+                  <a:rPr lang="en-US" dirty="0" err="1">
+                    <a:solidFill>
+                      <a:schemeClr val="accent6">
+                        <a:lumMod val="75000"/>
+                      </a:schemeClr>
+                    </a:solidFill>
+                    <a:latin typeface="Cambria Math" panose="02040503050406030204" pitchFamily="18" charset="0"/>
+                  </a:rPr>
+                  <a:t>c</a:t>
+                </a:r>
+                <a:r>
+                  <a:rPr lang="en-US" baseline="-25000" dirty="0" err="1">
+                    <a:solidFill>
+                      <a:schemeClr val="accent6">
+                        <a:lumMod val="75000"/>
+                      </a:schemeClr>
+                    </a:solidFill>
+                    <a:latin typeface="Cambria Math" panose="02040503050406030204" pitchFamily="18" charset="0"/>
+                  </a:rPr>
+                  <a:t>j</a:t>
+                </a:r>
+                <a:r>
+                  <a:rPr lang="en-US" baseline="-25000" dirty="0">
+                    <a:solidFill>
+                      <a:schemeClr val="accent6">
+                        <a:lumMod val="75000"/>
+                      </a:schemeClr>
+                    </a:solidFill>
+                    <a:latin typeface="Cambria Math" panose="02040503050406030204" pitchFamily="18" charset="0"/>
+                  </a:rPr>
+                  <a:t> + 2</a:t>
+                </a:r>
+                <a:r>
+                  <a:rPr lang="en-US" dirty="0">
+                    <a:solidFill>
+                      <a:schemeClr val="accent6">
+                        <a:lumMod val="75000"/>
+                      </a:schemeClr>
+                    </a:solidFill>
+                    <a:latin typeface="Cambria Math" panose="02040503050406030204" pitchFamily="18" charset="0"/>
+                  </a:rPr>
+                  <a:t>, … c</a:t>
+                </a:r>
+                <a:r>
+                  <a:rPr lang="en-US" baseline="-25000" dirty="0">
+                    <a:solidFill>
+                      <a:schemeClr val="accent6">
+                        <a:lumMod val="75000"/>
+                      </a:schemeClr>
+                    </a:solidFill>
+                    <a:latin typeface="Cambria Math" panose="02040503050406030204" pitchFamily="18" charset="0"/>
+                  </a:rPr>
+                  <a:t>i</a:t>
+                </a:r>
+                <a:r>
+                  <a:rPr lang="en-US" dirty="0">
+                    <a:solidFill>
+                      <a:schemeClr val="accent6">
+                        <a:lumMod val="75000"/>
+                      </a:schemeClr>
+                    </a:solidFill>
+                    <a:latin typeface="Cambria Math" panose="02040503050406030204" pitchFamily="18" charset="0"/>
+                  </a:rPr>
+                  <a:t> </a:t>
+                </a:r>
+                <a14:m>
+                  <m:oMath xmlns:m="http://schemas.openxmlformats.org/officeDocument/2006/math">
+                    <m:r>
+                      <a:rPr lang="en-US" i="1" dirty="0">
+                        <a:solidFill>
+                          <a:schemeClr val="accent6">
+                            <a:lumMod val="75000"/>
+                          </a:schemeClr>
+                        </a:solidFill>
+                        <a:latin typeface="Cambria Math" panose="02040503050406030204" pitchFamily="18" charset="0"/>
+                        <a:ea typeface="Cambria Math" panose="02040503050406030204" pitchFamily="18" charset="0"/>
+                      </a:rPr>
+                      <m:t>≥</m:t>
+                    </m:r>
+                  </m:oMath>
+                </a14:m>
+                <a:r>
+                  <a:rPr lang="en-US" dirty="0">
+                    <a:solidFill>
+                      <a:schemeClr val="accent6">
+                        <a:lumMod val="75000"/>
+                      </a:schemeClr>
+                    </a:solidFill>
+                    <a:latin typeface="Cambria Math" panose="02040503050406030204" pitchFamily="18" charset="0"/>
+                  </a:rPr>
+                  <a:t> </a:t>
+                </a:r>
+                <a:r>
+                  <a:rPr lang="en-US" dirty="0" err="1">
+                    <a:solidFill>
+                      <a:schemeClr val="accent6">
+                        <a:lumMod val="75000"/>
+                      </a:schemeClr>
+                    </a:solidFill>
+                    <a:latin typeface="Cambria Math" panose="02040503050406030204" pitchFamily="18" charset="0"/>
+                  </a:rPr>
+                  <a:t>c</a:t>
+                </a:r>
+                <a:r>
+                  <a:rPr lang="en-US" baseline="-25000" dirty="0" err="1">
+                    <a:solidFill>
+                      <a:schemeClr val="accent6">
+                        <a:lumMod val="75000"/>
+                      </a:schemeClr>
+                    </a:solidFill>
+                    <a:latin typeface="Cambria Math" panose="02040503050406030204" pitchFamily="18" charset="0"/>
+                  </a:rPr>
+                  <a:t>n</a:t>
+                </a:r>
+                <a:endParaRPr lang="en-US" baseline="-25000" dirty="0">
+                  <a:solidFill>
+                    <a:schemeClr val="accent6">
+                      <a:lumMod val="75000"/>
+                    </a:schemeClr>
+                  </a:solidFill>
+                  <a:latin typeface="Cambria Math" panose="02040503050406030204" pitchFamily="18" charset="0"/>
+                </a:endParaRPr>
+              </a:p>
+              <a:p>
+                <a:pPr marL="457200" lvl="1" indent="0">
+                  <a:buNone/>
+                </a:pPr>
+                <a:r>
+                  <a:rPr lang="en-US" sz="2200" dirty="0">
+                    <a:latin typeface="Cambria Math" panose="02040503050406030204" pitchFamily="18" charset="0"/>
+                    <a:ea typeface="Cambria Math" panose="02040503050406030204" pitchFamily="18" charset="0"/>
+                  </a:rPr>
+                  <a:t>Star region = c</a:t>
+                </a:r>
+                <a:r>
+                  <a:rPr lang="en-US" sz="2200" baseline="-25000" dirty="0">
+                    <a:latin typeface="Cambria Math" panose="02040503050406030204" pitchFamily="18" charset="0"/>
+                    <a:ea typeface="Cambria Math" panose="02040503050406030204" pitchFamily="18" charset="0"/>
+                  </a:rPr>
+                  <a:t>i</a:t>
+                </a:r>
+                <a:r>
+                  <a:rPr lang="en-US" sz="2200" dirty="0">
+                    <a:latin typeface="Cambria Math" panose="02040503050406030204" pitchFamily="18" charset="0"/>
+                    <a:ea typeface="Cambria Math" panose="02040503050406030204" pitchFamily="18" charset="0"/>
+                  </a:rPr>
+                  <a:t> </a:t>
+                </a:r>
+                <a14:m>
+                  <m:oMath xmlns:m="http://schemas.openxmlformats.org/officeDocument/2006/math">
+                    <m:r>
+                      <a:rPr lang="en-US" sz="2200" i="1" dirty="0" smtClean="0">
+                        <a:latin typeface="Cambria Math" panose="02040503050406030204" pitchFamily="18" charset="0"/>
+                        <a:ea typeface="Cambria Math" panose="02040503050406030204" pitchFamily="18" charset="0"/>
+                      </a:rPr>
+                      <m:t>≥</m:t>
+                    </m:r>
+                  </m:oMath>
+                </a14:m>
+                <a:r>
+                  <a:rPr lang="en-US" sz="2200" dirty="0">
+                    <a:latin typeface="Cambria Math" panose="02040503050406030204" pitchFamily="18" charset="0"/>
+                    <a:ea typeface="Cambria Math" panose="02040503050406030204" pitchFamily="18" charset="0"/>
+                  </a:rPr>
+                  <a:t> </a:t>
+                </a:r>
+                <a:r>
+                  <a:rPr lang="en-US" sz="2200" dirty="0" err="1">
+                    <a:latin typeface="Cambria Math" panose="02040503050406030204" pitchFamily="18" charset="0"/>
+                    <a:ea typeface="Cambria Math" panose="02040503050406030204" pitchFamily="18" charset="0"/>
+                  </a:rPr>
+                  <a:t>c</a:t>
+                </a:r>
+                <a:r>
+                  <a:rPr lang="en-US" sz="2200" baseline="-25000" dirty="0" err="1">
+                    <a:latin typeface="Cambria Math" panose="02040503050406030204" pitchFamily="18" charset="0"/>
+                    <a:ea typeface="Cambria Math" panose="02040503050406030204" pitchFamily="18" charset="0"/>
+                  </a:rPr>
+                  <a:t>j</a:t>
+                </a:r>
+                <a:endParaRPr lang="en-US" sz="2200" baseline="-25000" dirty="0">
+                  <a:latin typeface="Cambria Math" panose="02040503050406030204" pitchFamily="18" charset="0"/>
+                  <a:ea typeface="Cambria Math" panose="02040503050406030204" pitchFamily="18" charset="0"/>
+                </a:endParaRPr>
+              </a:p>
+              <a:p>
+                <a:pPr marL="457200" lvl="1" indent="0">
+                  <a:buNone/>
+                </a:pPr>
+                <a:r>
+                  <a:rPr lang="en-US" sz="2200" dirty="0">
+                    <a:latin typeface="Cambria Math" panose="02040503050406030204" pitchFamily="18" charset="0"/>
+                    <a:ea typeface="Cambria Math" panose="02040503050406030204" pitchFamily="18" charset="0"/>
+                  </a:rPr>
+                  <a:t>Result = (Star region </a:t>
+                </a:r>
+                <a14:m>
+                  <m:oMath xmlns:m="http://schemas.openxmlformats.org/officeDocument/2006/math">
+                    <m:r>
+                      <a:rPr lang="en-US" sz="2200" i="1">
+                        <a:latin typeface="Cambria Math" panose="02040503050406030204" pitchFamily="18" charset="0"/>
+                        <a:ea typeface="Cambria Math" panose="02040503050406030204" pitchFamily="18" charset="0"/>
+                      </a:rPr>
+                      <m:t>∩</m:t>
+                    </m:r>
+                  </m:oMath>
+                </a14:m>
+                <a:r>
+                  <a:rPr lang="en-US" sz="2200" dirty="0">
+                    <a:latin typeface="Cambria Math" panose="02040503050406030204" pitchFamily="18" charset="0"/>
+                    <a:ea typeface="Cambria Math" panose="02040503050406030204" pitchFamily="18" charset="0"/>
+                  </a:rPr>
+                  <a:t> Green region) / Green region</a:t>
+                </a:r>
+              </a:p>
+              <a:p>
+                <a:pPr marL="457200" lvl="1" indent="0">
+                  <a:buNone/>
+                </a:pPr>
+                <a:endParaRPr lang="en-US" sz="2200" dirty="0">
+                  <a:latin typeface="Cambria Math" panose="02040503050406030204" pitchFamily="18" charset="0"/>
+                  <a:ea typeface="Cambria Math" panose="02040503050406030204" pitchFamily="18" charset="0"/>
+                </a:endParaRPr>
+              </a:p>
+              <a:p>
+                <a:pPr marL="457200" lvl="1" indent="0">
+                  <a:buNone/>
+                </a:pPr>
+                <a:r>
+                  <a:rPr lang="en-US" sz="2200" dirty="0">
+                    <a:latin typeface="Cambria Math" panose="02040503050406030204" pitchFamily="18" charset="0"/>
+                    <a:ea typeface="Cambria Math" panose="02040503050406030204" pitchFamily="18" charset="0"/>
+                  </a:rPr>
+                  <a:t>** This table is just a simplified 2D visualization</a:t>
+                </a:r>
+                <a:endParaRPr lang="en-US" sz="2200" dirty="0"/>
+              </a:p>
+            </p:txBody>
+          </p:sp>
+        </mc:Choice>
+        <mc:Fallback>
+          <p:sp>
+            <p:nvSpPr>
+              <p:cNvPr id="3" name="Content Placeholder 2">
+                <a:extLst>
+                  <a:ext uri="{FF2B5EF4-FFF2-40B4-BE49-F238E27FC236}">
+                    <a16:creationId xmlns:a16="http://schemas.microsoft.com/office/drawing/2014/main" id="{5DF251DC-4F64-5D48-6C5F-F604B6F609CD}"/>
+                  </a:ext>
+                </a:extLst>
+              </p:cNvPr>
+              <p:cNvSpPr>
+                <a:spLocks noGrp="1" noRot="1" noChangeAspect="1" noMove="1" noResize="1" noEditPoints="1" noAdjustHandles="1" noChangeArrowheads="1" noChangeShapeType="1" noTextEdit="1"/>
+              </p:cNvSpPr>
+              <p:nvPr>
+                <p:ph idx="1"/>
+              </p:nvPr>
+            </p:nvSpPr>
+            <p:spPr>
+              <a:xfrm>
+                <a:off x="185738" y="882650"/>
+                <a:ext cx="12006262" cy="5318125"/>
+              </a:xfrm>
+              <a:blipFill>
+                <a:blip r:embed="rId2"/>
+                <a:stretch>
+                  <a:fillRect l="-739"/>
+                </a:stretch>
+              </a:blipFill>
+            </p:spPr>
+            <p:txBody>
+              <a:bodyPr/>
+              <a:lstStyle/>
+              <a:p>
+                <a:r>
+                  <a:rPr lang="en-US">
+                    <a:noFill/>
+                  </a:rPr>
+                  <a:t> </a:t>
+                </a:r>
+              </a:p>
+            </p:txBody>
+          </p:sp>
+        </mc:Fallback>
+      </mc:AlternateContent>
+      <p:graphicFrame>
+        <p:nvGraphicFramePr>
+          <p:cNvPr id="4" name="Table 3">
+            <a:extLst>
+              <a:ext uri="{FF2B5EF4-FFF2-40B4-BE49-F238E27FC236}">
+                <a16:creationId xmlns:a16="http://schemas.microsoft.com/office/drawing/2014/main" id="{1524D826-103C-D069-B991-28C549E293B6}"/>
+              </a:ext>
+            </a:extLst>
+          </p:cNvPr>
+          <p:cNvGraphicFramePr>
+            <a:graphicFrameLocks noGrp="1"/>
+          </p:cNvGraphicFramePr>
+          <p:nvPr>
+            <p:extLst>
+              <p:ext uri="{D42A27DB-BD31-4B8C-83A1-F6EECF244321}">
+                <p14:modId xmlns:p14="http://schemas.microsoft.com/office/powerpoint/2010/main" val="1184386802"/>
+              </p:ext>
+            </p:extLst>
+          </p:nvPr>
+        </p:nvGraphicFramePr>
+        <p:xfrm>
+          <a:off x="3379157" y="4721226"/>
+          <a:ext cx="5433685" cy="1854200"/>
+        </p:xfrm>
+        <a:graphic>
+          <a:graphicData uri="http://schemas.openxmlformats.org/drawingml/2006/table">
+            <a:tbl>
+              <a:tblPr firstRow="1" bandRow="1">
+                <a:tableStyleId>{5C22544A-7EE6-4342-B048-85BDC9FD1C3A}</a:tableStyleId>
+              </a:tblPr>
+              <a:tblGrid>
+                <a:gridCol w="1086737">
+                  <a:extLst>
+                    <a:ext uri="{9D8B030D-6E8A-4147-A177-3AD203B41FA5}">
+                      <a16:colId xmlns:a16="http://schemas.microsoft.com/office/drawing/2014/main" val="152265934"/>
+                    </a:ext>
+                  </a:extLst>
+                </a:gridCol>
+                <a:gridCol w="1086737">
+                  <a:extLst>
+                    <a:ext uri="{9D8B030D-6E8A-4147-A177-3AD203B41FA5}">
+                      <a16:colId xmlns:a16="http://schemas.microsoft.com/office/drawing/2014/main" val="4078968741"/>
+                    </a:ext>
+                  </a:extLst>
+                </a:gridCol>
+                <a:gridCol w="1086737">
+                  <a:extLst>
+                    <a:ext uri="{9D8B030D-6E8A-4147-A177-3AD203B41FA5}">
+                      <a16:colId xmlns:a16="http://schemas.microsoft.com/office/drawing/2014/main" val="1554198573"/>
+                    </a:ext>
+                  </a:extLst>
+                </a:gridCol>
+                <a:gridCol w="1086737">
+                  <a:extLst>
+                    <a:ext uri="{9D8B030D-6E8A-4147-A177-3AD203B41FA5}">
+                      <a16:colId xmlns:a16="http://schemas.microsoft.com/office/drawing/2014/main" val="3614642542"/>
+                    </a:ext>
+                  </a:extLst>
+                </a:gridCol>
+                <a:gridCol w="1086737">
+                  <a:extLst>
+                    <a:ext uri="{9D8B030D-6E8A-4147-A177-3AD203B41FA5}">
+                      <a16:colId xmlns:a16="http://schemas.microsoft.com/office/drawing/2014/main" val="423572014"/>
+                    </a:ext>
+                  </a:extLst>
+                </a:gridCol>
+              </a:tblGrid>
+              <a:tr h="370840">
+                <a:tc>
+                  <a:txBody>
+                    <a:bodyPr/>
+                    <a:lstStyle/>
+                    <a:p>
+                      <a:pPr algn="ctr"/>
+                      <a:endParaRPr lang="en-US" dirty="0"/>
+                    </a:p>
+                  </a:txBody>
+                  <a:tcPr/>
+                </a:tc>
+                <a:tc>
+                  <a:txBody>
+                    <a:bodyPr/>
+                    <a:lstStyle/>
+                    <a:p>
+                      <a:pPr algn="ctr"/>
+                      <a:r>
+                        <a:rPr lang="en-US" dirty="0"/>
+                        <a:t>0.5</a:t>
+                      </a:r>
+                    </a:p>
+                  </a:txBody>
+                  <a:tcPr/>
+                </a:tc>
+                <a:tc>
+                  <a:txBody>
+                    <a:bodyPr/>
+                    <a:lstStyle/>
+                    <a:p>
+                      <a:pPr algn="ctr"/>
+                      <a:r>
+                        <a:rPr lang="en-US" dirty="0"/>
+                        <a:t>1</a:t>
+                      </a:r>
+                    </a:p>
+                  </a:txBody>
+                  <a:tcPr/>
+                </a:tc>
+                <a:tc>
+                  <a:txBody>
+                    <a:bodyPr/>
+                    <a:lstStyle/>
+                    <a:p>
+                      <a:pPr algn="ctr"/>
+                      <a:r>
+                        <a:rPr lang="en-US" dirty="0"/>
+                        <a:t>1.5</a:t>
+                      </a:r>
+                    </a:p>
+                  </a:txBody>
+                  <a:tcPr/>
+                </a:tc>
+                <a:tc>
+                  <a:txBody>
+                    <a:bodyPr/>
+                    <a:lstStyle/>
+                    <a:p>
+                      <a:pPr algn="ctr"/>
+                      <a:r>
+                        <a:rPr lang="en-US" dirty="0"/>
+                        <a:t>2</a:t>
+                      </a:r>
+                    </a:p>
+                  </a:txBody>
+                  <a:tcPr/>
+                </a:tc>
+                <a:extLst>
+                  <a:ext uri="{0D108BD9-81ED-4DB2-BD59-A6C34878D82A}">
+                    <a16:rowId xmlns:a16="http://schemas.microsoft.com/office/drawing/2014/main" val="4191670207"/>
+                  </a:ext>
+                </a:extLst>
+              </a:tr>
+              <a:tr h="370840">
+                <a:tc>
+                  <a:txBody>
+                    <a:bodyPr/>
+                    <a:lstStyle/>
+                    <a:p>
+                      <a:pPr algn="ctr"/>
+                      <a:r>
+                        <a:rPr lang="en-US" dirty="0"/>
+                        <a:t>0.5</a:t>
+                      </a:r>
+                    </a:p>
+                  </a:txBody>
+                  <a:tcPr/>
+                </a:tc>
+                <a:tc>
+                  <a:txBody>
+                    <a:bodyPr/>
+                    <a:lstStyle/>
+                    <a:p>
+                      <a:pPr algn="ctr"/>
+                      <a:r>
+                        <a:rPr lang="en-US" dirty="0"/>
+                        <a:t>*</a:t>
+                      </a:r>
+                    </a:p>
+                  </a:txBody>
+                  <a:tcPr/>
+                </a:tc>
+                <a:tc>
+                  <a:txBody>
+                    <a:bodyPr/>
+                    <a:lstStyle/>
+                    <a:p>
+                      <a:pPr algn="ctr"/>
+                      <a:endParaRPr lang="en-US"/>
+                    </a:p>
+                  </a:txBody>
+                  <a:tcPr/>
+                </a:tc>
+                <a:tc>
+                  <a:txBody>
+                    <a:bodyPr/>
+                    <a:lstStyle/>
+                    <a:p>
+                      <a:pPr algn="ctr"/>
+                      <a:endParaRPr lang="en-US"/>
+                    </a:p>
+                  </a:txBody>
+                  <a:tcPr/>
+                </a:tc>
+                <a:tc>
+                  <a:txBody>
+                    <a:bodyPr/>
+                    <a:lstStyle/>
+                    <a:p>
+                      <a:pPr algn="ctr"/>
+                      <a:endParaRPr lang="en-US"/>
+                    </a:p>
+                  </a:txBody>
+                  <a:tcPr/>
+                </a:tc>
+                <a:extLst>
+                  <a:ext uri="{0D108BD9-81ED-4DB2-BD59-A6C34878D82A}">
+                    <a16:rowId xmlns:a16="http://schemas.microsoft.com/office/drawing/2014/main" val="2280411846"/>
+                  </a:ext>
+                </a:extLst>
+              </a:tr>
+              <a:tr h="370840">
+                <a:tc>
+                  <a:txBody>
+                    <a:bodyPr/>
+                    <a:lstStyle/>
+                    <a:p>
+                      <a:pPr algn="ctr"/>
+                      <a:r>
+                        <a:rPr lang="en-US" dirty="0"/>
+                        <a:t>1</a:t>
+                      </a:r>
+                    </a:p>
+                  </a:txBody>
+                  <a:tcPr/>
+                </a:tc>
+                <a:tc>
+                  <a:txBody>
+                    <a:bodyPr/>
+                    <a:lstStyle/>
+                    <a:p>
+                      <a:pPr algn="ctr"/>
+                      <a:r>
+                        <a:rPr lang="en-US" dirty="0"/>
+                        <a:t>*</a:t>
+                      </a:r>
+                    </a:p>
+                  </a:txBody>
+                  <a:tcPr>
+                    <a:solidFill>
+                      <a:schemeClr val="accent6">
+                        <a:lumMod val="40000"/>
+                        <a:lumOff val="60000"/>
+                      </a:schemeClr>
+                    </a:solidFill>
+                  </a:tcPr>
+                </a:tc>
+                <a:tc>
+                  <a:txBody>
+                    <a:bodyPr/>
+                    <a:lstStyle/>
+                    <a:p>
+                      <a:pPr algn="ctr"/>
+                      <a:r>
+                        <a:rPr lang="en-US" dirty="0"/>
+                        <a:t>*</a:t>
+                      </a:r>
+                    </a:p>
+                  </a:txBody>
+                  <a:tcPr>
+                    <a:solidFill>
+                      <a:schemeClr val="accent6">
+                        <a:lumMod val="40000"/>
+                        <a:lumOff val="60000"/>
+                      </a:schemeClr>
+                    </a:solidFill>
+                  </a:tcPr>
+                </a:tc>
+                <a:tc>
+                  <a:txBody>
+                    <a:bodyPr/>
+                    <a:lstStyle/>
+                    <a:p>
+                      <a:pPr algn="ctr"/>
+                      <a:endParaRPr lang="en-US" dirty="0"/>
+                    </a:p>
+                  </a:txBody>
+                  <a:tcPr>
+                    <a:solidFill>
+                      <a:schemeClr val="accent6">
+                        <a:lumMod val="40000"/>
+                        <a:lumOff val="60000"/>
+                      </a:schemeClr>
+                    </a:solidFill>
+                  </a:tcPr>
+                </a:tc>
+                <a:tc>
+                  <a:txBody>
+                    <a:bodyPr/>
+                    <a:lstStyle/>
+                    <a:p>
+                      <a:pPr algn="ctr"/>
+                      <a:endParaRPr lang="en-US" dirty="0"/>
+                    </a:p>
+                  </a:txBody>
+                  <a:tcPr/>
+                </a:tc>
+                <a:extLst>
+                  <a:ext uri="{0D108BD9-81ED-4DB2-BD59-A6C34878D82A}">
+                    <a16:rowId xmlns:a16="http://schemas.microsoft.com/office/drawing/2014/main" val="1530262547"/>
+                  </a:ext>
+                </a:extLst>
+              </a:tr>
+              <a:tr h="370840">
+                <a:tc>
+                  <a:txBody>
+                    <a:bodyPr/>
+                    <a:lstStyle/>
+                    <a:p>
+                      <a:pPr algn="ctr"/>
+                      <a:r>
+                        <a:rPr lang="en-US" dirty="0"/>
+                        <a:t>1.5</a:t>
+                      </a:r>
+                    </a:p>
+                  </a:txBody>
+                  <a:tcPr/>
+                </a:tc>
+                <a:tc>
+                  <a:txBody>
+                    <a:bodyPr/>
+                    <a:lstStyle/>
+                    <a:p>
+                      <a:pPr algn="ctr"/>
+                      <a:r>
+                        <a:rPr lang="en-US" dirty="0"/>
+                        <a:t>*</a:t>
+                      </a:r>
+                    </a:p>
+                  </a:txBody>
+                  <a:tcPr>
+                    <a:solidFill>
+                      <a:schemeClr val="accent6">
+                        <a:lumMod val="40000"/>
+                        <a:lumOff val="60000"/>
+                      </a:schemeClr>
+                    </a:solidFill>
+                  </a:tcPr>
+                </a:tc>
+                <a:tc>
+                  <a:txBody>
+                    <a:bodyPr/>
+                    <a:lstStyle/>
+                    <a:p>
+                      <a:pPr algn="ctr"/>
+                      <a:r>
+                        <a:rPr lang="en-US" dirty="0"/>
+                        <a:t>*</a:t>
+                      </a:r>
+                    </a:p>
+                  </a:txBody>
+                  <a:tcPr>
+                    <a:solidFill>
+                      <a:schemeClr val="accent6">
+                        <a:lumMod val="40000"/>
+                        <a:lumOff val="60000"/>
+                      </a:schemeClr>
+                    </a:solidFill>
+                  </a:tcPr>
+                </a:tc>
+                <a:tc>
+                  <a:txBody>
+                    <a:bodyPr/>
+                    <a:lstStyle/>
+                    <a:p>
+                      <a:pPr algn="ctr"/>
+                      <a:r>
+                        <a:rPr lang="en-US" dirty="0"/>
+                        <a:t>*</a:t>
+                      </a:r>
+                    </a:p>
+                  </a:txBody>
+                  <a:tcPr>
+                    <a:solidFill>
+                      <a:schemeClr val="accent6">
+                        <a:lumMod val="40000"/>
+                        <a:lumOff val="60000"/>
+                      </a:schemeClr>
+                    </a:solidFill>
+                  </a:tcPr>
+                </a:tc>
+                <a:tc>
+                  <a:txBody>
+                    <a:bodyPr/>
+                    <a:lstStyle/>
+                    <a:p>
+                      <a:pPr algn="ctr"/>
+                      <a:endParaRPr lang="en-US" dirty="0"/>
+                    </a:p>
+                  </a:txBody>
+                  <a:tcPr/>
+                </a:tc>
+                <a:extLst>
+                  <a:ext uri="{0D108BD9-81ED-4DB2-BD59-A6C34878D82A}">
+                    <a16:rowId xmlns:a16="http://schemas.microsoft.com/office/drawing/2014/main" val="1629365600"/>
+                  </a:ext>
+                </a:extLst>
+              </a:tr>
+              <a:tr h="370840">
+                <a:tc>
+                  <a:txBody>
+                    <a:bodyPr/>
+                    <a:lstStyle/>
+                    <a:p>
+                      <a:pPr algn="ctr"/>
+                      <a:r>
+                        <a:rPr lang="en-US" dirty="0"/>
+                        <a:t>2</a:t>
+                      </a:r>
+                    </a:p>
+                  </a:txBody>
+                  <a:tcPr/>
+                </a:tc>
+                <a:tc>
+                  <a:txBody>
+                    <a:bodyPr/>
+                    <a:lstStyle/>
+                    <a:p>
+                      <a:pPr algn="ctr"/>
+                      <a:r>
+                        <a:rPr lang="en-US" dirty="0"/>
+                        <a:t>*</a:t>
+                      </a:r>
+                    </a:p>
+                  </a:txBody>
+                  <a:tcPr>
+                    <a:solidFill>
+                      <a:schemeClr val="accent6">
+                        <a:lumMod val="40000"/>
+                        <a:lumOff val="60000"/>
+                      </a:schemeClr>
+                    </a:solidFill>
+                  </a:tcPr>
+                </a:tc>
+                <a:tc>
+                  <a:txBody>
+                    <a:bodyPr/>
+                    <a:lstStyle/>
+                    <a:p>
+                      <a:pPr algn="ctr"/>
+                      <a:r>
+                        <a:rPr lang="en-US" dirty="0"/>
+                        <a:t>*</a:t>
+                      </a:r>
+                    </a:p>
+                  </a:txBody>
+                  <a:tcPr>
+                    <a:solidFill>
+                      <a:schemeClr val="accent6">
+                        <a:lumMod val="40000"/>
+                        <a:lumOff val="60000"/>
+                      </a:schemeClr>
+                    </a:solidFill>
+                  </a:tcPr>
+                </a:tc>
+                <a:tc>
+                  <a:txBody>
+                    <a:bodyPr/>
+                    <a:lstStyle/>
+                    <a:p>
+                      <a:pPr algn="ctr"/>
+                      <a:r>
+                        <a:rPr lang="en-US" dirty="0"/>
+                        <a:t>*</a:t>
+                      </a:r>
+                    </a:p>
+                  </a:txBody>
+                  <a:tcPr>
+                    <a:solidFill>
+                      <a:schemeClr val="accent6">
+                        <a:lumMod val="40000"/>
+                        <a:lumOff val="60000"/>
+                      </a:schemeClr>
+                    </a:solidFill>
+                  </a:tcPr>
+                </a:tc>
+                <a:tc>
+                  <a:txBody>
+                    <a:bodyPr/>
+                    <a:lstStyle/>
+                    <a:p>
+                      <a:pPr algn="ctr"/>
+                      <a:r>
+                        <a:rPr lang="en-US" dirty="0"/>
+                        <a:t>*</a:t>
+                      </a:r>
+                    </a:p>
+                  </a:txBody>
+                  <a:tcPr/>
+                </a:tc>
+                <a:extLst>
+                  <a:ext uri="{0D108BD9-81ED-4DB2-BD59-A6C34878D82A}">
+                    <a16:rowId xmlns:a16="http://schemas.microsoft.com/office/drawing/2014/main" val="3209401911"/>
+                  </a:ext>
+                </a:extLst>
+              </a:tr>
+            </a:tbl>
+          </a:graphicData>
+        </a:graphic>
+      </p:graphicFrame>
+      <p:sp>
+        <p:nvSpPr>
+          <p:cNvPr id="6" name="TextBox 5">
+            <a:extLst>
+              <a:ext uri="{FF2B5EF4-FFF2-40B4-BE49-F238E27FC236}">
+                <a16:creationId xmlns:a16="http://schemas.microsoft.com/office/drawing/2014/main" id="{875B93E0-4F6B-6AD7-CAC7-613AB3F4019F}"/>
+              </a:ext>
+            </a:extLst>
+          </p:cNvPr>
+          <p:cNvSpPr txBox="1"/>
+          <p:nvPr/>
+        </p:nvSpPr>
+        <p:spPr>
+          <a:xfrm>
+            <a:off x="3671220" y="4351894"/>
+            <a:ext cx="468398" cy="369332"/>
+          </a:xfrm>
+          <a:prstGeom prst="rect">
+            <a:avLst/>
+          </a:prstGeom>
+          <a:noFill/>
+        </p:spPr>
+        <p:txBody>
+          <a:bodyPr wrap="none" rtlCol="0">
+            <a:spAutoFit/>
+          </a:bodyPr>
+          <a:lstStyle/>
+          <a:p>
+            <a:r>
+              <a:rPr lang="en-US" dirty="0"/>
+              <a:t>C2</a:t>
+            </a:r>
+          </a:p>
+        </p:txBody>
+      </p:sp>
+      <p:sp>
+        <p:nvSpPr>
+          <p:cNvPr id="7" name="TextBox 6">
+            <a:extLst>
+              <a:ext uri="{FF2B5EF4-FFF2-40B4-BE49-F238E27FC236}">
+                <a16:creationId xmlns:a16="http://schemas.microsoft.com/office/drawing/2014/main" id="{386AEC42-251A-A974-74FC-3DB1A405E1B3}"/>
+              </a:ext>
+            </a:extLst>
+          </p:cNvPr>
+          <p:cNvSpPr txBox="1"/>
+          <p:nvPr/>
+        </p:nvSpPr>
+        <p:spPr>
+          <a:xfrm>
+            <a:off x="2827034" y="4845073"/>
+            <a:ext cx="468398" cy="369332"/>
+          </a:xfrm>
+          <a:prstGeom prst="rect">
+            <a:avLst/>
+          </a:prstGeom>
+          <a:noFill/>
+        </p:spPr>
+        <p:txBody>
+          <a:bodyPr wrap="none" rtlCol="0">
+            <a:spAutoFit/>
+          </a:bodyPr>
+          <a:lstStyle/>
+          <a:p>
+            <a:r>
+              <a:rPr lang="en-US" dirty="0"/>
+              <a:t>C1</a:t>
+            </a:r>
+          </a:p>
+        </p:txBody>
+      </p:sp>
+    </p:spTree>
+    <p:extLst>
+      <p:ext uri="{BB962C8B-B14F-4D97-AF65-F5344CB8AC3E}">
+        <p14:creationId xmlns:p14="http://schemas.microsoft.com/office/powerpoint/2010/main" val="3649740676"/>
+      </p:ext>
+    </p:extLst>
+  </p:cSld>
+  <p:clrMapOvr>
+    <a:masterClrMapping/>
+  </p:clrMapOvr>
+</p:sld>
+</file>
+
+<file path=ppt/slides/slide26.xml><?xml version="1.0" encoding="utf-8"?>
+<p:sld xmlns:a="http://schemas.openxmlformats.org/drawingml/2006/main" xmlns:r="http://schemas.openxmlformats.org/officeDocument/2006/relationships" xmlns:p="http://schemas.openxmlformats.org/presentationml/2006/main">
+  <p:cSld>
+    <p:spTree>
+      <p:nvGrpSpPr>
+        <p:cNvPr id="1" name=""/>
+        <p:cNvGrpSpPr/>
+        <p:nvPr/>
+      </p:nvGrpSpPr>
+      <p:grpSpPr>
+        <a:xfrm>
+          <a:off x="0" y="0"/>
+          <a:ext cx="0" cy="0"/>
+          <a:chOff x="0" y="0"/>
+          <a:chExt cx="0" cy="0"/>
+        </a:xfrm>
+      </p:grpSpPr>
+      <p:sp>
+        <p:nvSpPr>
+          <p:cNvPr id="2" name="Title 1">
+            <a:extLst>
+              <a:ext uri="{FF2B5EF4-FFF2-40B4-BE49-F238E27FC236}">
+                <a16:creationId xmlns:a16="http://schemas.microsoft.com/office/drawing/2014/main" id="{88ABCA84-F0B3-F083-35FC-6C2D94DF3B07}"/>
+              </a:ext>
+            </a:extLst>
+          </p:cNvPr>
+          <p:cNvSpPr>
+            <a:spLocks noGrp="1"/>
+          </p:cNvSpPr>
+          <p:nvPr>
+            <p:ph type="title"/>
+          </p:nvPr>
+        </p:nvSpPr>
+        <p:spPr>
+          <a:xfrm>
+            <a:off x="838199" y="0"/>
+            <a:ext cx="10515600" cy="1325563"/>
+          </a:xfrm>
+        </p:spPr>
+        <p:txBody>
+          <a:bodyPr/>
+          <a:lstStyle/>
+          <a:p>
+            <a:pPr algn="ctr"/>
+            <a:r>
+              <a:rPr lang="en-US" dirty="0"/>
+              <a:t>Entropy</a:t>
+            </a:r>
+          </a:p>
+        </p:txBody>
+      </p:sp>
+      <mc:AlternateContent xmlns:mc="http://schemas.openxmlformats.org/markup-compatibility/2006">
+        <mc:Choice xmlns:a14="http://schemas.microsoft.com/office/drawing/2010/main" Requires="a14">
+          <p:sp>
+            <p:nvSpPr>
+              <p:cNvPr id="3" name="Content Placeholder 2">
+                <a:extLst>
+                  <a:ext uri="{FF2B5EF4-FFF2-40B4-BE49-F238E27FC236}">
+                    <a16:creationId xmlns:a16="http://schemas.microsoft.com/office/drawing/2014/main" id="{5DF251DC-4F64-5D48-6C5F-F604B6F609CD}"/>
+                  </a:ext>
+                </a:extLst>
+              </p:cNvPr>
+              <p:cNvSpPr>
+                <a:spLocks noGrp="1"/>
+              </p:cNvSpPr>
+              <p:nvPr>
+                <p:ph idx="1"/>
+              </p:nvPr>
+            </p:nvSpPr>
+            <p:spPr>
+              <a:xfrm>
+                <a:off x="185738" y="769937"/>
+                <a:ext cx="12006262" cy="5318125"/>
+              </a:xfrm>
+            </p:spPr>
+            <p:txBody>
+              <a:bodyPr>
+                <a:normAutofit/>
+              </a:bodyPr>
+              <a:lstStyle/>
+              <a:p>
+                <a:pPr marL="0" indent="0">
+                  <a:buNone/>
+                </a:pPr>
+                <a:endParaRPr lang="en-US" i="1" dirty="0">
+                  <a:latin typeface="Cambria Math" panose="02040503050406030204" pitchFamily="18" charset="0"/>
+                </a:endParaRPr>
+              </a:p>
+              <a:p>
+                <a:pPr marL="0" indent="0">
+                  <a:buNone/>
+                </a:pPr>
+                <a:r>
+                  <a:rPr lang="en-US" dirty="0">
+                    <a:latin typeface="Cambria Math" panose="02040503050406030204" pitchFamily="18" charset="0"/>
+                  </a:rPr>
+                  <a:t>2) How to compute P(c</a:t>
+                </a:r>
+                <a:r>
+                  <a:rPr lang="en-US" baseline="-25000" dirty="0">
+                    <a:latin typeface="Cambria Math" panose="02040503050406030204" pitchFamily="18" charset="0"/>
+                  </a:rPr>
+                  <a:t>i</a:t>
+                </a:r>
+                <a:r>
+                  <a:rPr lang="en-US" dirty="0">
+                    <a:latin typeface="Cambria Math" panose="02040503050406030204" pitchFamily="18" charset="0"/>
+                  </a:rPr>
+                  <a:t> </a:t>
+                </a:r>
+                <a14:m>
+                  <m:oMath xmlns:m="http://schemas.openxmlformats.org/officeDocument/2006/math">
+                    <m:r>
+                      <a:rPr lang="en-US" i="1" dirty="0">
+                        <a:latin typeface="Cambria Math" panose="02040503050406030204" pitchFamily="18" charset="0"/>
+                        <a:ea typeface="Cambria Math" panose="02040503050406030204" pitchFamily="18" charset="0"/>
+                      </a:rPr>
+                      <m:t>≥</m:t>
+                    </m:r>
+                  </m:oMath>
+                </a14:m>
+                <a:r>
+                  <a:rPr lang="en-US" dirty="0">
+                    <a:latin typeface="Cambria Math" panose="02040503050406030204" pitchFamily="18" charset="0"/>
+                  </a:rPr>
+                  <a:t> </a:t>
+                </a:r>
+                <a:r>
+                  <a:rPr lang="en-US" dirty="0" err="1">
+                    <a:latin typeface="Cambria Math" panose="02040503050406030204" pitchFamily="18" charset="0"/>
+                  </a:rPr>
+                  <a:t>c</a:t>
+                </a:r>
+                <a:r>
+                  <a:rPr lang="en-US" baseline="-25000" dirty="0" err="1">
+                    <a:latin typeface="Cambria Math" panose="02040503050406030204" pitchFamily="18" charset="0"/>
+                  </a:rPr>
+                  <a:t>j</a:t>
+                </a:r>
+                <a:r>
+                  <a:rPr lang="en-US" baseline="-25000" dirty="0">
+                    <a:latin typeface="Cambria Math" panose="02040503050406030204" pitchFamily="18" charset="0"/>
+                  </a:rPr>
+                  <a:t> </a:t>
+                </a:r>
+                <a:r>
+                  <a:rPr lang="en-US" dirty="0">
+                    <a:latin typeface="Cambria Math" panose="02040503050406030204" pitchFamily="18" charset="0"/>
+                  </a:rPr>
+                  <a:t>)?</a:t>
+                </a:r>
+              </a:p>
+              <a:p>
+                <a:pPr marL="457200" lvl="1" indent="0">
+                  <a:buNone/>
+                </a:pPr>
+                <a:r>
+                  <a:rPr lang="en-US" dirty="0">
+                    <a:latin typeface="Cambria Math" panose="02040503050406030204" pitchFamily="18" charset="0"/>
+                  </a:rPr>
+                  <a:t>2*m*m Dimensional table (2 Dimensional)</a:t>
+                </a:r>
+              </a:p>
+              <a:p>
+                <a:pPr marL="457200" lvl="1" indent="0">
+                  <a:buNone/>
+                </a:pPr>
+                <a:r>
+                  <a:rPr lang="en-US" dirty="0">
+                    <a:latin typeface="Cambria Math" panose="02040503050406030204" pitchFamily="18" charset="0"/>
+                  </a:rPr>
+                  <a:t>Green region = (LB, UB)</a:t>
+                </a:r>
+                <a:r>
+                  <a:rPr lang="en-US" baseline="-25000" dirty="0">
+                    <a:latin typeface="Cambria Math" panose="02040503050406030204" pitchFamily="18" charset="0"/>
+                  </a:rPr>
+                  <a:t>c1</a:t>
+                </a:r>
+                <a:r>
+                  <a:rPr lang="en-US" dirty="0">
+                    <a:latin typeface="Cambria Math" panose="02040503050406030204" pitchFamily="18" charset="0"/>
+                  </a:rPr>
+                  <a:t> </a:t>
+                </a:r>
+                <a14:m>
+                  <m:oMath xmlns:m="http://schemas.openxmlformats.org/officeDocument/2006/math">
+                    <m:r>
+                      <a:rPr lang="en-US" i="1" smtClean="0">
+                        <a:latin typeface="Cambria Math" panose="02040503050406030204" pitchFamily="18" charset="0"/>
+                        <a:ea typeface="Cambria Math" panose="02040503050406030204" pitchFamily="18" charset="0"/>
+                      </a:rPr>
+                      <m:t>∩</m:t>
+                    </m:r>
+                    <m:r>
+                      <a:rPr lang="en-US" b="0" i="1" smtClean="0">
+                        <a:latin typeface="Cambria Math" panose="02040503050406030204" pitchFamily="18" charset="0"/>
+                        <a:ea typeface="Cambria Math" panose="02040503050406030204" pitchFamily="18" charset="0"/>
+                      </a:rPr>
+                      <m:t> </m:t>
+                    </m:r>
+                  </m:oMath>
+                </a14:m>
+                <a:r>
+                  <a:rPr lang="en-US" dirty="0">
+                    <a:latin typeface="Cambria Math" panose="02040503050406030204" pitchFamily="18" charset="0"/>
+                  </a:rPr>
+                  <a:t>(LB, UB)</a:t>
+                </a:r>
+                <a:r>
+                  <a:rPr lang="en-US" baseline="-25000" dirty="0">
+                    <a:latin typeface="Cambria Math" panose="02040503050406030204" pitchFamily="18" charset="0"/>
+                  </a:rPr>
+                  <a:t>c2</a:t>
+                </a:r>
+                <a:endParaRPr lang="en-US" baseline="-25000" dirty="0">
+                  <a:solidFill>
+                    <a:schemeClr val="accent6">
+                      <a:lumMod val="75000"/>
+                    </a:schemeClr>
+                  </a:solidFill>
+                  <a:latin typeface="Cambria Math" panose="02040503050406030204" pitchFamily="18" charset="0"/>
+                </a:endParaRPr>
+              </a:p>
+              <a:p>
+                <a:pPr marL="457200" lvl="1" indent="0">
+                  <a:buNone/>
+                </a:pPr>
+                <a:r>
+                  <a:rPr lang="en-US" sz="2200" dirty="0">
+                    <a:latin typeface="Cambria Math" panose="02040503050406030204" pitchFamily="18" charset="0"/>
+                    <a:ea typeface="Cambria Math" panose="02040503050406030204" pitchFamily="18" charset="0"/>
+                  </a:rPr>
+                  <a:t>Star region = c</a:t>
+                </a:r>
+                <a:r>
+                  <a:rPr lang="en-US" sz="2200" baseline="-25000" dirty="0">
+                    <a:latin typeface="Cambria Math" panose="02040503050406030204" pitchFamily="18" charset="0"/>
+                    <a:ea typeface="Cambria Math" panose="02040503050406030204" pitchFamily="18" charset="0"/>
+                  </a:rPr>
+                  <a:t>i</a:t>
+                </a:r>
+                <a:r>
+                  <a:rPr lang="en-US" sz="2200" dirty="0">
+                    <a:latin typeface="Cambria Math" panose="02040503050406030204" pitchFamily="18" charset="0"/>
+                    <a:ea typeface="Cambria Math" panose="02040503050406030204" pitchFamily="18" charset="0"/>
+                  </a:rPr>
+                  <a:t> </a:t>
+                </a:r>
+                <a14:m>
+                  <m:oMath xmlns:m="http://schemas.openxmlformats.org/officeDocument/2006/math">
+                    <m:r>
+                      <a:rPr lang="en-US" sz="2200" i="1" dirty="0" smtClean="0">
+                        <a:latin typeface="Cambria Math" panose="02040503050406030204" pitchFamily="18" charset="0"/>
+                        <a:ea typeface="Cambria Math" panose="02040503050406030204" pitchFamily="18" charset="0"/>
+                      </a:rPr>
+                      <m:t>≥</m:t>
+                    </m:r>
+                  </m:oMath>
+                </a14:m>
+                <a:r>
+                  <a:rPr lang="en-US" sz="2200" dirty="0">
+                    <a:latin typeface="Cambria Math" panose="02040503050406030204" pitchFamily="18" charset="0"/>
+                    <a:ea typeface="Cambria Math" panose="02040503050406030204" pitchFamily="18" charset="0"/>
+                  </a:rPr>
+                  <a:t> </a:t>
+                </a:r>
+                <a:r>
+                  <a:rPr lang="en-US" sz="2200" dirty="0" err="1">
+                    <a:latin typeface="Cambria Math" panose="02040503050406030204" pitchFamily="18" charset="0"/>
+                    <a:ea typeface="Cambria Math" panose="02040503050406030204" pitchFamily="18" charset="0"/>
+                  </a:rPr>
+                  <a:t>c</a:t>
+                </a:r>
+                <a:r>
+                  <a:rPr lang="en-US" sz="2200" baseline="-25000" dirty="0" err="1">
+                    <a:latin typeface="Cambria Math" panose="02040503050406030204" pitchFamily="18" charset="0"/>
+                    <a:ea typeface="Cambria Math" panose="02040503050406030204" pitchFamily="18" charset="0"/>
+                  </a:rPr>
+                  <a:t>j</a:t>
+                </a:r>
+                <a:endParaRPr lang="en-US" sz="2200" baseline="-25000" dirty="0">
+                  <a:latin typeface="Cambria Math" panose="02040503050406030204" pitchFamily="18" charset="0"/>
+                  <a:ea typeface="Cambria Math" panose="02040503050406030204" pitchFamily="18" charset="0"/>
+                </a:endParaRPr>
+              </a:p>
+              <a:p>
+                <a:pPr marL="457200" lvl="1" indent="0">
+                  <a:buNone/>
+                </a:pPr>
+                <a:r>
+                  <a:rPr lang="en-US" sz="2200" dirty="0">
+                    <a:latin typeface="Cambria Math" panose="02040503050406030204" pitchFamily="18" charset="0"/>
+                    <a:ea typeface="Cambria Math" panose="02040503050406030204" pitchFamily="18" charset="0"/>
+                  </a:rPr>
+                  <a:t>Result = (Star region </a:t>
+                </a:r>
+                <a14:m>
+                  <m:oMath xmlns:m="http://schemas.openxmlformats.org/officeDocument/2006/math">
+                    <m:r>
+                      <a:rPr lang="en-US" sz="2200" i="1">
+                        <a:latin typeface="Cambria Math" panose="02040503050406030204" pitchFamily="18" charset="0"/>
+                        <a:ea typeface="Cambria Math" panose="02040503050406030204" pitchFamily="18" charset="0"/>
+                      </a:rPr>
+                      <m:t>∩</m:t>
+                    </m:r>
+                  </m:oMath>
+                </a14:m>
+                <a:r>
+                  <a:rPr lang="en-US" sz="2200" dirty="0">
+                    <a:latin typeface="Cambria Math" panose="02040503050406030204" pitchFamily="18" charset="0"/>
+                    <a:ea typeface="Cambria Math" panose="02040503050406030204" pitchFamily="18" charset="0"/>
+                  </a:rPr>
+                  <a:t> Green region) / Green region</a:t>
+                </a:r>
+              </a:p>
+              <a:p>
+                <a:pPr marL="457200" lvl="1" indent="0">
+                  <a:buNone/>
+                </a:pPr>
+                <a:endParaRPr lang="en-US" sz="2200" dirty="0">
+                  <a:latin typeface="Cambria Math" panose="02040503050406030204" pitchFamily="18" charset="0"/>
+                  <a:ea typeface="Cambria Math" panose="02040503050406030204" pitchFamily="18" charset="0"/>
+                </a:endParaRPr>
+              </a:p>
+              <a:p>
+                <a:pPr marL="457200" lvl="1" indent="0">
+                  <a:buNone/>
+                </a:pPr>
+                <a:r>
+                  <a:rPr lang="en-US" sz="2200" dirty="0">
+                    <a:latin typeface="Cambria Math" panose="02040503050406030204" pitchFamily="18" charset="0"/>
+                    <a:ea typeface="Cambria Math" panose="02040503050406030204" pitchFamily="18" charset="0"/>
+                  </a:rPr>
+                  <a:t>** This table is just an example 2D table</a:t>
+                </a:r>
+                <a:endParaRPr lang="en-US" sz="2200" dirty="0"/>
+              </a:p>
+            </p:txBody>
+          </p:sp>
+        </mc:Choice>
+        <mc:Fallback>
+          <p:sp>
+            <p:nvSpPr>
+              <p:cNvPr id="3" name="Content Placeholder 2">
+                <a:extLst>
+                  <a:ext uri="{FF2B5EF4-FFF2-40B4-BE49-F238E27FC236}">
+                    <a16:creationId xmlns:a16="http://schemas.microsoft.com/office/drawing/2014/main" id="{5DF251DC-4F64-5D48-6C5F-F604B6F609CD}"/>
+                  </a:ext>
+                </a:extLst>
+              </p:cNvPr>
+              <p:cNvSpPr>
+                <a:spLocks noGrp="1" noRot="1" noChangeAspect="1" noMove="1" noResize="1" noEditPoints="1" noAdjustHandles="1" noChangeArrowheads="1" noChangeShapeType="1" noTextEdit="1"/>
+              </p:cNvSpPr>
+              <p:nvPr>
+                <p:ph idx="1"/>
+              </p:nvPr>
+            </p:nvSpPr>
+            <p:spPr>
+              <a:xfrm>
+                <a:off x="185738" y="769937"/>
+                <a:ext cx="12006262" cy="5318125"/>
+              </a:xfrm>
+              <a:blipFill>
+                <a:blip r:embed="rId2"/>
+                <a:stretch>
+                  <a:fillRect l="-1056"/>
+                </a:stretch>
+              </a:blipFill>
+            </p:spPr>
+            <p:txBody>
+              <a:bodyPr/>
+              <a:lstStyle/>
+              <a:p>
+                <a:r>
+                  <a:rPr lang="en-US">
+                    <a:noFill/>
+                  </a:rPr>
+                  <a:t> </a:t>
+                </a:r>
+              </a:p>
+            </p:txBody>
+          </p:sp>
+        </mc:Fallback>
+      </mc:AlternateContent>
+      <p:graphicFrame>
+        <p:nvGraphicFramePr>
+          <p:cNvPr id="4" name="Table 3">
+            <a:extLst>
+              <a:ext uri="{FF2B5EF4-FFF2-40B4-BE49-F238E27FC236}">
+                <a16:creationId xmlns:a16="http://schemas.microsoft.com/office/drawing/2014/main" id="{1524D826-103C-D069-B991-28C549E293B6}"/>
+              </a:ext>
+            </a:extLst>
+          </p:cNvPr>
+          <p:cNvGraphicFramePr>
+            <a:graphicFrameLocks noGrp="1"/>
+          </p:cNvGraphicFramePr>
+          <p:nvPr/>
+        </p:nvGraphicFramePr>
+        <p:xfrm>
+          <a:off x="3379157" y="4721226"/>
+          <a:ext cx="5433685" cy="1854200"/>
+        </p:xfrm>
+        <a:graphic>
+          <a:graphicData uri="http://schemas.openxmlformats.org/drawingml/2006/table">
+            <a:tbl>
+              <a:tblPr firstRow="1" bandRow="1">
+                <a:tableStyleId>{5C22544A-7EE6-4342-B048-85BDC9FD1C3A}</a:tableStyleId>
+              </a:tblPr>
+              <a:tblGrid>
+                <a:gridCol w="1086737">
+                  <a:extLst>
+                    <a:ext uri="{9D8B030D-6E8A-4147-A177-3AD203B41FA5}">
+                      <a16:colId xmlns:a16="http://schemas.microsoft.com/office/drawing/2014/main" val="152265934"/>
+                    </a:ext>
+                  </a:extLst>
+                </a:gridCol>
+                <a:gridCol w="1086737">
+                  <a:extLst>
+                    <a:ext uri="{9D8B030D-6E8A-4147-A177-3AD203B41FA5}">
+                      <a16:colId xmlns:a16="http://schemas.microsoft.com/office/drawing/2014/main" val="4078968741"/>
+                    </a:ext>
+                  </a:extLst>
+                </a:gridCol>
+                <a:gridCol w="1086737">
+                  <a:extLst>
+                    <a:ext uri="{9D8B030D-6E8A-4147-A177-3AD203B41FA5}">
+                      <a16:colId xmlns:a16="http://schemas.microsoft.com/office/drawing/2014/main" val="1554198573"/>
+                    </a:ext>
+                  </a:extLst>
+                </a:gridCol>
+                <a:gridCol w="1086737">
+                  <a:extLst>
+                    <a:ext uri="{9D8B030D-6E8A-4147-A177-3AD203B41FA5}">
+                      <a16:colId xmlns:a16="http://schemas.microsoft.com/office/drawing/2014/main" val="3614642542"/>
+                    </a:ext>
+                  </a:extLst>
+                </a:gridCol>
+                <a:gridCol w="1086737">
+                  <a:extLst>
+                    <a:ext uri="{9D8B030D-6E8A-4147-A177-3AD203B41FA5}">
+                      <a16:colId xmlns:a16="http://schemas.microsoft.com/office/drawing/2014/main" val="423572014"/>
+                    </a:ext>
+                  </a:extLst>
+                </a:gridCol>
+              </a:tblGrid>
+              <a:tr h="370840">
+                <a:tc>
+                  <a:txBody>
+                    <a:bodyPr/>
+                    <a:lstStyle/>
+                    <a:p>
+                      <a:pPr algn="ctr"/>
+                      <a:endParaRPr lang="en-US" dirty="0"/>
+                    </a:p>
+                  </a:txBody>
+                  <a:tcPr/>
+                </a:tc>
+                <a:tc>
+                  <a:txBody>
+                    <a:bodyPr/>
+                    <a:lstStyle/>
+                    <a:p>
+                      <a:pPr algn="ctr"/>
+                      <a:r>
+                        <a:rPr lang="en-US" dirty="0"/>
+                        <a:t>0.5</a:t>
+                      </a:r>
+                    </a:p>
+                  </a:txBody>
+                  <a:tcPr/>
+                </a:tc>
+                <a:tc>
+                  <a:txBody>
+                    <a:bodyPr/>
+                    <a:lstStyle/>
+                    <a:p>
+                      <a:pPr algn="ctr"/>
+                      <a:r>
+                        <a:rPr lang="en-US" dirty="0"/>
+                        <a:t>1</a:t>
+                      </a:r>
+                    </a:p>
+                  </a:txBody>
+                  <a:tcPr/>
+                </a:tc>
+                <a:tc>
+                  <a:txBody>
+                    <a:bodyPr/>
+                    <a:lstStyle/>
+                    <a:p>
+                      <a:pPr algn="ctr"/>
+                      <a:r>
+                        <a:rPr lang="en-US" dirty="0"/>
+                        <a:t>1.5</a:t>
+                      </a:r>
+                    </a:p>
+                  </a:txBody>
+                  <a:tcPr/>
+                </a:tc>
+                <a:tc>
+                  <a:txBody>
+                    <a:bodyPr/>
+                    <a:lstStyle/>
+                    <a:p>
+                      <a:pPr algn="ctr"/>
+                      <a:r>
+                        <a:rPr lang="en-US" dirty="0"/>
+                        <a:t>2</a:t>
+                      </a:r>
+                    </a:p>
+                  </a:txBody>
+                  <a:tcPr/>
+                </a:tc>
+                <a:extLst>
+                  <a:ext uri="{0D108BD9-81ED-4DB2-BD59-A6C34878D82A}">
+                    <a16:rowId xmlns:a16="http://schemas.microsoft.com/office/drawing/2014/main" val="4191670207"/>
+                  </a:ext>
+                </a:extLst>
+              </a:tr>
+              <a:tr h="370840">
+                <a:tc>
+                  <a:txBody>
+                    <a:bodyPr/>
+                    <a:lstStyle/>
+                    <a:p>
+                      <a:pPr algn="ctr"/>
+                      <a:r>
+                        <a:rPr lang="en-US" dirty="0"/>
+                        <a:t>0.5</a:t>
+                      </a:r>
+                    </a:p>
+                  </a:txBody>
+                  <a:tcPr/>
+                </a:tc>
+                <a:tc>
+                  <a:txBody>
+                    <a:bodyPr/>
+                    <a:lstStyle/>
+                    <a:p>
+                      <a:pPr algn="ctr"/>
+                      <a:r>
+                        <a:rPr lang="en-US" dirty="0"/>
+                        <a:t>*</a:t>
+                      </a:r>
+                    </a:p>
+                  </a:txBody>
+                  <a:tcPr/>
+                </a:tc>
+                <a:tc>
+                  <a:txBody>
+                    <a:bodyPr/>
+                    <a:lstStyle/>
+                    <a:p>
+                      <a:pPr algn="ctr"/>
+                      <a:endParaRPr lang="en-US"/>
+                    </a:p>
+                  </a:txBody>
+                  <a:tcPr/>
+                </a:tc>
+                <a:tc>
+                  <a:txBody>
+                    <a:bodyPr/>
+                    <a:lstStyle/>
+                    <a:p>
+                      <a:pPr algn="ctr"/>
+                      <a:endParaRPr lang="en-US"/>
+                    </a:p>
+                  </a:txBody>
+                  <a:tcPr/>
+                </a:tc>
+                <a:tc>
+                  <a:txBody>
+                    <a:bodyPr/>
+                    <a:lstStyle/>
+                    <a:p>
+                      <a:pPr algn="ctr"/>
+                      <a:endParaRPr lang="en-US"/>
+                    </a:p>
+                  </a:txBody>
+                  <a:tcPr/>
+                </a:tc>
+                <a:extLst>
+                  <a:ext uri="{0D108BD9-81ED-4DB2-BD59-A6C34878D82A}">
+                    <a16:rowId xmlns:a16="http://schemas.microsoft.com/office/drawing/2014/main" val="2280411846"/>
+                  </a:ext>
+                </a:extLst>
+              </a:tr>
+              <a:tr h="370840">
+                <a:tc>
+                  <a:txBody>
+                    <a:bodyPr/>
+                    <a:lstStyle/>
+                    <a:p>
+                      <a:pPr algn="ctr"/>
+                      <a:r>
+                        <a:rPr lang="en-US" dirty="0"/>
+                        <a:t>1</a:t>
+                      </a:r>
+                    </a:p>
+                  </a:txBody>
+                  <a:tcPr/>
+                </a:tc>
+                <a:tc>
+                  <a:txBody>
+                    <a:bodyPr/>
+                    <a:lstStyle/>
+                    <a:p>
+                      <a:pPr algn="ctr"/>
+                      <a:r>
+                        <a:rPr lang="en-US" dirty="0"/>
+                        <a:t>*</a:t>
+                      </a:r>
+                    </a:p>
+                  </a:txBody>
+                  <a:tcPr>
+                    <a:solidFill>
+                      <a:schemeClr val="accent6">
+                        <a:lumMod val="40000"/>
+                        <a:lumOff val="60000"/>
+                      </a:schemeClr>
+                    </a:solidFill>
+                  </a:tcPr>
+                </a:tc>
+                <a:tc>
+                  <a:txBody>
+                    <a:bodyPr/>
+                    <a:lstStyle/>
+                    <a:p>
+                      <a:pPr algn="ctr"/>
+                      <a:r>
+                        <a:rPr lang="en-US" dirty="0"/>
+                        <a:t>*</a:t>
+                      </a:r>
+                    </a:p>
+                  </a:txBody>
+                  <a:tcPr>
+                    <a:solidFill>
+                      <a:schemeClr val="accent6">
+                        <a:lumMod val="40000"/>
+                        <a:lumOff val="60000"/>
+                      </a:schemeClr>
+                    </a:solidFill>
+                  </a:tcPr>
+                </a:tc>
+                <a:tc>
+                  <a:txBody>
+                    <a:bodyPr/>
+                    <a:lstStyle/>
+                    <a:p>
+                      <a:pPr algn="ctr"/>
+                      <a:endParaRPr lang="en-US" dirty="0"/>
+                    </a:p>
+                  </a:txBody>
+                  <a:tcPr>
+                    <a:solidFill>
+                      <a:schemeClr val="accent6">
+                        <a:lumMod val="40000"/>
+                        <a:lumOff val="60000"/>
+                      </a:schemeClr>
+                    </a:solidFill>
+                  </a:tcPr>
+                </a:tc>
+                <a:tc>
+                  <a:txBody>
+                    <a:bodyPr/>
+                    <a:lstStyle/>
+                    <a:p>
+                      <a:pPr algn="ctr"/>
+                      <a:endParaRPr lang="en-US" dirty="0"/>
+                    </a:p>
+                  </a:txBody>
+                  <a:tcPr/>
+                </a:tc>
+                <a:extLst>
+                  <a:ext uri="{0D108BD9-81ED-4DB2-BD59-A6C34878D82A}">
+                    <a16:rowId xmlns:a16="http://schemas.microsoft.com/office/drawing/2014/main" val="1530262547"/>
+                  </a:ext>
+                </a:extLst>
+              </a:tr>
+              <a:tr h="370840">
+                <a:tc>
+                  <a:txBody>
+                    <a:bodyPr/>
+                    <a:lstStyle/>
+                    <a:p>
+                      <a:pPr algn="ctr"/>
+                      <a:r>
+                        <a:rPr lang="en-US" dirty="0"/>
+                        <a:t>1.5</a:t>
+                      </a:r>
+                    </a:p>
+                  </a:txBody>
+                  <a:tcPr/>
+                </a:tc>
+                <a:tc>
+                  <a:txBody>
+                    <a:bodyPr/>
+                    <a:lstStyle/>
+                    <a:p>
+                      <a:pPr algn="ctr"/>
+                      <a:r>
+                        <a:rPr lang="en-US" dirty="0"/>
+                        <a:t>*</a:t>
+                      </a:r>
+                    </a:p>
+                  </a:txBody>
+                  <a:tcPr>
+                    <a:solidFill>
+                      <a:schemeClr val="accent6">
+                        <a:lumMod val="40000"/>
+                        <a:lumOff val="60000"/>
+                      </a:schemeClr>
+                    </a:solidFill>
+                  </a:tcPr>
+                </a:tc>
+                <a:tc>
+                  <a:txBody>
+                    <a:bodyPr/>
+                    <a:lstStyle/>
+                    <a:p>
+                      <a:pPr algn="ctr"/>
+                      <a:r>
+                        <a:rPr lang="en-US" dirty="0"/>
+                        <a:t>*</a:t>
+                      </a:r>
+                    </a:p>
+                  </a:txBody>
+                  <a:tcPr>
+                    <a:solidFill>
+                      <a:schemeClr val="accent6">
+                        <a:lumMod val="40000"/>
+                        <a:lumOff val="60000"/>
+                      </a:schemeClr>
+                    </a:solidFill>
+                  </a:tcPr>
+                </a:tc>
+                <a:tc>
+                  <a:txBody>
+                    <a:bodyPr/>
+                    <a:lstStyle/>
+                    <a:p>
+                      <a:pPr algn="ctr"/>
+                      <a:r>
+                        <a:rPr lang="en-US" dirty="0"/>
+                        <a:t>*</a:t>
+                      </a:r>
+                    </a:p>
+                  </a:txBody>
+                  <a:tcPr>
+                    <a:solidFill>
+                      <a:schemeClr val="accent6">
+                        <a:lumMod val="40000"/>
+                        <a:lumOff val="60000"/>
+                      </a:schemeClr>
+                    </a:solidFill>
+                  </a:tcPr>
+                </a:tc>
+                <a:tc>
+                  <a:txBody>
+                    <a:bodyPr/>
+                    <a:lstStyle/>
+                    <a:p>
+                      <a:pPr algn="ctr"/>
+                      <a:endParaRPr lang="en-US" dirty="0"/>
+                    </a:p>
+                  </a:txBody>
+                  <a:tcPr/>
+                </a:tc>
+                <a:extLst>
+                  <a:ext uri="{0D108BD9-81ED-4DB2-BD59-A6C34878D82A}">
+                    <a16:rowId xmlns:a16="http://schemas.microsoft.com/office/drawing/2014/main" val="1629365600"/>
+                  </a:ext>
+                </a:extLst>
+              </a:tr>
+              <a:tr h="370840">
+                <a:tc>
+                  <a:txBody>
+                    <a:bodyPr/>
+                    <a:lstStyle/>
+                    <a:p>
+                      <a:pPr algn="ctr"/>
+                      <a:r>
+                        <a:rPr lang="en-US" dirty="0"/>
+                        <a:t>2</a:t>
+                      </a:r>
+                    </a:p>
+                  </a:txBody>
+                  <a:tcPr/>
+                </a:tc>
+                <a:tc>
+                  <a:txBody>
+                    <a:bodyPr/>
+                    <a:lstStyle/>
+                    <a:p>
+                      <a:pPr algn="ctr"/>
+                      <a:r>
+                        <a:rPr lang="en-US" dirty="0"/>
+                        <a:t>*</a:t>
+                      </a:r>
+                    </a:p>
+                  </a:txBody>
+                  <a:tcPr>
+                    <a:solidFill>
+                      <a:schemeClr val="accent6">
+                        <a:lumMod val="40000"/>
+                        <a:lumOff val="60000"/>
+                      </a:schemeClr>
+                    </a:solidFill>
+                  </a:tcPr>
+                </a:tc>
+                <a:tc>
+                  <a:txBody>
+                    <a:bodyPr/>
+                    <a:lstStyle/>
+                    <a:p>
+                      <a:pPr algn="ctr"/>
+                      <a:r>
+                        <a:rPr lang="en-US" dirty="0"/>
+                        <a:t>*</a:t>
+                      </a:r>
+                    </a:p>
+                  </a:txBody>
+                  <a:tcPr>
+                    <a:solidFill>
+                      <a:schemeClr val="accent6">
+                        <a:lumMod val="40000"/>
+                        <a:lumOff val="60000"/>
+                      </a:schemeClr>
+                    </a:solidFill>
+                  </a:tcPr>
+                </a:tc>
+                <a:tc>
+                  <a:txBody>
+                    <a:bodyPr/>
+                    <a:lstStyle/>
+                    <a:p>
+                      <a:pPr algn="ctr"/>
+                      <a:r>
+                        <a:rPr lang="en-US" dirty="0"/>
+                        <a:t>*</a:t>
+                      </a:r>
+                    </a:p>
+                  </a:txBody>
+                  <a:tcPr>
+                    <a:solidFill>
+                      <a:schemeClr val="accent6">
+                        <a:lumMod val="40000"/>
+                        <a:lumOff val="60000"/>
+                      </a:schemeClr>
+                    </a:solidFill>
+                  </a:tcPr>
+                </a:tc>
+                <a:tc>
+                  <a:txBody>
+                    <a:bodyPr/>
+                    <a:lstStyle/>
+                    <a:p>
+                      <a:pPr algn="ctr"/>
+                      <a:r>
+                        <a:rPr lang="en-US" dirty="0"/>
+                        <a:t>*</a:t>
+                      </a:r>
+                    </a:p>
+                  </a:txBody>
+                  <a:tcPr/>
+                </a:tc>
+                <a:extLst>
+                  <a:ext uri="{0D108BD9-81ED-4DB2-BD59-A6C34878D82A}">
+                    <a16:rowId xmlns:a16="http://schemas.microsoft.com/office/drawing/2014/main" val="3209401911"/>
+                  </a:ext>
+                </a:extLst>
+              </a:tr>
+            </a:tbl>
+          </a:graphicData>
+        </a:graphic>
+      </p:graphicFrame>
+      <p:sp>
+        <p:nvSpPr>
+          <p:cNvPr id="6" name="TextBox 5">
+            <a:extLst>
+              <a:ext uri="{FF2B5EF4-FFF2-40B4-BE49-F238E27FC236}">
+                <a16:creationId xmlns:a16="http://schemas.microsoft.com/office/drawing/2014/main" id="{875B93E0-4F6B-6AD7-CAC7-613AB3F4019F}"/>
+              </a:ext>
+            </a:extLst>
+          </p:cNvPr>
+          <p:cNvSpPr txBox="1"/>
+          <p:nvPr/>
+        </p:nvSpPr>
+        <p:spPr>
+          <a:xfrm>
+            <a:off x="3671220" y="4351894"/>
+            <a:ext cx="468398" cy="369332"/>
+          </a:xfrm>
+          <a:prstGeom prst="rect">
+            <a:avLst/>
+          </a:prstGeom>
+          <a:noFill/>
+        </p:spPr>
+        <p:txBody>
+          <a:bodyPr wrap="none" rtlCol="0">
+            <a:spAutoFit/>
+          </a:bodyPr>
+          <a:lstStyle/>
+          <a:p>
+            <a:r>
+              <a:rPr lang="en-US" dirty="0"/>
+              <a:t>C2</a:t>
+            </a:r>
+          </a:p>
+        </p:txBody>
+      </p:sp>
+      <p:sp>
+        <p:nvSpPr>
+          <p:cNvPr id="7" name="TextBox 6">
+            <a:extLst>
+              <a:ext uri="{FF2B5EF4-FFF2-40B4-BE49-F238E27FC236}">
+                <a16:creationId xmlns:a16="http://schemas.microsoft.com/office/drawing/2014/main" id="{386AEC42-251A-A974-74FC-3DB1A405E1B3}"/>
+              </a:ext>
+            </a:extLst>
+          </p:cNvPr>
+          <p:cNvSpPr txBox="1"/>
+          <p:nvPr/>
+        </p:nvSpPr>
+        <p:spPr>
+          <a:xfrm>
+            <a:off x="2827034" y="4845073"/>
+            <a:ext cx="468398" cy="369332"/>
+          </a:xfrm>
+          <a:prstGeom prst="rect">
+            <a:avLst/>
+          </a:prstGeom>
+          <a:noFill/>
+        </p:spPr>
+        <p:txBody>
+          <a:bodyPr wrap="none" rtlCol="0">
+            <a:spAutoFit/>
+          </a:bodyPr>
+          <a:lstStyle/>
+          <a:p>
+            <a:r>
+              <a:rPr lang="en-US" dirty="0"/>
+              <a:t>C1</a:t>
+            </a:r>
+          </a:p>
+        </p:txBody>
+      </p:sp>
+    </p:spTree>
+    <p:extLst>
+      <p:ext uri="{BB962C8B-B14F-4D97-AF65-F5344CB8AC3E}">
+        <p14:creationId xmlns:p14="http://schemas.microsoft.com/office/powerpoint/2010/main" val="2811716955"/>
       </p:ext>
     </p:extLst>
   </p:cSld>

</xml_diff>

<commit_message>
update sldies and exp - hotel reviews
</commit_message>
<xml_diff>
--- a/rankingwithLLM.pptx
+++ b/rankingwithLLM.pptx
@@ -5,7 +5,7 @@
     <p:sldMasterId id="2147483648" r:id="rId1"/>
   </p:sldMasterIdLst>
   <p:notesMasterIdLst>
-    <p:notesMasterId r:id="rId44"/>
+    <p:notesMasterId r:id="rId45"/>
   </p:notesMasterIdLst>
   <p:sldIdLst>
     <p:sldId id="256" r:id="rId2"/>
@@ -49,7 +49,8 @@
     <p:sldId id="300" r:id="rId40"/>
     <p:sldId id="294" r:id="rId41"/>
     <p:sldId id="295" r:id="rId42"/>
-    <p:sldId id="297" r:id="rId43"/>
+    <p:sldId id="301" r:id="rId43"/>
+    <p:sldId id="297" r:id="rId44"/>
   </p:sldIdLst>
   <p:sldSz cx="12192000" cy="6858000"/>
   <p:notesSz cx="6858000" cy="9144000"/>
@@ -238,7 +239,7 @@
           <a:p>
             <a:fld id="{DE9DA986-C197-2042-B476-BC36203B606C}" type="datetimeFigureOut">
               <a:rPr lang="en-US" smtClean="0"/>
-              <a:t>9/21/24</a:t>
+              <a:t>9/22/24</a:t>
             </a:fld>
             <a:endParaRPr lang="en-US"/>
           </a:p>
@@ -736,7 +737,7 @@
           <a:p>
             <a:fld id="{70F6711B-007C-4E47-B805-CF8F9D486DA3}" type="datetimeFigureOut">
               <a:rPr lang="en-US" smtClean="0"/>
-              <a:t>9/21/24</a:t>
+              <a:t>9/22/24</a:t>
             </a:fld>
             <a:endParaRPr lang="en-US"/>
           </a:p>
@@ -934,7 +935,7 @@
           <a:p>
             <a:fld id="{70F6711B-007C-4E47-B805-CF8F9D486DA3}" type="datetimeFigureOut">
               <a:rPr lang="en-US" smtClean="0"/>
-              <a:t>9/21/24</a:t>
+              <a:t>9/22/24</a:t>
             </a:fld>
             <a:endParaRPr lang="en-US"/>
           </a:p>
@@ -1142,7 +1143,7 @@
           <a:p>
             <a:fld id="{70F6711B-007C-4E47-B805-CF8F9D486DA3}" type="datetimeFigureOut">
               <a:rPr lang="en-US" smtClean="0"/>
-              <a:t>9/21/24</a:t>
+              <a:t>9/22/24</a:t>
             </a:fld>
             <a:endParaRPr lang="en-US"/>
           </a:p>
@@ -1340,7 +1341,7 @@
           <a:p>
             <a:fld id="{70F6711B-007C-4E47-B805-CF8F9D486DA3}" type="datetimeFigureOut">
               <a:rPr lang="en-US" smtClean="0"/>
-              <a:t>9/21/24</a:t>
+              <a:t>9/22/24</a:t>
             </a:fld>
             <a:endParaRPr lang="en-US"/>
           </a:p>
@@ -1615,7 +1616,7 @@
           <a:p>
             <a:fld id="{70F6711B-007C-4E47-B805-CF8F9D486DA3}" type="datetimeFigureOut">
               <a:rPr lang="en-US" smtClean="0"/>
-              <a:t>9/21/24</a:t>
+              <a:t>9/22/24</a:t>
             </a:fld>
             <a:endParaRPr lang="en-US"/>
           </a:p>
@@ -1880,7 +1881,7 @@
           <a:p>
             <a:fld id="{70F6711B-007C-4E47-B805-CF8F9D486DA3}" type="datetimeFigureOut">
               <a:rPr lang="en-US" smtClean="0"/>
-              <a:t>9/21/24</a:t>
+              <a:t>9/22/24</a:t>
             </a:fld>
             <a:endParaRPr lang="en-US"/>
           </a:p>
@@ -2292,7 +2293,7 @@
           <a:p>
             <a:fld id="{70F6711B-007C-4E47-B805-CF8F9D486DA3}" type="datetimeFigureOut">
               <a:rPr lang="en-US" smtClean="0"/>
-              <a:t>9/21/24</a:t>
+              <a:t>9/22/24</a:t>
             </a:fld>
             <a:endParaRPr lang="en-US"/>
           </a:p>
@@ -2433,7 +2434,7 @@
           <a:p>
             <a:fld id="{70F6711B-007C-4E47-B805-CF8F9D486DA3}" type="datetimeFigureOut">
               <a:rPr lang="en-US" smtClean="0"/>
-              <a:t>9/21/24</a:t>
+              <a:t>9/22/24</a:t>
             </a:fld>
             <a:endParaRPr lang="en-US"/>
           </a:p>
@@ -2546,7 +2547,7 @@
           <a:p>
             <a:fld id="{70F6711B-007C-4E47-B805-CF8F9D486DA3}" type="datetimeFigureOut">
               <a:rPr lang="en-US" smtClean="0"/>
-              <a:t>9/21/24</a:t>
+              <a:t>9/22/24</a:t>
             </a:fld>
             <a:endParaRPr lang="en-US"/>
           </a:p>
@@ -2857,7 +2858,7 @@
           <a:p>
             <a:fld id="{70F6711B-007C-4E47-B805-CF8F9D486DA3}" type="datetimeFigureOut">
               <a:rPr lang="en-US" smtClean="0"/>
-              <a:t>9/21/24</a:t>
+              <a:t>9/22/24</a:t>
             </a:fld>
             <a:endParaRPr lang="en-US"/>
           </a:p>
@@ -3145,7 +3146,7 @@
           <a:p>
             <a:fld id="{70F6711B-007C-4E47-B805-CF8F9D486DA3}" type="datetimeFigureOut">
               <a:rPr lang="en-US" smtClean="0"/>
-              <a:t>9/21/24</a:t>
+              <a:t>9/22/24</a:t>
             </a:fld>
             <a:endParaRPr lang="en-US"/>
           </a:p>
@@ -3386,7 +3387,7 @@
           <a:p>
             <a:fld id="{70F6711B-007C-4E47-B805-CF8F9D486DA3}" type="datetimeFigureOut">
               <a:rPr lang="en-US" smtClean="0"/>
-              <a:t>9/21/24</a:t>
+              <a:t>9/22/24</a:t>
             </a:fld>
             <a:endParaRPr lang="en-US"/>
           </a:p>
@@ -17130,8 +17131,8 @@
           </a:p>
         </p:txBody>
       </p:sp>
-      <mc:AlternateContent xmlns:mc="http://schemas.openxmlformats.org/markup-compatibility/2006">
-        <mc:Choice xmlns:a14="http://schemas.microsoft.com/office/drawing/2010/main" Requires="a14">
+      <mc:AlternateContent xmlns:mc="http://schemas.openxmlformats.org/markup-compatibility/2006" xmlns:a14="http://schemas.microsoft.com/office/drawing/2010/main">
+        <mc:Choice Requires="a14">
           <p:sp>
             <p:nvSpPr>
               <p:cNvPr id="3" name="Content Placeholder 2">
@@ -17273,13 +17274,7 @@
                           <a:rPr lang="en-US" sz="2000" b="0" i="1" smtClean="0">
                             <a:latin typeface="Cambria Math" panose="02040503050406030204" pitchFamily="18" charset="0"/>
                           </a:rPr>
-                          <m:t>𝐶</m:t>
-                        </m:r>
-                        <m:r>
-                          <a:rPr lang="en-US" sz="2000" b="0" i="1" baseline="-25000" smtClean="0">
-                            <a:latin typeface="Cambria Math" panose="02040503050406030204" pitchFamily="18" charset="0"/>
-                          </a:rPr>
-                          <m:t>𝑖</m:t>
+                          <m:t>𝐶𝑖</m:t>
                         </m:r>
                         <m:r>
                           <a:rPr lang="en-US" sz="2000" b="0" i="1" smtClean="0">
@@ -17291,13 +17286,7 @@
                           <a:rPr lang="en-US" sz="2000" b="0" i="1" smtClean="0">
                             <a:latin typeface="Cambria Math" panose="02040503050406030204" pitchFamily="18" charset="0"/>
                           </a:rPr>
-                          <m:t>𝐶</m:t>
-                        </m:r>
-                        <m:r>
-                          <a:rPr lang="en-US" sz="2000" b="0" i="1" baseline="-25000" smtClean="0">
-                            <a:latin typeface="Cambria Math" panose="02040503050406030204" pitchFamily="18" charset="0"/>
-                          </a:rPr>
-                          <m:t>𝑗</m:t>
+                          <m:t>𝐶𝑗</m:t>
                         </m:r>
                         <m:r>
                           <a:rPr lang="en-US" sz="2000" b="0" i="1" smtClean="0">
@@ -17909,7 +17898,7 @@
             </p:txBody>
           </p:sp>
         </mc:Choice>
-        <mc:Fallback>
+        <mc:Fallback xmlns="">
           <p:sp>
             <p:nvSpPr>
               <p:cNvPr id="3" name="Content Placeholder 2">
@@ -18561,8 +18550,8 @@
         </p:nvSpPr>
         <p:spPr>
           <a:xfrm>
-            <a:off x="3447740" y="1845050"/>
-            <a:ext cx="468398" cy="369332"/>
+            <a:off x="5317581" y="1765947"/>
+            <a:ext cx="1556836" cy="369332"/>
           </a:xfrm>
           <a:prstGeom prst="rect">
             <a:avLst/>
@@ -18577,7 +18566,7 @@
           <a:p>
             <a:r>
               <a:rPr lang="en-US" dirty="0"/>
-              <a:t>C2</a:t>
+              <a:t>C2 = (0.5, 1.5)</a:t>
             </a:r>
           </a:p>
         </p:txBody>
@@ -18596,8 +18585,8 @@
         </p:nvSpPr>
         <p:spPr>
           <a:xfrm>
-            <a:off x="2649362" y="2214382"/>
-            <a:ext cx="468398" cy="369332"/>
+            <a:off x="1991437" y="3059668"/>
+            <a:ext cx="1178528" cy="369332"/>
           </a:xfrm>
           <a:prstGeom prst="rect">
             <a:avLst/>
@@ -18612,7 +18601,7 @@
           <a:p>
             <a:r>
               <a:rPr lang="en-US" dirty="0"/>
-              <a:t>C1</a:t>
+              <a:t>C1 = (1, 2)</a:t>
             </a:r>
           </a:p>
         </p:txBody>
@@ -18631,7 +18620,7 @@
         </p:nvSpPr>
         <p:spPr>
           <a:xfrm>
-            <a:off x="5137243" y="1470158"/>
+            <a:off x="5137242" y="4051901"/>
             <a:ext cx="1917513" cy="369332"/>
           </a:xfrm>
           <a:prstGeom prst="rect">
@@ -18668,7 +18657,7 @@
             </p:nvSpPr>
             <p:spPr>
               <a:xfrm>
-                <a:off x="2759349" y="4415672"/>
+                <a:off x="2759347" y="4948838"/>
                 <a:ext cx="6673302" cy="1877437"/>
               </a:xfrm>
               <a:prstGeom prst="rect">
@@ -18780,7 +18769,7 @@
             </p:nvSpPr>
             <p:spPr>
               <a:xfrm>
-                <a:off x="2759349" y="4415672"/>
+                <a:off x="2759347" y="4948838"/>
                 <a:ext cx="6673302" cy="1877437"/>
               </a:xfrm>
               <a:prstGeom prst="rect">
@@ -20340,8 +20329,8 @@
           </a:p>
         </p:txBody>
       </p:sp>
-      <mc:AlternateContent xmlns:mc="http://schemas.openxmlformats.org/markup-compatibility/2006">
-        <mc:Choice xmlns:a14="http://schemas.microsoft.com/office/drawing/2010/main" Requires="a14">
+      <mc:AlternateContent xmlns:mc="http://schemas.openxmlformats.org/markup-compatibility/2006" xmlns:a14="http://schemas.microsoft.com/office/drawing/2010/main">
+        <mc:Choice Requires="a14">
           <p:sp>
             <p:nvSpPr>
               <p:cNvPr id="3" name="Content Placeholder 2">
@@ -21142,7 +21131,7 @@
             </p:txBody>
           </p:sp>
         </mc:Choice>
-        <mc:Fallback>
+        <mc:Fallback xmlns="">
           <p:sp>
             <p:nvSpPr>
               <p:cNvPr id="3" name="Content Placeholder 2">
@@ -22443,8 +22432,8 @@
           </p:sp>
         </mc:Fallback>
       </mc:AlternateContent>
-      <mc:AlternateContent xmlns:mc="http://schemas.openxmlformats.org/markup-compatibility/2006">
-        <mc:Choice xmlns:a14="http://schemas.microsoft.com/office/drawing/2010/main" Requires="a14">
+      <mc:AlternateContent xmlns:mc="http://schemas.openxmlformats.org/markup-compatibility/2006" xmlns:a14="http://schemas.microsoft.com/office/drawing/2010/main">
+        <mc:Choice Requires="a14">
           <p:sp>
             <p:nvSpPr>
               <p:cNvPr id="5" name="TextBox 4">
@@ -23414,7 +23403,7 @@
             </p:txBody>
           </p:sp>
         </mc:Choice>
-        <mc:Fallback>
+        <mc:Fallback xmlns="">
           <p:sp>
             <p:nvSpPr>
               <p:cNvPr id="5" name="TextBox 4">
@@ -24133,7 +24122,7 @@
         </p:blipFill>
         <p:spPr>
           <a:xfrm>
-            <a:off x="2743200" y="3984624"/>
+            <a:off x="2743200" y="3944235"/>
             <a:ext cx="6705600" cy="2095500"/>
           </a:xfrm>
           <a:prstGeom prst="rect">
@@ -24758,13 +24747,7 @@
                       <a:rPr lang="en-US" b="0" i="1" smtClean="0">
                         <a:latin typeface="Cambria Math" panose="02040503050406030204" pitchFamily="18" charset="0"/>
                       </a:rPr>
-                      <m:t>′</m:t>
-                    </m:r>
-                    <m:r>
-                      <a:rPr lang="en-US" b="0" i="1" smtClean="0">
-                        <a:latin typeface="Cambria Math" panose="02040503050406030204" pitchFamily="18" charset="0"/>
-                      </a:rPr>
-                      <m:t> </m:t>
+                      <m:t>′ </m:t>
                     </m:r>
                     <m:r>
                       <a:rPr lang="en-US" b="0" i="1" smtClean="0">
@@ -24886,6 +24869,12 @@
                             <a:latin typeface="Cambria Math" panose="02040503050406030204" pitchFamily="18" charset="0"/>
                           </a:rPr>
                           <m:t>𝑐</m:t>
+                        </m:r>
+                        <m:r>
+                          <a:rPr lang="en-US" b="0" i="1" smtClean="0">
+                            <a:latin typeface="Cambria Math" panose="02040503050406030204" pitchFamily="18" charset="0"/>
+                          </a:rPr>
+                          <m:t>′</m:t>
                         </m:r>
                         <m:r>
                           <a:rPr lang="en-US" b="0" i="1" smtClean="0">
@@ -25542,19 +25531,7 @@
             <a:pPr lvl="1"/>
             <a:r>
               <a:rPr lang="en-US" dirty="0"/>
-              <a:t>Hotel reviews (code implemented – </a:t>
-            </a:r>
-            <a:r>
-              <a:rPr lang="en-US" dirty="0">
-                <a:solidFill>
-                  <a:srgbClr val="FF0000"/>
-                </a:solidFill>
-              </a:rPr>
-              <a:t>not executed yet</a:t>
-            </a:r>
-            <a:r>
-              <a:rPr lang="en-US" dirty="0"/>
-              <a:t>)</a:t>
+              <a:t>Hotel reviews </a:t>
             </a:r>
           </a:p>
           <a:p>
@@ -25870,19 +25847,7 @@
             <a:pPr lvl="2"/>
             <a:r>
               <a:rPr lang="en-US" dirty="0"/>
-              <a:t>Min Uncertainty </a:t>
-            </a:r>
-            <a:r>
-              <a:rPr lang="en-US" dirty="0">
-                <a:solidFill>
-                  <a:srgbClr val="FF0000"/>
-                </a:solidFill>
-              </a:rPr>
-              <a:t>=</a:t>
-            </a:r>
-            <a:r>
-              <a:rPr lang="en-US" dirty="0"/>
-              <a:t> Lowest overlap &lt; Naive &lt; Baseline</a:t>
+              <a:t>Lowest overlap &lt;= Lowest overlap &lt; Naive &lt; Baseline</a:t>
             </a:r>
           </a:p>
           <a:p>
@@ -25998,6 +25963,556 @@
 </file>
 
 <file path=ppt/slides/slide42.xml><?xml version="1.0" encoding="utf-8"?>
+<p:sld xmlns:a="http://schemas.openxmlformats.org/drawingml/2006/main" xmlns:r="http://schemas.openxmlformats.org/officeDocument/2006/relationships" xmlns:p="http://schemas.openxmlformats.org/presentationml/2006/main">
+  <p:cSld>
+    <p:spTree>
+      <p:nvGrpSpPr>
+        <p:cNvPr id="1" name=""/>
+        <p:cNvGrpSpPr/>
+        <p:nvPr/>
+      </p:nvGrpSpPr>
+      <p:grpSpPr>
+        <a:xfrm>
+          <a:off x="0" y="0"/>
+          <a:ext cx="0" cy="0"/>
+          <a:chOff x="0" y="0"/>
+          <a:chExt cx="0" cy="0"/>
+        </a:xfrm>
+      </p:grpSpPr>
+      <mc:AlternateContent xmlns:mc="http://schemas.openxmlformats.org/markup-compatibility/2006">
+        <mc:Choice xmlns:a14="http://schemas.microsoft.com/office/drawing/2010/main" Requires="a14">
+          <p:sp>
+            <p:nvSpPr>
+              <p:cNvPr id="3" name="Content Placeholder 2">
+                <a:extLst>
+                  <a:ext uri="{FF2B5EF4-FFF2-40B4-BE49-F238E27FC236}">
+                    <a16:creationId xmlns:a16="http://schemas.microsoft.com/office/drawing/2014/main" id="{5DF251DC-4F64-5D48-6C5F-F604B6F609CD}"/>
+                  </a:ext>
+                </a:extLst>
+              </p:cNvPr>
+              <p:cNvSpPr>
+                <a:spLocks noGrp="1"/>
+              </p:cNvSpPr>
+              <p:nvPr>
+                <p:ph idx="1"/>
+              </p:nvPr>
+            </p:nvSpPr>
+            <p:spPr>
+              <a:xfrm>
+                <a:off x="371475" y="1325562"/>
+                <a:ext cx="11315700" cy="5318125"/>
+              </a:xfrm>
+            </p:spPr>
+            <p:txBody>
+              <a:bodyPr>
+                <a:normAutofit/>
+              </a:bodyPr>
+              <a:lstStyle/>
+              <a:p>
+                <a:pPr marL="0" indent="0">
+                  <a:buNone/>
+                </a:pPr>
+                <a:endParaRPr lang="en-US" i="1" dirty="0">
+                  <a:latin typeface="Cambria Math" panose="02040503050406030204" pitchFamily="18" charset="0"/>
+                </a:endParaRPr>
+              </a:p>
+              <a:p>
+                <a:pPr marL="0" indent="0">
+                  <a:buNone/>
+                </a:pPr>
+                <a14:m>
+                  <m:oMathPara xmlns:m="http://schemas.openxmlformats.org/officeDocument/2006/math">
+                    <m:oMathParaPr>
+                      <m:jc m:val="centerGroup"/>
+                    </m:oMathParaPr>
+                    <m:oMath xmlns:m="http://schemas.openxmlformats.org/officeDocument/2006/math">
+                      <m:r>
+                        <a:rPr lang="en-US" i="1" dirty="0" smtClean="0">
+                          <a:latin typeface="Cambria Math" panose="02040503050406030204" pitchFamily="18" charset="0"/>
+                        </a:rPr>
+                        <m:t>  </m:t>
+                      </m:r>
+                    </m:oMath>
+                  </m:oMathPara>
+                </a14:m>
+                <a:endParaRPr lang="en-US" dirty="0"/>
+              </a:p>
+            </p:txBody>
+          </p:sp>
+        </mc:Choice>
+        <mc:Fallback>
+          <p:sp>
+            <p:nvSpPr>
+              <p:cNvPr id="3" name="Content Placeholder 2">
+                <a:extLst>
+                  <a:ext uri="{FF2B5EF4-FFF2-40B4-BE49-F238E27FC236}">
+                    <a16:creationId xmlns:a16="http://schemas.microsoft.com/office/drawing/2014/main" id="{5DF251DC-4F64-5D48-6C5F-F604B6F609CD}"/>
+                  </a:ext>
+                </a:extLst>
+              </p:cNvPr>
+              <p:cNvSpPr>
+                <a:spLocks noGrp="1" noRot="1" noChangeAspect="1" noMove="1" noResize="1" noEditPoints="1" noAdjustHandles="1" noChangeArrowheads="1" noChangeShapeType="1" noTextEdit="1"/>
+              </p:cNvSpPr>
+              <p:nvPr>
+                <p:ph idx="1"/>
+              </p:nvPr>
+            </p:nvSpPr>
+            <p:spPr>
+              <a:xfrm>
+                <a:off x="371475" y="1325562"/>
+                <a:ext cx="11315700" cy="5318125"/>
+              </a:xfrm>
+              <a:blipFill>
+                <a:blip r:embed="rId2"/>
+                <a:stretch>
+                  <a:fillRect/>
+                </a:stretch>
+              </a:blipFill>
+            </p:spPr>
+            <p:txBody>
+              <a:bodyPr/>
+              <a:lstStyle/>
+              <a:p>
+                <a:r>
+                  <a:rPr lang="en-US">
+                    <a:noFill/>
+                  </a:rPr>
+                  <a:t> </a:t>
+                </a:r>
+              </a:p>
+            </p:txBody>
+          </p:sp>
+        </mc:Fallback>
+      </mc:AlternateContent>
+      <p:sp>
+        <p:nvSpPr>
+          <p:cNvPr id="5" name="TextBox 4">
+            <a:extLst>
+              <a:ext uri="{FF2B5EF4-FFF2-40B4-BE49-F238E27FC236}">
+                <a16:creationId xmlns:a16="http://schemas.microsoft.com/office/drawing/2014/main" id="{C9A8E3C0-1C2E-BEB4-5967-D6C085FEEED1}"/>
+              </a:ext>
+            </a:extLst>
+          </p:cNvPr>
+          <p:cNvSpPr txBox="1"/>
+          <p:nvPr/>
+        </p:nvSpPr>
+        <p:spPr>
+          <a:xfrm>
+            <a:off x="504825" y="669320"/>
+            <a:ext cx="10954078" cy="523220"/>
+          </a:xfrm>
+          <a:prstGeom prst="rect">
+            <a:avLst/>
+          </a:prstGeom>
+          <a:noFill/>
+        </p:spPr>
+        <p:txBody>
+          <a:bodyPr wrap="square">
+            <a:spAutoFit/>
+          </a:bodyPr>
+          <a:lstStyle/>
+          <a:p>
+            <a:pPr algn="ctr"/>
+            <a:r>
+              <a:rPr lang="en-US" sz="2800" b="1" dirty="0"/>
+              <a:t>Experiment – Hotel reviews dataset</a:t>
+            </a:r>
+          </a:p>
+        </p:txBody>
+      </p:sp>
+      <p:graphicFrame>
+        <p:nvGraphicFramePr>
+          <p:cNvPr id="4" name="Table 3">
+            <a:extLst>
+              <a:ext uri="{FF2B5EF4-FFF2-40B4-BE49-F238E27FC236}">
+                <a16:creationId xmlns:a16="http://schemas.microsoft.com/office/drawing/2014/main" id="{242CD9FD-7B5F-39BA-8A7E-A4D081B8E8F7}"/>
+              </a:ext>
+            </a:extLst>
+          </p:cNvPr>
+          <p:cNvGraphicFramePr>
+            <a:graphicFrameLocks noGrp="1"/>
+          </p:cNvGraphicFramePr>
+          <p:nvPr>
+            <p:extLst>
+              <p:ext uri="{D42A27DB-BD31-4B8C-83A1-F6EECF244321}">
+                <p14:modId xmlns:p14="http://schemas.microsoft.com/office/powerpoint/2010/main" val="372179041"/>
+              </p:ext>
+            </p:extLst>
+          </p:nvPr>
+        </p:nvGraphicFramePr>
+        <p:xfrm>
+          <a:off x="2347282" y="2368550"/>
+          <a:ext cx="7269164" cy="2643190"/>
+        </p:xfrm>
+        <a:graphic>
+          <a:graphicData uri="http://schemas.openxmlformats.org/drawingml/2006/table">
+            <a:tbl>
+              <a:tblPr firstRow="1" bandRow="1">
+                <a:tableStyleId>{5C22544A-7EE6-4342-B048-85BDC9FD1C3A}</a:tableStyleId>
+              </a:tblPr>
+              <a:tblGrid>
+                <a:gridCol w="1817291">
+                  <a:extLst>
+                    <a:ext uri="{9D8B030D-6E8A-4147-A177-3AD203B41FA5}">
+                      <a16:colId xmlns:a16="http://schemas.microsoft.com/office/drawing/2014/main" val="3296493149"/>
+                    </a:ext>
+                  </a:extLst>
+                </a:gridCol>
+                <a:gridCol w="1817291">
+                  <a:extLst>
+                    <a:ext uri="{9D8B030D-6E8A-4147-A177-3AD203B41FA5}">
+                      <a16:colId xmlns:a16="http://schemas.microsoft.com/office/drawing/2014/main" val="2396105733"/>
+                    </a:ext>
+                  </a:extLst>
+                </a:gridCol>
+                <a:gridCol w="1817291">
+                  <a:extLst>
+                    <a:ext uri="{9D8B030D-6E8A-4147-A177-3AD203B41FA5}">
+                      <a16:colId xmlns:a16="http://schemas.microsoft.com/office/drawing/2014/main" val="1177188248"/>
+                    </a:ext>
+                  </a:extLst>
+                </a:gridCol>
+                <a:gridCol w="1817291">
+                  <a:extLst>
+                    <a:ext uri="{9D8B030D-6E8A-4147-A177-3AD203B41FA5}">
+                      <a16:colId xmlns:a16="http://schemas.microsoft.com/office/drawing/2014/main" val="2153461163"/>
+                    </a:ext>
+                  </a:extLst>
+                </a:gridCol>
+              </a:tblGrid>
+              <a:tr h="528638">
+                <a:tc>
+                  <a:txBody>
+                    <a:bodyPr/>
+                    <a:lstStyle/>
+                    <a:p>
+                      <a:pPr algn="ctr"/>
+                      <a:r>
+                        <a:rPr lang="en-US" dirty="0"/>
+                        <a:t>N = 6, k = 3</a:t>
+                      </a:r>
+                    </a:p>
+                  </a:txBody>
+                  <a:tcPr anchor="ctr"/>
+                </a:tc>
+                <a:tc>
+                  <a:txBody>
+                    <a:bodyPr/>
+                    <a:lstStyle/>
+                    <a:p>
+                      <a:pPr algn="ctr"/>
+                      <a:r>
+                        <a:rPr lang="en-US" dirty="0"/>
+                        <a:t>Best candidate</a:t>
+                      </a:r>
+                    </a:p>
+                  </a:txBody>
+                  <a:tcPr anchor="ctr"/>
+                </a:tc>
+                <a:tc>
+                  <a:txBody>
+                    <a:bodyPr/>
+                    <a:lstStyle/>
+                    <a:p>
+                      <a:pPr algn="ctr"/>
+                      <a:r>
+                        <a:rPr lang="en-US" dirty="0"/>
+                        <a:t>Time (s)</a:t>
+                      </a:r>
+                    </a:p>
+                  </a:txBody>
+                  <a:tcPr anchor="ctr"/>
+                </a:tc>
+                <a:tc>
+                  <a:txBody>
+                    <a:bodyPr/>
+                    <a:lstStyle/>
+                    <a:p>
+                      <a:pPr algn="ctr"/>
+                      <a:r>
+                        <a:rPr lang="en-US" dirty="0"/>
+                        <a:t>API Calls</a:t>
+                      </a:r>
+                    </a:p>
+                  </a:txBody>
+                  <a:tcPr anchor="ctr"/>
+                </a:tc>
+                <a:extLst>
+                  <a:ext uri="{0D108BD9-81ED-4DB2-BD59-A6C34878D82A}">
+                    <a16:rowId xmlns:a16="http://schemas.microsoft.com/office/drawing/2014/main" val="3762350530"/>
+                  </a:ext>
+                </a:extLst>
+              </a:tr>
+              <a:tr h="528638">
+                <a:tc>
+                  <a:txBody>
+                    <a:bodyPr/>
+                    <a:lstStyle/>
+                    <a:p>
+                      <a:pPr algn="ctr"/>
+                      <a:r>
+                        <a:rPr lang="en-US" dirty="0"/>
+                        <a:t>Exact Baseline</a:t>
+                      </a:r>
+                    </a:p>
+                  </a:txBody>
+                  <a:tcPr anchor="ctr"/>
+                </a:tc>
+                <a:tc>
+                  <a:txBody>
+                    <a:bodyPr/>
+                    <a:lstStyle/>
+                    <a:p>
+                      <a:pPr algn="ctr"/>
+                      <a:r>
+                        <a:rPr lang="en-US" dirty="0"/>
+                        <a:t>0, 1, 2</a:t>
+                      </a:r>
+                    </a:p>
+                  </a:txBody>
+                  <a:tcPr anchor="ctr"/>
+                </a:tc>
+                <a:tc>
+                  <a:txBody>
+                    <a:bodyPr/>
+                    <a:lstStyle/>
+                    <a:p>
+                      <a:pPr algn="ctr"/>
+                      <a:r>
+                        <a:rPr lang="en-US" dirty="0"/>
+                        <a:t>41</a:t>
+                      </a:r>
+                    </a:p>
+                  </a:txBody>
+                  <a:tcPr anchor="ctr"/>
+                </a:tc>
+                <a:tc>
+                  <a:txBody>
+                    <a:bodyPr/>
+                    <a:lstStyle/>
+                    <a:p>
+                      <a:pPr algn="ctr"/>
+                      <a:r>
+                        <a:rPr lang="en-US" dirty="0"/>
+                        <a:t>15</a:t>
+                      </a:r>
+                    </a:p>
+                  </a:txBody>
+                  <a:tcPr anchor="ctr"/>
+                </a:tc>
+                <a:extLst>
+                  <a:ext uri="{0D108BD9-81ED-4DB2-BD59-A6C34878D82A}">
+                    <a16:rowId xmlns:a16="http://schemas.microsoft.com/office/drawing/2014/main" val="2549820114"/>
+                  </a:ext>
+                </a:extLst>
+              </a:tr>
+              <a:tr h="528638">
+                <a:tc>
+                  <a:txBody>
+                    <a:bodyPr/>
+                    <a:lstStyle/>
+                    <a:p>
+                      <a:pPr algn="ctr"/>
+                      <a:r>
+                        <a:rPr lang="en-US" dirty="0"/>
+                        <a:t>Naive</a:t>
+                      </a:r>
+                    </a:p>
+                  </a:txBody>
+                  <a:tcPr anchor="ctr"/>
+                </a:tc>
+                <a:tc>
+                  <a:txBody>
+                    <a:bodyPr/>
+                    <a:lstStyle/>
+                    <a:p>
+                      <a:pPr algn="ctr"/>
+                      <a:r>
+                        <a:rPr lang="en-US" dirty="0"/>
+                        <a:t>0, 1, 5</a:t>
+                      </a:r>
+                    </a:p>
+                  </a:txBody>
+                  <a:tcPr anchor="ctr"/>
+                </a:tc>
+                <a:tc>
+                  <a:txBody>
+                    <a:bodyPr/>
+                    <a:lstStyle/>
+                    <a:p>
+                      <a:pPr algn="ctr"/>
+                      <a:r>
+                        <a:rPr lang="en-US" dirty="0"/>
+                        <a:t>38</a:t>
+                      </a:r>
+                    </a:p>
+                  </a:txBody>
+                  <a:tcPr anchor="ctr"/>
+                </a:tc>
+                <a:tc>
+                  <a:txBody>
+                    <a:bodyPr/>
+                    <a:lstStyle/>
+                    <a:p>
+                      <a:pPr algn="ctr"/>
+                      <a:r>
+                        <a:rPr lang="en-US" dirty="0"/>
+                        <a:t>15</a:t>
+                      </a:r>
+                    </a:p>
+                  </a:txBody>
+                  <a:tcPr anchor="ctr"/>
+                </a:tc>
+                <a:extLst>
+                  <a:ext uri="{0D108BD9-81ED-4DB2-BD59-A6C34878D82A}">
+                    <a16:rowId xmlns:a16="http://schemas.microsoft.com/office/drawing/2014/main" val="216292760"/>
+                  </a:ext>
+                </a:extLst>
+              </a:tr>
+              <a:tr h="528638">
+                <a:tc>
+                  <a:txBody>
+                    <a:bodyPr/>
+                    <a:lstStyle/>
+                    <a:p>
+                      <a:pPr algn="ctr"/>
+                      <a:r>
+                        <a:rPr lang="en-US" dirty="0"/>
+                        <a:t>Min Uncertainty</a:t>
+                      </a:r>
+                    </a:p>
+                  </a:txBody>
+                  <a:tcPr anchor="ctr"/>
+                </a:tc>
+                <a:tc>
+                  <a:txBody>
+                    <a:bodyPr/>
+                    <a:lstStyle/>
+                    <a:p>
+                      <a:pPr algn="ctr"/>
+                      <a:r>
+                        <a:rPr lang="en-US" dirty="0"/>
+                        <a:t>0, 1, 5</a:t>
+                      </a:r>
+                    </a:p>
+                  </a:txBody>
+                  <a:tcPr anchor="ctr"/>
+                </a:tc>
+                <a:tc>
+                  <a:txBody>
+                    <a:bodyPr/>
+                    <a:lstStyle/>
+                    <a:p>
+                      <a:pPr algn="ctr"/>
+                      <a:r>
+                        <a:rPr lang="en-US" dirty="0"/>
+                        <a:t>14</a:t>
+                      </a:r>
+                    </a:p>
+                  </a:txBody>
+                  <a:tcPr anchor="ctr"/>
+                </a:tc>
+                <a:tc>
+                  <a:txBody>
+                    <a:bodyPr/>
+                    <a:lstStyle/>
+                    <a:p>
+                      <a:pPr algn="ctr"/>
+                      <a:r>
+                        <a:rPr lang="en-US" dirty="0"/>
+                        <a:t>11</a:t>
+                      </a:r>
+                    </a:p>
+                  </a:txBody>
+                  <a:tcPr anchor="ctr"/>
+                </a:tc>
+                <a:extLst>
+                  <a:ext uri="{0D108BD9-81ED-4DB2-BD59-A6C34878D82A}">
+                    <a16:rowId xmlns:a16="http://schemas.microsoft.com/office/drawing/2014/main" val="540505624"/>
+                  </a:ext>
+                </a:extLst>
+              </a:tr>
+              <a:tr h="528638">
+                <a:tc>
+                  <a:txBody>
+                    <a:bodyPr/>
+                    <a:lstStyle/>
+                    <a:p>
+                      <a:pPr algn="ctr"/>
+                      <a:r>
+                        <a:rPr lang="en-US" dirty="0"/>
+                        <a:t>Lowest Overlap</a:t>
+                      </a:r>
+                    </a:p>
+                  </a:txBody>
+                  <a:tcPr anchor="ctr"/>
+                </a:tc>
+                <a:tc>
+                  <a:txBody>
+                    <a:bodyPr/>
+                    <a:lstStyle/>
+                    <a:p>
+                      <a:pPr algn="ctr"/>
+                      <a:r>
+                        <a:rPr lang="en-US" dirty="0"/>
+                        <a:t>0, 2, 5</a:t>
+                      </a:r>
+                    </a:p>
+                  </a:txBody>
+                  <a:tcPr anchor="ctr"/>
+                </a:tc>
+                <a:tc>
+                  <a:txBody>
+                    <a:bodyPr/>
+                    <a:lstStyle/>
+                    <a:p>
+                      <a:pPr algn="ctr"/>
+                      <a:r>
+                        <a:rPr lang="en-US" dirty="0"/>
+                        <a:t>10</a:t>
+                      </a:r>
+                    </a:p>
+                  </a:txBody>
+                  <a:tcPr anchor="ctr"/>
+                </a:tc>
+                <a:tc>
+                  <a:txBody>
+                    <a:bodyPr/>
+                    <a:lstStyle/>
+                    <a:p>
+                      <a:pPr algn="ctr"/>
+                      <a:r>
+                        <a:rPr lang="en-US" dirty="0"/>
+                        <a:t>8</a:t>
+                      </a:r>
+                    </a:p>
+                  </a:txBody>
+                  <a:tcPr anchor="ctr"/>
+                </a:tc>
+                <a:extLst>
+                  <a:ext uri="{0D108BD9-81ED-4DB2-BD59-A6C34878D82A}">
+                    <a16:rowId xmlns:a16="http://schemas.microsoft.com/office/drawing/2014/main" val="1852632737"/>
+                  </a:ext>
+                </a:extLst>
+              </a:tr>
+            </a:tbl>
+          </a:graphicData>
+        </a:graphic>
+      </p:graphicFrame>
+    </p:spTree>
+    <p:extLst>
+      <p:ext uri="{BB962C8B-B14F-4D97-AF65-F5344CB8AC3E}">
+        <p14:creationId xmlns:p14="http://schemas.microsoft.com/office/powerpoint/2010/main" val="3119983161"/>
+      </p:ext>
+    </p:extLst>
+  </p:cSld>
+  <p:clrMapOvr>
+    <a:masterClrMapping/>
+  </p:clrMapOvr>
+</p:sld>
+</file>
+
+<file path=ppt/slides/slide43.xml><?xml version="1.0" encoding="utf-8"?>
 <p:sld xmlns:a="http://schemas.openxmlformats.org/drawingml/2006/main" xmlns:r="http://schemas.openxmlformats.org/officeDocument/2006/relationships" xmlns:p="http://schemas.openxmlformats.org/presentationml/2006/main" show="0">
   <p:cSld>
     <p:spTree>

</xml_diff>

<commit_message>
set up movies dataset
</commit_message>
<xml_diff>
--- a/rankingwithLLM.pptx
+++ b/rankingwithLLM.pptx
@@ -241,7 +241,7 @@
           <a:p>
             <a:fld id="{DE9DA986-C197-2042-B476-BC36203B606C}" type="datetimeFigureOut">
               <a:rPr lang="en-US" smtClean="0"/>
-              <a:t>9/25/24</a:t>
+              <a:t>9/26/24</a:t>
             </a:fld>
             <a:endParaRPr lang="en-US"/>
           </a:p>
@@ -739,7 +739,7 @@
           <a:p>
             <a:fld id="{70F6711B-007C-4E47-B805-CF8F9D486DA3}" type="datetimeFigureOut">
               <a:rPr lang="en-US" smtClean="0"/>
-              <a:t>9/25/24</a:t>
+              <a:t>9/26/24</a:t>
             </a:fld>
             <a:endParaRPr lang="en-US"/>
           </a:p>
@@ -937,7 +937,7 @@
           <a:p>
             <a:fld id="{70F6711B-007C-4E47-B805-CF8F9D486DA3}" type="datetimeFigureOut">
               <a:rPr lang="en-US" smtClean="0"/>
-              <a:t>9/25/24</a:t>
+              <a:t>9/26/24</a:t>
             </a:fld>
             <a:endParaRPr lang="en-US"/>
           </a:p>
@@ -1145,7 +1145,7 @@
           <a:p>
             <a:fld id="{70F6711B-007C-4E47-B805-CF8F9D486DA3}" type="datetimeFigureOut">
               <a:rPr lang="en-US" smtClean="0"/>
-              <a:t>9/25/24</a:t>
+              <a:t>9/26/24</a:t>
             </a:fld>
             <a:endParaRPr lang="en-US"/>
           </a:p>
@@ -1343,7 +1343,7 @@
           <a:p>
             <a:fld id="{70F6711B-007C-4E47-B805-CF8F9D486DA3}" type="datetimeFigureOut">
               <a:rPr lang="en-US" smtClean="0"/>
-              <a:t>9/25/24</a:t>
+              <a:t>9/26/24</a:t>
             </a:fld>
             <a:endParaRPr lang="en-US"/>
           </a:p>
@@ -1618,7 +1618,7 @@
           <a:p>
             <a:fld id="{70F6711B-007C-4E47-B805-CF8F9D486DA3}" type="datetimeFigureOut">
               <a:rPr lang="en-US" smtClean="0"/>
-              <a:t>9/25/24</a:t>
+              <a:t>9/26/24</a:t>
             </a:fld>
             <a:endParaRPr lang="en-US"/>
           </a:p>
@@ -1883,7 +1883,7 @@
           <a:p>
             <a:fld id="{70F6711B-007C-4E47-B805-CF8F9D486DA3}" type="datetimeFigureOut">
               <a:rPr lang="en-US" smtClean="0"/>
-              <a:t>9/25/24</a:t>
+              <a:t>9/26/24</a:t>
             </a:fld>
             <a:endParaRPr lang="en-US"/>
           </a:p>
@@ -2295,7 +2295,7 @@
           <a:p>
             <a:fld id="{70F6711B-007C-4E47-B805-CF8F9D486DA3}" type="datetimeFigureOut">
               <a:rPr lang="en-US" smtClean="0"/>
-              <a:t>9/25/24</a:t>
+              <a:t>9/26/24</a:t>
             </a:fld>
             <a:endParaRPr lang="en-US"/>
           </a:p>
@@ -2436,7 +2436,7 @@
           <a:p>
             <a:fld id="{70F6711B-007C-4E47-B805-CF8F9D486DA3}" type="datetimeFigureOut">
               <a:rPr lang="en-US" smtClean="0"/>
-              <a:t>9/25/24</a:t>
+              <a:t>9/26/24</a:t>
             </a:fld>
             <a:endParaRPr lang="en-US"/>
           </a:p>
@@ -2549,7 +2549,7 @@
           <a:p>
             <a:fld id="{70F6711B-007C-4E47-B805-CF8F9D486DA3}" type="datetimeFigureOut">
               <a:rPr lang="en-US" smtClean="0"/>
-              <a:t>9/25/24</a:t>
+              <a:t>9/26/24</a:t>
             </a:fld>
             <a:endParaRPr lang="en-US"/>
           </a:p>
@@ -2860,7 +2860,7 @@
           <a:p>
             <a:fld id="{70F6711B-007C-4E47-B805-CF8F9D486DA3}" type="datetimeFigureOut">
               <a:rPr lang="en-US" smtClean="0"/>
-              <a:t>9/25/24</a:t>
+              <a:t>9/26/24</a:t>
             </a:fld>
             <a:endParaRPr lang="en-US"/>
           </a:p>
@@ -3148,7 +3148,7 @@
           <a:p>
             <a:fld id="{70F6711B-007C-4E47-B805-CF8F9D486DA3}" type="datetimeFigureOut">
               <a:rPr lang="en-US" smtClean="0"/>
-              <a:t>9/25/24</a:t>
+              <a:t>9/26/24</a:t>
             </a:fld>
             <a:endParaRPr lang="en-US"/>
           </a:p>
@@ -3389,7 +3389,7 @@
           <a:p>
             <a:fld id="{70F6711B-007C-4E47-B805-CF8F9D486DA3}" type="datetimeFigureOut">
               <a:rPr lang="en-US" smtClean="0"/>
-              <a:t>9/25/24</a:t>
+              <a:t>9/26/24</a:t>
             </a:fld>
             <a:endParaRPr lang="en-US"/>
           </a:p>
@@ -25556,7 +25556,7 @@
             </a:r>
             <a:r>
               <a:rPr lang="en-US" dirty="0"/>
-              <a:t>: We have assumed the cores obtained by LLMS (or fake APIs) are discrete values. This helps us to be able to use the probability computation of our slides in our code. </a:t>
+              <a:t>: We have assumed the scores obtained by LLMS (or fake APIs) are discrete values. This helps us to be able to use the probability computation of our slides in our code. </a:t>
             </a:r>
           </a:p>
           <a:p>

</xml_diff>